<commit_message>
updated explanation for pwer pull
</commit_message>
<xml_diff>
--- a/Lectures/Slides/L3.pptx
+++ b/Lectures/Slides/L3.pptx
@@ -16,14 +16,14 @@
     <p:sldId id="275" r:id="rId7"/>
     <p:sldId id="284" r:id="rId8"/>
     <p:sldId id="285" r:id="rId9"/>
-    <p:sldId id="280" r:id="rId10"/>
-    <p:sldId id="276" r:id="rId11"/>
-    <p:sldId id="286" r:id="rId12"/>
-    <p:sldId id="287" r:id="rId13"/>
-    <p:sldId id="288" r:id="rId14"/>
-    <p:sldId id="295" r:id="rId15"/>
-    <p:sldId id="296" r:id="rId16"/>
-    <p:sldId id="297" r:id="rId17"/>
+    <p:sldId id="276" r:id="rId10"/>
+    <p:sldId id="286" r:id="rId11"/>
+    <p:sldId id="287" r:id="rId12"/>
+    <p:sldId id="288" r:id="rId13"/>
+    <p:sldId id="295" r:id="rId14"/>
+    <p:sldId id="296" r:id="rId15"/>
+    <p:sldId id="297" r:id="rId16"/>
+    <p:sldId id="280" r:id="rId17"/>
     <p:sldId id="298" r:id="rId18"/>
     <p:sldId id="278" r:id="rId19"/>
     <p:sldId id="282" r:id="rId20"/>
@@ -273,7 +273,7 @@
       <p15:sldGuideLst xmlns:p15="http://schemas.microsoft.com/office/powerpoint/2012/main"/>
     </p:ext>
     <p:ext uri="http://customooxmlschemas.google.com/">
-      <go:slidesCustomData xmlns="" xmlns:mc="http://schemas.openxmlformats.org/markup-compatibility/2006" xmlns:mv="urn:schemas-microsoft-com:mac:vml" xmlns:c="http://schemas.openxmlformats.org/drawingml/2006/chart" xmlns:dgm="http://schemas.openxmlformats.org/drawingml/2006/diagram" xmlns:o="urn:schemas-microsoft-com:office:office" xmlns:v="urn:schemas-microsoft-com:vml" xmlns:pvml="urn:schemas-microsoft-com:office:powerpoint" xmlns:com="http://schemas.openxmlformats.org/drawingml/2006/compatibility" xmlns:p14="http://schemas.microsoft.com/office/powerpoint/2010/main" xmlns:p15="http://schemas.microsoft.com/office/powerpoint/2012/main" xmlns:ahyp="http://schemas.microsoft.com/office/drawing/2018/hyperlinkcolor" xmlns:go="http://customooxmlschemas.google.com/" r:id="rId31" roundtripDataSignature="AMtx7mjKkk5wOoQj6sDPPETbbKgHU96Dzg=="/>
+      <go:slidesCustomData xmlns:go="http://customooxmlschemas.google.com/" xmlns:ahyp="http://schemas.microsoft.com/office/drawing/2018/hyperlinkcolor" xmlns:p15="http://schemas.microsoft.com/office/powerpoint/2012/main" xmlns:p14="http://schemas.microsoft.com/office/powerpoint/2010/main" xmlns:com="http://schemas.openxmlformats.org/drawingml/2006/compatibility" xmlns:pvml="urn:schemas-microsoft-com:office:powerpoint" xmlns:v="urn:schemas-microsoft-com:vml" xmlns:o="urn:schemas-microsoft-com:office:office" xmlns:dgm="http://schemas.openxmlformats.org/drawingml/2006/diagram" xmlns:c="http://schemas.openxmlformats.org/drawingml/2006/chart" xmlns:mv="urn:schemas-microsoft-com:mac:vml" xmlns:mc="http://schemas.openxmlformats.org/markup-compatibility/2006" xmlns="" r:id="rId31" roundtripDataSignature="AMtx7mjKkk5wOoQj6sDPPETbbKgHU96Dzg=="/>
     </p:ext>
   </p:extLst>
 </p:presentation>
@@ -1844,151 +1844,6 @@
         <p:cNvPr id="1" name="Shape 114">
           <a:extLst>
             <a:ext uri="{FF2B5EF4-FFF2-40B4-BE49-F238E27FC236}">
-              <a16:creationId xmlns:a16="http://schemas.microsoft.com/office/drawing/2014/main" id="{E31D5875-C0A4-E765-3DAF-426286C7B0C6}"/>
-            </a:ext>
-          </a:extLst>
-        </p:cNvPr>
-        <p:cNvGrpSpPr/>
-        <p:nvPr/>
-      </p:nvGrpSpPr>
-      <p:grpSpPr>
-        <a:xfrm>
-          <a:off x="0" y="0"/>
-          <a:ext cx="0" cy="0"/>
-          <a:chOff x="0" y="0"/>
-          <a:chExt cx="0" cy="0"/>
-        </a:xfrm>
-      </p:grpSpPr>
-      <p:sp>
-        <p:nvSpPr>
-          <p:cNvPr id="115" name="Google Shape;115;p29:notes">
-            <a:extLst>
-              <a:ext uri="{FF2B5EF4-FFF2-40B4-BE49-F238E27FC236}">
-                <a16:creationId xmlns:a16="http://schemas.microsoft.com/office/drawing/2014/main" id="{BDE47B5B-9382-AF08-0D7D-06F91D23DF1A}"/>
-              </a:ext>
-            </a:extLst>
-          </p:cNvPr>
-          <p:cNvSpPr txBox="1">
-            <a:spLocks noGrp="1"/>
-          </p:cNvSpPr>
-          <p:nvPr>
-            <p:ph type="body" idx="1"/>
-          </p:nvPr>
-        </p:nvSpPr>
-        <p:spPr>
-          <a:xfrm>
-            <a:off x="685800" y="4400550"/>
-            <a:ext cx="5486400" cy="3600450"/>
-          </a:xfrm>
-          <a:prstGeom prst="rect">
-            <a:avLst/>
-          </a:prstGeom>
-          <a:noFill/>
-          <a:ln>
-            <a:noFill/>
-          </a:ln>
-        </p:spPr>
-        <p:txBody>
-          <a:bodyPr spcFirstLastPara="1" wrap="square" lIns="91425" tIns="45700" rIns="91425" bIns="45700" anchor="t" anchorCtr="0">
-            <a:noAutofit/>
-          </a:bodyPr>
-          <a:lstStyle/>
-          <a:p>
-            <a:pPr marL="0" lvl="0" indent="0" algn="l" rtl="0">
-              <a:lnSpc>
-                <a:spcPct val="100000"/>
-              </a:lnSpc>
-              <a:spcBef>
-                <a:spcPts val="0"/>
-              </a:spcBef>
-              <a:spcAft>
-                <a:spcPts val="0"/>
-              </a:spcAft>
-              <a:buSzPts val="1400"/>
-              <a:buNone/>
-            </a:pPr>
-            <a:endParaRPr/>
-          </a:p>
-        </p:txBody>
-      </p:sp>
-      <p:sp>
-        <p:nvSpPr>
-          <p:cNvPr id="116" name="Google Shape;116;p29:notes">
-            <a:extLst>
-              <a:ext uri="{FF2B5EF4-FFF2-40B4-BE49-F238E27FC236}">
-                <a16:creationId xmlns:a16="http://schemas.microsoft.com/office/drawing/2014/main" id="{87226BD4-FB6A-8BE6-17D9-83E2B12CAA5A}"/>
-              </a:ext>
-            </a:extLst>
-          </p:cNvPr>
-          <p:cNvSpPr>
-            <a:spLocks noGrp="1" noRot="1" noChangeAspect="1"/>
-          </p:cNvSpPr>
-          <p:nvPr>
-            <p:ph type="sldImg" idx="2"/>
-          </p:nvPr>
-        </p:nvSpPr>
-        <p:spPr>
-          <a:xfrm>
-            <a:off x="685800" y="1143000"/>
-            <a:ext cx="5486400" cy="3086100"/>
-          </a:xfrm>
-          <a:custGeom>
-            <a:avLst/>
-            <a:gdLst/>
-            <a:ahLst/>
-            <a:cxnLst/>
-            <a:rect l="l" t="t" r="r" b="b"/>
-            <a:pathLst>
-              <a:path w="120000" h="120000" extrusionOk="0">
-                <a:moveTo>
-                  <a:pt x="0" y="0"/>
-                </a:moveTo>
-                <a:lnTo>
-                  <a:pt x="120000" y="0"/>
-                </a:lnTo>
-                <a:lnTo>
-                  <a:pt x="120000" y="120000"/>
-                </a:lnTo>
-                <a:lnTo>
-                  <a:pt x="0" y="120000"/>
-                </a:lnTo>
-                <a:close/>
-              </a:path>
-            </a:pathLst>
-          </a:custGeom>
-          <a:noFill/>
-          <a:ln w="12700" cap="flat" cmpd="sng">
-            <a:solidFill>
-              <a:srgbClr val="000000"/>
-            </a:solidFill>
-            <a:prstDash val="solid"/>
-            <a:round/>
-            <a:headEnd type="none" w="sm" len="sm"/>
-            <a:tailEnd type="none" w="sm" len="sm"/>
-          </a:ln>
-        </p:spPr>
-      </p:sp>
-    </p:spTree>
-    <p:extLst>
-      <p:ext uri="{BB962C8B-B14F-4D97-AF65-F5344CB8AC3E}">
-        <p14:creationId xmlns:p14="http://schemas.microsoft.com/office/powerpoint/2010/main" val="322575517"/>
-      </p:ext>
-    </p:extLst>
-  </p:cSld>
-  <p:clrMapOvr>
-    <a:masterClrMapping/>
-  </p:clrMapOvr>
-</p:notes>
-</file>
-
-<file path=ppt/notesSlides/notesSlide11.xml><?xml version="1.0" encoding="utf-8"?>
-<p:notes xmlns:a="http://schemas.openxmlformats.org/drawingml/2006/main" xmlns:r="http://schemas.openxmlformats.org/officeDocument/2006/relationships" xmlns:p="http://schemas.openxmlformats.org/presentationml/2006/main" showMasterSp="0" showMasterPhAnim="0">
-  <p:cSld>
-    <p:spTree>
-      <p:nvGrpSpPr>
-        <p:cNvPr id="1" name="Shape 114">
-          <a:extLst>
-            <a:ext uri="{FF2B5EF4-FFF2-40B4-BE49-F238E27FC236}">
               <a16:creationId xmlns:a16="http://schemas.microsoft.com/office/drawing/2014/main" id="{BDA1172D-55A2-93BD-B09F-335BCCE18EE8}"/>
             </a:ext>
           </a:extLst>
@@ -2126,7 +1981,7 @@
 </p:notes>
 </file>
 
-<file path=ppt/notesSlides/notesSlide12.xml><?xml version="1.0" encoding="utf-8"?>
+<file path=ppt/notesSlides/notesSlide11.xml><?xml version="1.0" encoding="utf-8"?>
 <p:notes xmlns:a="http://schemas.openxmlformats.org/drawingml/2006/main" xmlns:r="http://schemas.openxmlformats.org/officeDocument/2006/relationships" xmlns:p="http://schemas.openxmlformats.org/presentationml/2006/main" showMasterSp="0" showMasterPhAnim="0">
   <p:cSld>
     <p:spTree>
@@ -2271,7 +2126,7 @@
 </p:notes>
 </file>
 
-<file path=ppt/notesSlides/notesSlide13.xml><?xml version="1.0" encoding="utf-8"?>
+<file path=ppt/notesSlides/notesSlide12.xml><?xml version="1.0" encoding="utf-8"?>
 <p:notes xmlns:a="http://schemas.openxmlformats.org/drawingml/2006/main" xmlns:r="http://schemas.openxmlformats.org/officeDocument/2006/relationships" xmlns:p="http://schemas.openxmlformats.org/presentationml/2006/main" showMasterSp="0" showMasterPhAnim="0">
   <p:cSld>
     <p:spTree>
@@ -2416,7 +2271,7 @@
 </p:notes>
 </file>
 
-<file path=ppt/notesSlides/notesSlide14.xml><?xml version="1.0" encoding="utf-8"?>
+<file path=ppt/notesSlides/notesSlide13.xml><?xml version="1.0" encoding="utf-8"?>
 <p:notes xmlns:a="http://schemas.openxmlformats.org/drawingml/2006/main" xmlns:r="http://schemas.openxmlformats.org/officeDocument/2006/relationships" xmlns:p="http://schemas.openxmlformats.org/presentationml/2006/main" showMasterSp="0" showMasterPhAnim="0">
   <p:cSld>
     <p:spTree>
@@ -2561,7 +2416,7 @@
 </p:notes>
 </file>
 
-<file path=ppt/notesSlides/notesSlide15.xml><?xml version="1.0" encoding="utf-8"?>
+<file path=ppt/notesSlides/notesSlide14.xml><?xml version="1.0" encoding="utf-8"?>
 <p:notes xmlns:a="http://schemas.openxmlformats.org/drawingml/2006/main" xmlns:r="http://schemas.openxmlformats.org/officeDocument/2006/relationships" xmlns:p="http://schemas.openxmlformats.org/presentationml/2006/main" showMasterSp="0" showMasterPhAnim="0">
   <p:cSld>
     <p:spTree>
@@ -2706,7 +2561,7 @@
 </p:notes>
 </file>
 
-<file path=ppt/notesSlides/notesSlide16.xml><?xml version="1.0" encoding="utf-8"?>
+<file path=ppt/notesSlides/notesSlide15.xml><?xml version="1.0" encoding="utf-8"?>
 <p:notes xmlns:a="http://schemas.openxmlformats.org/drawingml/2006/main" xmlns:r="http://schemas.openxmlformats.org/officeDocument/2006/relationships" xmlns:p="http://schemas.openxmlformats.org/presentationml/2006/main" showMasterSp="0" showMasterPhAnim="0">
   <p:cSld>
     <p:spTree>
@@ -2842,6 +2697,151 @@
     <p:extLst>
       <p:ext uri="{BB962C8B-B14F-4D97-AF65-F5344CB8AC3E}">
         <p14:creationId xmlns:p14="http://schemas.microsoft.com/office/powerpoint/2010/main" val="4011691641"/>
+      </p:ext>
+    </p:extLst>
+  </p:cSld>
+  <p:clrMapOvr>
+    <a:masterClrMapping/>
+  </p:clrMapOvr>
+</p:notes>
+</file>
+
+<file path=ppt/notesSlides/notesSlide16.xml><?xml version="1.0" encoding="utf-8"?>
+<p:notes xmlns:a="http://schemas.openxmlformats.org/drawingml/2006/main" xmlns:r="http://schemas.openxmlformats.org/officeDocument/2006/relationships" xmlns:p="http://schemas.openxmlformats.org/presentationml/2006/main" showMasterSp="0" showMasterPhAnim="0">
+  <p:cSld>
+    <p:spTree>
+      <p:nvGrpSpPr>
+        <p:cNvPr id="1" name="Shape 114">
+          <a:extLst>
+            <a:ext uri="{FF2B5EF4-FFF2-40B4-BE49-F238E27FC236}">
+              <a16:creationId xmlns:a16="http://schemas.microsoft.com/office/drawing/2014/main" id="{9C72C5C3-A00E-0ABB-4C73-5ED76C1C6D25}"/>
+            </a:ext>
+          </a:extLst>
+        </p:cNvPr>
+        <p:cNvGrpSpPr/>
+        <p:nvPr/>
+      </p:nvGrpSpPr>
+      <p:grpSpPr>
+        <a:xfrm>
+          <a:off x="0" y="0"/>
+          <a:ext cx="0" cy="0"/>
+          <a:chOff x="0" y="0"/>
+          <a:chExt cx="0" cy="0"/>
+        </a:xfrm>
+      </p:grpSpPr>
+      <p:sp>
+        <p:nvSpPr>
+          <p:cNvPr id="115" name="Google Shape;115;p29:notes">
+            <a:extLst>
+              <a:ext uri="{FF2B5EF4-FFF2-40B4-BE49-F238E27FC236}">
+                <a16:creationId xmlns:a16="http://schemas.microsoft.com/office/drawing/2014/main" id="{F18E7C9E-1577-5C35-44EB-B2CE8BCC0F8A}"/>
+              </a:ext>
+            </a:extLst>
+          </p:cNvPr>
+          <p:cNvSpPr txBox="1">
+            <a:spLocks noGrp="1"/>
+          </p:cNvSpPr>
+          <p:nvPr>
+            <p:ph type="body" idx="1"/>
+          </p:nvPr>
+        </p:nvSpPr>
+        <p:spPr>
+          <a:xfrm>
+            <a:off x="685800" y="4400550"/>
+            <a:ext cx="5486400" cy="3600450"/>
+          </a:xfrm>
+          <a:prstGeom prst="rect">
+            <a:avLst/>
+          </a:prstGeom>
+          <a:noFill/>
+          <a:ln>
+            <a:noFill/>
+          </a:ln>
+        </p:spPr>
+        <p:txBody>
+          <a:bodyPr spcFirstLastPara="1" wrap="square" lIns="91425" tIns="45700" rIns="91425" bIns="45700" anchor="t" anchorCtr="0">
+            <a:noAutofit/>
+          </a:bodyPr>
+          <a:lstStyle/>
+          <a:p>
+            <a:pPr marL="0" lvl="0" indent="0" algn="l" rtl="0">
+              <a:lnSpc>
+                <a:spcPct val="100000"/>
+              </a:lnSpc>
+              <a:spcBef>
+                <a:spcPts val="0"/>
+              </a:spcBef>
+              <a:spcAft>
+                <a:spcPts val="0"/>
+              </a:spcAft>
+              <a:buSzPts val="1400"/>
+              <a:buNone/>
+            </a:pPr>
+            <a:endParaRPr/>
+          </a:p>
+        </p:txBody>
+      </p:sp>
+      <p:sp>
+        <p:nvSpPr>
+          <p:cNvPr id="116" name="Google Shape;116;p29:notes">
+            <a:extLst>
+              <a:ext uri="{FF2B5EF4-FFF2-40B4-BE49-F238E27FC236}">
+                <a16:creationId xmlns:a16="http://schemas.microsoft.com/office/drawing/2014/main" id="{E79410AC-6BCC-B628-C0D6-E78CC17D6385}"/>
+              </a:ext>
+            </a:extLst>
+          </p:cNvPr>
+          <p:cNvSpPr>
+            <a:spLocks noGrp="1" noRot="1" noChangeAspect="1"/>
+          </p:cNvSpPr>
+          <p:nvPr>
+            <p:ph type="sldImg" idx="2"/>
+          </p:nvPr>
+        </p:nvSpPr>
+        <p:spPr>
+          <a:xfrm>
+            <a:off x="685800" y="1143000"/>
+            <a:ext cx="5486400" cy="3086100"/>
+          </a:xfrm>
+          <a:custGeom>
+            <a:avLst/>
+            <a:gdLst/>
+            <a:ahLst/>
+            <a:cxnLst/>
+            <a:rect l="l" t="t" r="r" b="b"/>
+            <a:pathLst>
+              <a:path w="120000" h="120000" extrusionOk="0">
+                <a:moveTo>
+                  <a:pt x="0" y="0"/>
+                </a:moveTo>
+                <a:lnTo>
+                  <a:pt x="120000" y="0"/>
+                </a:lnTo>
+                <a:lnTo>
+                  <a:pt x="120000" y="120000"/>
+                </a:lnTo>
+                <a:lnTo>
+                  <a:pt x="0" y="120000"/>
+                </a:lnTo>
+                <a:close/>
+              </a:path>
+            </a:pathLst>
+          </a:custGeom>
+          <a:noFill/>
+          <a:ln w="12700" cap="flat" cmpd="sng">
+            <a:solidFill>
+              <a:srgbClr val="000000"/>
+            </a:solidFill>
+            <a:prstDash val="solid"/>
+            <a:round/>
+            <a:headEnd type="none" w="sm" len="sm"/>
+            <a:tailEnd type="none" w="sm" len="sm"/>
+          </a:ln>
+        </p:spPr>
+      </p:sp>
+    </p:spTree>
+    <p:extLst>
+      <p:ext uri="{BB962C8B-B14F-4D97-AF65-F5344CB8AC3E}">
+        <p14:creationId xmlns:p14="http://schemas.microsoft.com/office/powerpoint/2010/main" val="2871357555"/>
       </p:ext>
     </p:extLst>
   </p:cSld>
@@ -5476,7 +5476,7 @@
         <p:cNvPr id="1" name="Shape 114">
           <a:extLst>
             <a:ext uri="{FF2B5EF4-FFF2-40B4-BE49-F238E27FC236}">
-              <a16:creationId xmlns:a16="http://schemas.microsoft.com/office/drawing/2014/main" id="{9C72C5C3-A00E-0ABB-4C73-5ED76C1C6D25}"/>
+              <a16:creationId xmlns:a16="http://schemas.microsoft.com/office/drawing/2014/main" id="{E31D5875-C0A4-E765-3DAF-426286C7B0C6}"/>
             </a:ext>
           </a:extLst>
         </p:cNvPr>
@@ -5496,7 +5496,7 @@
           <p:cNvPr id="115" name="Google Shape;115;p29:notes">
             <a:extLst>
               <a:ext uri="{FF2B5EF4-FFF2-40B4-BE49-F238E27FC236}">
-                <a16:creationId xmlns:a16="http://schemas.microsoft.com/office/drawing/2014/main" id="{F18E7C9E-1577-5C35-44EB-B2CE8BCC0F8A}"/>
+                <a16:creationId xmlns:a16="http://schemas.microsoft.com/office/drawing/2014/main" id="{BDE47B5B-9382-AF08-0D7D-06F91D23DF1A}"/>
               </a:ext>
             </a:extLst>
           </p:cNvPr>
@@ -5548,7 +5548,7 @@
           <p:cNvPr id="116" name="Google Shape;116;p29:notes">
             <a:extLst>
               <a:ext uri="{FF2B5EF4-FFF2-40B4-BE49-F238E27FC236}">
-                <a16:creationId xmlns:a16="http://schemas.microsoft.com/office/drawing/2014/main" id="{E79410AC-6BCC-B628-C0D6-E78CC17D6385}"/>
+                <a16:creationId xmlns:a16="http://schemas.microsoft.com/office/drawing/2014/main" id="{87226BD4-FB6A-8BE6-17D9-83E2B12CAA5A}"/>
               </a:ext>
             </a:extLst>
           </p:cNvPr>
@@ -5603,7 +5603,7 @@
     </p:spTree>
     <p:extLst>
       <p:ext uri="{BB962C8B-B14F-4D97-AF65-F5344CB8AC3E}">
-        <p14:creationId xmlns:p14="http://schemas.microsoft.com/office/powerpoint/2010/main" val="2871357555"/>
+        <p14:creationId xmlns:p14="http://schemas.microsoft.com/office/powerpoint/2010/main" val="322575517"/>
       </p:ext>
     </p:extLst>
   </p:cSld>
@@ -18183,601 +18183,6 @@
         <p:cNvPr id="1" name="Shape 117">
           <a:extLst>
             <a:ext uri="{FF2B5EF4-FFF2-40B4-BE49-F238E27FC236}">
-              <a16:creationId xmlns:a16="http://schemas.microsoft.com/office/drawing/2014/main" id="{E14E8EE6-0038-1418-13F1-12417E07DF4F}"/>
-            </a:ext>
-          </a:extLst>
-        </p:cNvPr>
-        <p:cNvGrpSpPr/>
-        <p:nvPr/>
-      </p:nvGrpSpPr>
-      <p:grpSpPr>
-        <a:xfrm>
-          <a:off x="0" y="0"/>
-          <a:ext cx="0" cy="0"/>
-          <a:chOff x="0" y="0"/>
-          <a:chExt cx="0" cy="0"/>
-        </a:xfrm>
-      </p:grpSpPr>
-      <p:sp>
-        <p:nvSpPr>
-          <p:cNvPr id="119" name="Google Shape;119;p29">
-            <a:extLst>
-              <a:ext uri="{FF2B5EF4-FFF2-40B4-BE49-F238E27FC236}">
-                <a16:creationId xmlns:a16="http://schemas.microsoft.com/office/drawing/2014/main" id="{961A4CA2-A9F9-5598-09B5-D3C5963C3C95}"/>
-              </a:ext>
-            </a:extLst>
-          </p:cNvPr>
-          <p:cNvSpPr/>
-          <p:nvPr/>
-        </p:nvSpPr>
-        <p:spPr>
-          <a:xfrm rot="10800000" flipH="1">
-            <a:off x="0" y="0"/>
-            <a:ext cx="12192000" cy="868220"/>
-          </a:xfrm>
-          <a:prstGeom prst="rect">
-            <a:avLst/>
-          </a:prstGeom>
-          <a:solidFill>
-            <a:srgbClr val="13294B"/>
-          </a:solidFill>
-          <a:ln>
-            <a:noFill/>
-          </a:ln>
-        </p:spPr>
-        <p:txBody>
-          <a:bodyPr spcFirstLastPara="1" wrap="square" lIns="91425" tIns="45700" rIns="91425" bIns="45700" anchor="ctr" anchorCtr="0">
-            <a:noAutofit/>
-          </a:bodyPr>
-          <a:lstStyle/>
-          <a:p>
-            <a:pPr marL="0" marR="0" lvl="0" indent="0" algn="ctr" rtl="0">
-              <a:lnSpc>
-                <a:spcPct val="100000"/>
-              </a:lnSpc>
-              <a:spcBef>
-                <a:spcPts val="0"/>
-              </a:spcBef>
-              <a:spcAft>
-                <a:spcPts val="0"/>
-              </a:spcAft>
-              <a:buClr>
-                <a:schemeClr val="lt1"/>
-              </a:buClr>
-              <a:buSzPts val="1800"/>
-              <a:buFont typeface="Calibri"/>
-              <a:buNone/>
-            </a:pPr>
-            <a:endParaRPr sz="1800" b="0" i="0" u="none" strike="noStrike" cap="none">
-              <a:solidFill>
-                <a:srgbClr val="13294B"/>
-              </a:solidFill>
-              <a:latin typeface="Calibri"/>
-              <a:ea typeface="Calibri"/>
-              <a:cs typeface="Calibri"/>
-              <a:sym typeface="Calibri"/>
-            </a:endParaRPr>
-          </a:p>
-        </p:txBody>
-      </p:sp>
-      <p:sp>
-        <p:nvSpPr>
-          <p:cNvPr id="120" name="Google Shape;120;p29">
-            <a:extLst>
-              <a:ext uri="{FF2B5EF4-FFF2-40B4-BE49-F238E27FC236}">
-                <a16:creationId xmlns:a16="http://schemas.microsoft.com/office/drawing/2014/main" id="{8022F7F3-70EB-761B-F816-7B2544C0E140}"/>
-              </a:ext>
-            </a:extLst>
-          </p:cNvPr>
-          <p:cNvSpPr txBox="1"/>
-          <p:nvPr/>
-        </p:nvSpPr>
-        <p:spPr>
-          <a:xfrm>
-            <a:off x="376810" y="204051"/>
-            <a:ext cx="10910026" cy="461624"/>
-          </a:xfrm>
-          <a:prstGeom prst="rect">
-            <a:avLst/>
-          </a:prstGeom>
-          <a:noFill/>
-          <a:ln>
-            <a:noFill/>
-          </a:ln>
-        </p:spPr>
-        <p:txBody>
-          <a:bodyPr spcFirstLastPara="1" wrap="square" lIns="91425" tIns="45700" rIns="91425" bIns="45700" anchor="t" anchorCtr="0">
-            <a:spAutoFit/>
-          </a:bodyPr>
-          <a:lstStyle/>
-          <a:p>
-            <a:pPr marL="0" marR="0" lvl="0" indent="0" algn="l" rtl="0">
-              <a:lnSpc>
-                <a:spcPct val="100000"/>
-              </a:lnSpc>
-              <a:spcBef>
-                <a:spcPts val="0"/>
-              </a:spcBef>
-              <a:spcAft>
-                <a:spcPts val="0"/>
-              </a:spcAft>
-              <a:buClr>
-                <a:srgbClr val="000000"/>
-              </a:buClr>
-              <a:buSzPts val="2400"/>
-              <a:buFont typeface="Arial"/>
-              <a:buNone/>
-            </a:pPr>
-            <a:r>
-              <a:rPr lang="en-US" sz="2400" b="0" i="0" u="none" strike="noStrike" cap="none" dirty="0">
-                <a:solidFill>
-                  <a:schemeClr val="lt1"/>
-                </a:solidFill>
-                <a:latin typeface="Arial"/>
-                <a:ea typeface="Arial"/>
-                <a:cs typeface="Arial"/>
-                <a:sym typeface="Arial"/>
-              </a:rPr>
-              <a:t>Controlling an LED</a:t>
-            </a:r>
-            <a:endParaRPr sz="2400" b="0" i="0" u="none" strike="noStrike" cap="none" dirty="0">
-              <a:solidFill>
-                <a:schemeClr val="lt1"/>
-              </a:solidFill>
-              <a:latin typeface="Arial"/>
-              <a:ea typeface="Arial"/>
-              <a:cs typeface="Arial"/>
-              <a:sym typeface="Arial"/>
-            </a:endParaRPr>
-          </a:p>
-        </p:txBody>
-      </p:sp>
-      <p:pic>
-        <p:nvPicPr>
-          <p:cNvPr id="121" name="Google Shape;121;p29">
-            <a:extLst>
-              <a:ext uri="{FF2B5EF4-FFF2-40B4-BE49-F238E27FC236}">
-                <a16:creationId xmlns:a16="http://schemas.microsoft.com/office/drawing/2014/main" id="{8A249E9B-FBB1-AA50-9FF9-4A3E043FC6B1}"/>
-              </a:ext>
-            </a:extLst>
-          </p:cNvPr>
-          <p:cNvPicPr preferRelativeResize="0"/>
-          <p:nvPr/>
-        </p:nvPicPr>
-        <p:blipFill rotWithShape="1">
-          <a:blip r:embed="rId4">
-            <a:alphaModFix/>
-          </a:blip>
-          <a:srcRect/>
-          <a:stretch/>
-        </p:blipFill>
-        <p:spPr>
-          <a:xfrm>
-            <a:off x="11557509" y="233819"/>
-            <a:ext cx="271308" cy="389810"/>
-          </a:xfrm>
-          <a:prstGeom prst="rect">
-            <a:avLst/>
-          </a:prstGeom>
-          <a:noFill/>
-          <a:ln>
-            <a:noFill/>
-          </a:ln>
-        </p:spPr>
-      </p:pic>
-      <p:sp>
-        <p:nvSpPr>
-          <p:cNvPr id="122" name="Google Shape;122;p29">
-            <a:extLst>
-              <a:ext uri="{FF2B5EF4-FFF2-40B4-BE49-F238E27FC236}">
-                <a16:creationId xmlns:a16="http://schemas.microsoft.com/office/drawing/2014/main" id="{545D7D80-37A9-CA3F-9F6E-F6822E9A9E6E}"/>
-              </a:ext>
-            </a:extLst>
-          </p:cNvPr>
-          <p:cNvSpPr txBox="1"/>
-          <p:nvPr/>
-        </p:nvSpPr>
-        <p:spPr>
-          <a:xfrm>
-            <a:off x="9335597" y="6524381"/>
-            <a:ext cx="2473415" cy="230792"/>
-          </a:xfrm>
-          <a:prstGeom prst="rect">
-            <a:avLst/>
-          </a:prstGeom>
-          <a:noFill/>
-          <a:ln>
-            <a:noFill/>
-          </a:ln>
-        </p:spPr>
-        <p:txBody>
-          <a:bodyPr spcFirstLastPara="1" wrap="square" lIns="91425" tIns="45700" rIns="91425" bIns="45700" anchor="t" anchorCtr="0">
-            <a:spAutoFit/>
-          </a:bodyPr>
-          <a:lstStyle/>
-          <a:p>
-            <a:pPr marL="0" marR="0" lvl="0" indent="0" algn="r" rtl="0">
-              <a:lnSpc>
-                <a:spcPct val="100000"/>
-              </a:lnSpc>
-              <a:spcBef>
-                <a:spcPts val="0"/>
-              </a:spcBef>
-              <a:spcAft>
-                <a:spcPts val="0"/>
-              </a:spcAft>
-              <a:buNone/>
-            </a:pPr>
-            <a:r>
-              <a:rPr lang="en-US" sz="900" b="0" i="0" u="none" strike="noStrike" cap="none">
-                <a:solidFill>
-                  <a:srgbClr val="13294B"/>
-                </a:solidFill>
-                <a:latin typeface="Arial"/>
-                <a:ea typeface="Arial"/>
-                <a:cs typeface="Arial"/>
-                <a:sym typeface="Arial"/>
-              </a:rPr>
-              <a:t>GRAINGER ENGINEERING</a:t>
-            </a:r>
-            <a:endParaRPr/>
-          </a:p>
-        </p:txBody>
-      </p:sp>
-      <p:sp>
-        <p:nvSpPr>
-          <p:cNvPr id="123" name="Google Shape;123;p29">
-            <a:extLst>
-              <a:ext uri="{FF2B5EF4-FFF2-40B4-BE49-F238E27FC236}">
-                <a16:creationId xmlns:a16="http://schemas.microsoft.com/office/drawing/2014/main" id="{252594CA-A07F-7DD2-D1A9-3345EE9D00E0}"/>
-              </a:ext>
-            </a:extLst>
-          </p:cNvPr>
-          <p:cNvSpPr txBox="1"/>
-          <p:nvPr/>
-        </p:nvSpPr>
-        <p:spPr>
-          <a:xfrm>
-            <a:off x="376807" y="6524381"/>
-            <a:ext cx="7991337" cy="230792"/>
-          </a:xfrm>
-          <a:prstGeom prst="rect">
-            <a:avLst/>
-          </a:prstGeom>
-          <a:noFill/>
-          <a:ln>
-            <a:noFill/>
-          </a:ln>
-        </p:spPr>
-        <p:txBody>
-          <a:bodyPr spcFirstLastPara="1" wrap="square" lIns="91425" tIns="45700" rIns="91425" bIns="45700" anchor="t" anchorCtr="0">
-            <a:spAutoFit/>
-          </a:bodyPr>
-          <a:lstStyle/>
-          <a:p>
-            <a:pPr marL="0" marR="0" lvl="0" indent="0" algn="l" rtl="0">
-              <a:lnSpc>
-                <a:spcPct val="100000"/>
-              </a:lnSpc>
-              <a:spcBef>
-                <a:spcPts val="0"/>
-              </a:spcBef>
-              <a:spcAft>
-                <a:spcPts val="0"/>
-              </a:spcAft>
-              <a:buNone/>
-            </a:pPr>
-            <a:r>
-              <a:rPr lang="en-US" sz="900" dirty="0">
-                <a:solidFill>
-                  <a:srgbClr val="13294B"/>
-                </a:solidFill>
-              </a:rPr>
-              <a:t>SYSTEMS ENGINEERING </a:t>
-            </a:r>
-            <a:endParaRPr dirty="0"/>
-          </a:p>
-        </p:txBody>
-      </p:sp>
-      <p:grpSp>
-        <p:nvGrpSpPr>
-          <p:cNvPr id="124" name="Google Shape;124;p29">
-            <a:extLst>
-              <a:ext uri="{FF2B5EF4-FFF2-40B4-BE49-F238E27FC236}">
-                <a16:creationId xmlns:a16="http://schemas.microsoft.com/office/drawing/2014/main" id="{C1D884F4-D591-96BF-FBDB-417AB7992224}"/>
-              </a:ext>
-            </a:extLst>
-          </p:cNvPr>
-          <p:cNvGrpSpPr/>
-          <p:nvPr/>
-        </p:nvGrpSpPr>
-        <p:grpSpPr>
-          <a:xfrm>
-            <a:off x="4066674" y="6601537"/>
-            <a:ext cx="5233412" cy="70446"/>
-            <a:chOff x="4033424" y="6601537"/>
-            <a:chExt cx="5233412" cy="70446"/>
-          </a:xfrm>
-        </p:grpSpPr>
-        <p:cxnSp>
-          <p:nvCxnSpPr>
-            <p:cNvPr id="125" name="Google Shape;125;p29">
-              <a:extLst>
-                <a:ext uri="{FF2B5EF4-FFF2-40B4-BE49-F238E27FC236}">
-                  <a16:creationId xmlns:a16="http://schemas.microsoft.com/office/drawing/2014/main" id="{CEFF7A7D-C121-EEC3-5B40-03D6FECBE272}"/>
-                </a:ext>
-              </a:extLst>
-            </p:cNvPr>
-            <p:cNvCxnSpPr/>
-            <p:nvPr/>
-          </p:nvCxnSpPr>
-          <p:spPr>
-            <a:xfrm rot="10800000">
-              <a:off x="4033424" y="6639606"/>
-              <a:ext cx="5164651" cy="0"/>
-            </a:xfrm>
-            <a:prstGeom prst="straightConnector1">
-              <a:avLst/>
-            </a:prstGeom>
-            <a:noFill/>
-            <a:ln w="9525" cap="flat" cmpd="sng">
-              <a:solidFill>
-                <a:srgbClr val="13294B"/>
-              </a:solidFill>
-              <a:prstDash val="solid"/>
-              <a:round/>
-              <a:headEnd type="none" w="sm" len="sm"/>
-              <a:tailEnd type="none" w="sm" len="sm"/>
-            </a:ln>
-          </p:spPr>
-        </p:cxnSp>
-        <p:sp>
-          <p:nvSpPr>
-            <p:cNvPr id="126" name="Google Shape;126;p29">
-              <a:extLst>
-                <a:ext uri="{FF2B5EF4-FFF2-40B4-BE49-F238E27FC236}">
-                  <a16:creationId xmlns:a16="http://schemas.microsoft.com/office/drawing/2014/main" id="{19318CDF-EF6E-9326-3DB5-DDEAB0804AF4}"/>
-                </a:ext>
-              </a:extLst>
-            </p:cNvPr>
-            <p:cNvSpPr/>
-            <p:nvPr/>
-          </p:nvSpPr>
-          <p:spPr>
-            <a:xfrm>
-              <a:off x="9196390" y="6601537"/>
-              <a:ext cx="70446" cy="70446"/>
-            </a:xfrm>
-            <a:prstGeom prst="ellipse">
-              <a:avLst/>
-            </a:prstGeom>
-            <a:solidFill>
-              <a:srgbClr val="13294B"/>
-            </a:solidFill>
-            <a:ln>
-              <a:noFill/>
-            </a:ln>
-          </p:spPr>
-          <p:txBody>
-            <a:bodyPr spcFirstLastPara="1" wrap="square" lIns="91425" tIns="45700" rIns="91425" bIns="45700" anchor="ctr" anchorCtr="0">
-              <a:noAutofit/>
-            </a:bodyPr>
-            <a:lstStyle/>
-            <a:p>
-              <a:pPr marL="0" marR="0" lvl="0" indent="0" algn="ctr" rtl="0">
-                <a:lnSpc>
-                  <a:spcPct val="100000"/>
-                </a:lnSpc>
-                <a:spcBef>
-                  <a:spcPts val="0"/>
-                </a:spcBef>
-                <a:spcAft>
-                  <a:spcPts val="0"/>
-                </a:spcAft>
-                <a:buNone/>
-              </a:pPr>
-              <a:endParaRPr sz="1400" b="0" i="0" u="none" strike="noStrike" cap="none">
-                <a:solidFill>
-                  <a:srgbClr val="13294B"/>
-                </a:solidFill>
-                <a:latin typeface="Arial"/>
-                <a:ea typeface="Arial"/>
-                <a:cs typeface="Arial"/>
-                <a:sym typeface="Arial"/>
-              </a:endParaRPr>
-            </a:p>
-          </p:txBody>
-        </p:sp>
-      </p:grpSp>
-      <p:pic>
-        <p:nvPicPr>
-          <p:cNvPr id="4" name="Online Media 3" title="GPIO Led Control Animation">
-            <a:hlinkClick r:id="" action="ppaction://media"/>
-            <a:extLst>
-              <a:ext uri="{FF2B5EF4-FFF2-40B4-BE49-F238E27FC236}">
-                <a16:creationId xmlns:a16="http://schemas.microsoft.com/office/drawing/2014/main" id="{E92A1532-2B30-59C0-EEE0-EA0927948F96}"/>
-              </a:ext>
-            </a:extLst>
-          </p:cNvPr>
-          <p:cNvPicPr>
-            <a:picLocks noRot="1" noChangeAspect="1"/>
-          </p:cNvPicPr>
-          <p:nvPr>
-            <a:videoFile r:link="rId1"/>
-          </p:nvPr>
-        </p:nvPicPr>
-        <p:blipFill>
-          <a:blip r:embed="rId5"/>
-          <a:stretch>
-            <a:fillRect/>
-          </a:stretch>
-        </p:blipFill>
-        <p:spPr>
-          <a:xfrm>
-            <a:off x="1381988" y="1072145"/>
-            <a:ext cx="9428024" cy="5326846"/>
-          </a:xfrm>
-          <a:prstGeom prst="rect">
-            <a:avLst/>
-          </a:prstGeom>
-        </p:spPr>
-      </p:pic>
-    </p:spTree>
-    <p:extLst>
-      <p:ext uri="{BB962C8B-B14F-4D97-AF65-F5344CB8AC3E}">
-        <p14:creationId xmlns:p14="http://schemas.microsoft.com/office/powerpoint/2010/main" val="2257794054"/>
-      </p:ext>
-    </p:extLst>
-  </p:cSld>
-  <p:clrMapOvr>
-    <a:masterClrMapping/>
-  </p:clrMapOvr>
-  <p:timing>
-    <p:tnLst>
-      <p:par>
-        <p:cTn id="1" dur="indefinite" restart="never" nodeType="tmRoot">
-          <p:childTnLst>
-            <p:seq concurrent="1" nextAc="seek">
-              <p:cTn id="2" dur="indefinite" nodeType="mainSeq">
-                <p:childTnLst>
-                  <p:par>
-                    <p:cTn id="3" fill="hold">
-                      <p:stCondLst>
-                        <p:cond delay="indefinite"/>
-                      </p:stCondLst>
-                      <p:childTnLst>
-                        <p:par>
-                          <p:cTn id="4" fill="hold">
-                            <p:stCondLst>
-                              <p:cond delay="0"/>
-                            </p:stCondLst>
-                            <p:childTnLst>
-                              <p:par>
-                                <p:cTn id="5" presetID="1" presetClass="mediacall" presetSubtype="0" fill="hold" nodeType="clickEffect">
-                                  <p:stCondLst>
-                                    <p:cond delay="0"/>
-                                  </p:stCondLst>
-                                  <p:childTnLst>
-                                    <p:cmd type="call" cmd="playFrom(0.0)">
-                                      <p:cBhvr>
-                                        <p:cTn id="6" dur="1" fill="hold"/>
-                                        <p:tgtEl>
-                                          <p:spTgt spid="4"/>
-                                        </p:tgtEl>
-                                      </p:cBhvr>
-                                    </p:cmd>
-                                  </p:childTnLst>
-                                </p:cTn>
-                              </p:par>
-                            </p:childTnLst>
-                          </p:cTn>
-                        </p:par>
-                      </p:childTnLst>
-                    </p:cTn>
-                  </p:par>
-                </p:childTnLst>
-              </p:cTn>
-              <p:prevCondLst>
-                <p:cond evt="onPrev" delay="0">
-                  <p:tgtEl>
-                    <p:sldTgt/>
-                  </p:tgtEl>
-                </p:cond>
-              </p:prevCondLst>
-              <p:nextCondLst>
-                <p:cond evt="onNext" delay="0">
-                  <p:tgtEl>
-                    <p:sldTgt/>
-                  </p:tgtEl>
-                </p:cond>
-              </p:nextCondLst>
-            </p:seq>
-            <p:video>
-              <p:cMediaNode vol="80000">
-                <p:cTn id="7" fill="hold" display="0">
-                  <p:stCondLst>
-                    <p:cond delay="indefinite"/>
-                  </p:stCondLst>
-                </p:cTn>
-                <p:tgtEl>
-                  <p:spTgt spid="4"/>
-                </p:tgtEl>
-              </p:cMediaNode>
-            </p:video>
-            <p:seq concurrent="1" nextAc="seek">
-              <p:cTn id="8" restart="whenNotActive" fill="hold" evtFilter="cancelBubble" nodeType="interactiveSeq">
-                <p:stCondLst>
-                  <p:cond evt="onClick" delay="0">
-                    <p:tgtEl>
-                      <p:spTgt spid="4"/>
-                    </p:tgtEl>
-                  </p:cond>
-                </p:stCondLst>
-                <p:endSync evt="end" delay="0">
-                  <p:rtn val="all"/>
-                </p:endSync>
-                <p:childTnLst>
-                  <p:par>
-                    <p:cTn id="9" fill="hold">
-                      <p:stCondLst>
-                        <p:cond delay="0"/>
-                      </p:stCondLst>
-                      <p:childTnLst>
-                        <p:par>
-                          <p:cTn id="10" fill="hold">
-                            <p:stCondLst>
-                              <p:cond delay="0"/>
-                            </p:stCondLst>
-                            <p:childTnLst>
-                              <p:par>
-                                <p:cTn id="11" presetID="2" presetClass="mediacall" presetSubtype="0" fill="hold" nodeType="clickEffect">
-                                  <p:stCondLst>
-                                    <p:cond delay="0"/>
-                                  </p:stCondLst>
-                                  <p:childTnLst>
-                                    <p:cmd type="call" cmd="togglePause">
-                                      <p:cBhvr>
-                                        <p:cTn id="12" dur="1" fill="hold"/>
-                                        <p:tgtEl>
-                                          <p:spTgt spid="4"/>
-                                        </p:tgtEl>
-                                      </p:cBhvr>
-                                    </p:cmd>
-                                  </p:childTnLst>
-                                </p:cTn>
-                              </p:par>
-                            </p:childTnLst>
-                          </p:cTn>
-                        </p:par>
-                      </p:childTnLst>
-                    </p:cTn>
-                  </p:par>
-                </p:childTnLst>
-              </p:cTn>
-              <p:nextCondLst>
-                <p:cond evt="onClick" delay="0">
-                  <p:tgtEl>
-                    <p:spTgt spid="4"/>
-                  </p:tgtEl>
-                </p:cond>
-              </p:nextCondLst>
-            </p:seq>
-          </p:childTnLst>
-        </p:cTn>
-      </p:par>
-    </p:tnLst>
-  </p:timing>
-</p:sld>
-</file>
-
-<file path=ppt/slides/slide11.xml><?xml version="1.0" encoding="utf-8"?>
-<p:sld xmlns:a="http://schemas.openxmlformats.org/drawingml/2006/main" xmlns:r="http://schemas.openxmlformats.org/officeDocument/2006/relationships" xmlns:p="http://schemas.openxmlformats.org/presentationml/2006/main">
-  <p:cSld>
-    <p:spTree>
-      <p:nvGrpSpPr>
-        <p:cNvPr id="1" name="Shape 117">
-          <a:extLst>
-            <a:ext uri="{FF2B5EF4-FFF2-40B4-BE49-F238E27FC236}">
               <a16:creationId xmlns:a16="http://schemas.microsoft.com/office/drawing/2014/main" id="{FBFEFDC9-165B-8F98-746F-08BA7C96ABB7}"/>
             </a:ext>
           </a:extLst>
@@ -19564,7 +18969,7 @@
 </p:sld>
 </file>
 
-<file path=ppt/slides/slide12.xml><?xml version="1.0" encoding="utf-8"?>
+<file path=ppt/slides/slide11.xml><?xml version="1.0" encoding="utf-8"?>
 <p:sld xmlns:a="http://schemas.openxmlformats.org/drawingml/2006/main" xmlns:r="http://schemas.openxmlformats.org/officeDocument/2006/relationships" xmlns:p="http://schemas.openxmlformats.org/presentationml/2006/main">
   <p:cSld>
     <p:spTree>
@@ -20460,7 +19865,7 @@
 </p:sld>
 </file>
 
-<file path=ppt/slides/slide13.xml><?xml version="1.0" encoding="utf-8"?>
+<file path=ppt/slides/slide12.xml><?xml version="1.0" encoding="utf-8"?>
 <p:sld xmlns:a="http://schemas.openxmlformats.org/drawingml/2006/main" xmlns:r="http://schemas.openxmlformats.org/officeDocument/2006/relationships" xmlns:p="http://schemas.openxmlformats.org/presentationml/2006/main">
   <p:cSld>
     <p:spTree>
@@ -21870,7 +21275,7 @@
 </p:sld>
 </file>
 
-<file path=ppt/slides/slide14.xml><?xml version="1.0" encoding="utf-8"?>
+<file path=ppt/slides/slide13.xml><?xml version="1.0" encoding="utf-8"?>
 <p:sld xmlns:a="http://schemas.openxmlformats.org/drawingml/2006/main" xmlns:r="http://schemas.openxmlformats.org/officeDocument/2006/relationships" xmlns:p="http://schemas.openxmlformats.org/presentationml/2006/main">
   <p:cSld>
     <p:spTree>
@@ -22742,6 +22147,42 @@
           </a:p>
         </p:txBody>
       </p:sp>
+      <p:sp>
+        <p:nvSpPr>
+          <p:cNvPr id="6" name="TextBox 5">
+            <a:extLst>
+              <a:ext uri="{FF2B5EF4-FFF2-40B4-BE49-F238E27FC236}">
+                <a16:creationId xmlns:a16="http://schemas.microsoft.com/office/drawing/2014/main" id="{A276B762-ADEB-3430-5867-F6AD54820357}"/>
+              </a:ext>
+            </a:extLst>
+          </p:cNvPr>
+          <p:cNvSpPr txBox="1"/>
+          <p:nvPr/>
+        </p:nvSpPr>
+        <p:spPr>
+          <a:xfrm>
+            <a:off x="6712086" y="2769140"/>
+            <a:ext cx="1193259" cy="523220"/>
+          </a:xfrm>
+          <a:prstGeom prst="rect">
+            <a:avLst/>
+          </a:prstGeom>
+          <a:noFill/>
+        </p:spPr>
+        <p:txBody>
+          <a:bodyPr wrap="square" rtlCol="0">
+            <a:spAutoFit/>
+          </a:bodyPr>
+          <a:lstStyle/>
+          <a:p>
+            <a:pPr algn="ctr"/>
+            <a:r>
+              <a:rPr lang="en-US" dirty="0"/>
+              <a:t>Operational Amplifier</a:t>
+            </a:r>
+          </a:p>
+        </p:txBody>
+      </p:sp>
     </p:spTree>
     <p:extLst>
       <p:ext uri="{BB962C8B-B14F-4D97-AF65-F5344CB8AC3E}">
@@ -22755,7 +22196,7 @@
 </p:sld>
 </file>
 
-<file path=ppt/slides/slide15.xml><?xml version="1.0" encoding="utf-8"?>
+<file path=ppt/slides/slide14.xml><?xml version="1.0" encoding="utf-8"?>
 <p:sld xmlns:a="http://schemas.openxmlformats.org/drawingml/2006/main" xmlns:r="http://schemas.openxmlformats.org/officeDocument/2006/relationships" xmlns:p="http://schemas.openxmlformats.org/presentationml/2006/main">
   <p:cSld>
     <p:spTree>
@@ -23564,6 +23005,42 @@
           </a:p>
         </p:txBody>
       </p:sp>
+      <p:sp>
+        <p:nvSpPr>
+          <p:cNvPr id="6" name="TextBox 5">
+            <a:extLst>
+              <a:ext uri="{FF2B5EF4-FFF2-40B4-BE49-F238E27FC236}">
+                <a16:creationId xmlns:a16="http://schemas.microsoft.com/office/drawing/2014/main" id="{76E5ABC5-E652-9C78-A670-10888E14AD7C}"/>
+              </a:ext>
+            </a:extLst>
+          </p:cNvPr>
+          <p:cNvSpPr txBox="1"/>
+          <p:nvPr/>
+        </p:nvSpPr>
+        <p:spPr>
+          <a:xfrm>
+            <a:off x="6712086" y="2769140"/>
+            <a:ext cx="1193259" cy="523220"/>
+          </a:xfrm>
+          <a:prstGeom prst="rect">
+            <a:avLst/>
+          </a:prstGeom>
+          <a:noFill/>
+        </p:spPr>
+        <p:txBody>
+          <a:bodyPr wrap="square" rtlCol="0">
+            <a:spAutoFit/>
+          </a:bodyPr>
+          <a:lstStyle/>
+          <a:p>
+            <a:pPr algn="ctr"/>
+            <a:r>
+              <a:rPr lang="en-US" dirty="0"/>
+              <a:t>Operational Amplifier</a:t>
+            </a:r>
+          </a:p>
+        </p:txBody>
+      </p:sp>
     </p:spTree>
     <p:extLst>
       <p:ext uri="{BB962C8B-B14F-4D97-AF65-F5344CB8AC3E}">
@@ -23577,7 +23054,7 @@
 </p:sld>
 </file>
 
-<file path=ppt/slides/slide16.xml><?xml version="1.0" encoding="utf-8"?>
+<file path=ppt/slides/slide15.xml><?xml version="1.0" encoding="utf-8"?>
 <p:sld xmlns:a="http://schemas.openxmlformats.org/drawingml/2006/main" xmlns:r="http://schemas.openxmlformats.org/officeDocument/2006/relationships" xmlns:p="http://schemas.openxmlformats.org/presentationml/2006/main">
   <p:cSld>
     <p:spTree>
@@ -24405,10 +23882,963 @@
           </a:p>
         </p:txBody>
       </p:sp>
+      <p:sp>
+        <p:nvSpPr>
+          <p:cNvPr id="6" name="TextBox 5">
+            <a:extLst>
+              <a:ext uri="{FF2B5EF4-FFF2-40B4-BE49-F238E27FC236}">
+                <a16:creationId xmlns:a16="http://schemas.microsoft.com/office/drawing/2014/main" id="{DD61276D-E309-C3EC-6C69-08351058263B}"/>
+              </a:ext>
+            </a:extLst>
+          </p:cNvPr>
+          <p:cNvSpPr txBox="1"/>
+          <p:nvPr/>
+        </p:nvSpPr>
+        <p:spPr>
+          <a:xfrm>
+            <a:off x="6712086" y="2769140"/>
+            <a:ext cx="1193259" cy="523220"/>
+          </a:xfrm>
+          <a:prstGeom prst="rect">
+            <a:avLst/>
+          </a:prstGeom>
+          <a:noFill/>
+        </p:spPr>
+        <p:txBody>
+          <a:bodyPr wrap="square" rtlCol="0">
+            <a:spAutoFit/>
+          </a:bodyPr>
+          <a:lstStyle/>
+          <a:p>
+            <a:pPr algn="ctr"/>
+            <a:r>
+              <a:rPr lang="en-US" dirty="0"/>
+              <a:t>Operational Amplifier</a:t>
+            </a:r>
+          </a:p>
+        </p:txBody>
+      </p:sp>
     </p:spTree>
     <p:extLst>
       <p:ext uri="{BB962C8B-B14F-4D97-AF65-F5344CB8AC3E}">
         <p14:creationId xmlns:p14="http://schemas.microsoft.com/office/powerpoint/2010/main" val="1217446402"/>
+      </p:ext>
+    </p:extLst>
+  </p:cSld>
+  <p:clrMapOvr>
+    <a:masterClrMapping/>
+  </p:clrMapOvr>
+</p:sld>
+</file>
+
+<file path=ppt/slides/slide16.xml><?xml version="1.0" encoding="utf-8"?>
+<p:sld xmlns:a="http://schemas.openxmlformats.org/drawingml/2006/main" xmlns:r="http://schemas.openxmlformats.org/officeDocument/2006/relationships" xmlns:p="http://schemas.openxmlformats.org/presentationml/2006/main">
+  <p:cSld>
+    <p:spTree>
+      <p:nvGrpSpPr>
+        <p:cNvPr id="1" name="Shape 117">
+          <a:extLst>
+            <a:ext uri="{FF2B5EF4-FFF2-40B4-BE49-F238E27FC236}">
+              <a16:creationId xmlns:a16="http://schemas.microsoft.com/office/drawing/2014/main" id="{C755900A-1584-865A-E16E-977CAC8219FB}"/>
+            </a:ext>
+          </a:extLst>
+        </p:cNvPr>
+        <p:cNvGrpSpPr/>
+        <p:nvPr/>
+      </p:nvGrpSpPr>
+      <p:grpSpPr>
+        <a:xfrm>
+          <a:off x="0" y="0"/>
+          <a:ext cx="0" cy="0"/>
+          <a:chOff x="0" y="0"/>
+          <a:chExt cx="0" cy="0"/>
+        </a:xfrm>
+      </p:grpSpPr>
+      <p:sp>
+        <p:nvSpPr>
+          <p:cNvPr id="118" name="Google Shape;118;p29">
+            <a:extLst>
+              <a:ext uri="{FF2B5EF4-FFF2-40B4-BE49-F238E27FC236}">
+                <a16:creationId xmlns:a16="http://schemas.microsoft.com/office/drawing/2014/main" id="{56E80A18-9A3D-C8B6-B42A-1FBA3D7DB142}"/>
+              </a:ext>
+            </a:extLst>
+          </p:cNvPr>
+          <p:cNvSpPr txBox="1">
+            <a:spLocks noGrp="1"/>
+          </p:cNvSpPr>
+          <p:nvPr>
+            <p:ph type="body" idx="1"/>
+          </p:nvPr>
+        </p:nvSpPr>
+        <p:spPr>
+          <a:xfrm>
+            <a:off x="376809" y="1334279"/>
+            <a:ext cx="11177401" cy="5102780"/>
+          </a:xfrm>
+          <a:prstGeom prst="rect">
+            <a:avLst/>
+          </a:prstGeom>
+          <a:noFill/>
+          <a:ln>
+            <a:noFill/>
+          </a:ln>
+        </p:spPr>
+        <p:txBody>
+          <a:bodyPr spcFirstLastPara="1" wrap="square" lIns="91425" tIns="45700" rIns="91425" bIns="45700" anchor="t" anchorCtr="0">
+            <a:noAutofit/>
+          </a:bodyPr>
+          <a:lstStyle/>
+          <a:p>
+            <a:pPr marL="0" lvl="0" indent="0" algn="l" rtl="0">
+              <a:lnSpc>
+                <a:spcPct val="100000"/>
+              </a:lnSpc>
+              <a:spcBef>
+                <a:spcPts val="0"/>
+              </a:spcBef>
+              <a:spcAft>
+                <a:spcPts val="0"/>
+              </a:spcAft>
+              <a:buSzPts val="3000"/>
+              <a:buNone/>
+            </a:pPr>
+            <a:r>
+              <a:rPr lang="en-US" sz="1800" dirty="0">
+                <a:solidFill>
+                  <a:schemeClr val="dk1"/>
+                </a:solidFill>
+                <a:latin typeface="+mj-lt"/>
+                <a:ea typeface="Arial"/>
+                <a:cs typeface="Arial"/>
+                <a:sym typeface="Arial"/>
+              </a:rPr>
+              <a:t>Why would we run out of power?</a:t>
+            </a:r>
+          </a:p>
+          <a:p>
+            <a:pPr marL="0" lvl="0" indent="0" algn="l" rtl="0">
+              <a:lnSpc>
+                <a:spcPct val="100000"/>
+              </a:lnSpc>
+              <a:spcBef>
+                <a:spcPts val="0"/>
+              </a:spcBef>
+              <a:spcAft>
+                <a:spcPts val="0"/>
+              </a:spcAft>
+              <a:buSzPts val="3000"/>
+              <a:buNone/>
+            </a:pPr>
+            <a:r>
+              <a:rPr lang="en-US" sz="1800" dirty="0">
+                <a:solidFill>
+                  <a:schemeClr val="dk1"/>
+                </a:solidFill>
+                <a:latin typeface="+mj-lt"/>
+                <a:ea typeface="Arial"/>
+                <a:cs typeface="Arial"/>
+                <a:sym typeface="Arial"/>
+              </a:rPr>
+              <a:t>Each GPIO output has its own transistors and can safely source or sink only a limited current.</a:t>
+            </a:r>
+          </a:p>
+          <a:p>
+            <a:pPr marL="0" lvl="0" indent="0" algn="l" rtl="0">
+              <a:lnSpc>
+                <a:spcPct val="100000"/>
+              </a:lnSpc>
+              <a:spcBef>
+                <a:spcPts val="0"/>
+              </a:spcBef>
+              <a:spcAft>
+                <a:spcPts val="0"/>
+              </a:spcAft>
+              <a:buSzPts val="3000"/>
+              <a:buNone/>
+            </a:pPr>
+            <a:endParaRPr lang="en-US" sz="1800" dirty="0">
+              <a:latin typeface="+mj-lt"/>
+              <a:ea typeface="Arial"/>
+              <a:cs typeface="Arial"/>
+              <a:sym typeface="Arial"/>
+            </a:endParaRPr>
+          </a:p>
+          <a:p>
+            <a:pPr marL="0" lvl="0" indent="0" algn="l" rtl="0">
+              <a:lnSpc>
+                <a:spcPct val="100000"/>
+              </a:lnSpc>
+              <a:spcBef>
+                <a:spcPts val="0"/>
+              </a:spcBef>
+              <a:spcAft>
+                <a:spcPts val="0"/>
+              </a:spcAft>
+              <a:buSzPts val="3000"/>
+              <a:buNone/>
+            </a:pPr>
+            <a:r>
+              <a:rPr lang="en-US" sz="1800" dirty="0">
+                <a:solidFill>
+                  <a:schemeClr val="dk1"/>
+                </a:solidFill>
+                <a:latin typeface="+mj-lt"/>
+                <a:ea typeface="Arial"/>
+                <a:cs typeface="Arial"/>
+                <a:sym typeface="Arial"/>
+              </a:rPr>
+              <a:t>However, all GPIOs draw that current from shared internal power and ground networks inside the chip.</a:t>
+            </a:r>
+          </a:p>
+          <a:p>
+            <a:pPr marL="0" lvl="0" indent="0" algn="l" rtl="0">
+              <a:lnSpc>
+                <a:spcPct val="100000"/>
+              </a:lnSpc>
+              <a:spcBef>
+                <a:spcPts val="0"/>
+              </a:spcBef>
+              <a:spcAft>
+                <a:spcPts val="0"/>
+              </a:spcAft>
+              <a:buSzPts val="3000"/>
+              <a:buNone/>
+            </a:pPr>
+            <a:endParaRPr lang="en-US" sz="1800" dirty="0">
+              <a:latin typeface="+mj-lt"/>
+              <a:ea typeface="Arial"/>
+              <a:cs typeface="Arial"/>
+              <a:sym typeface="Arial"/>
+            </a:endParaRPr>
+          </a:p>
+          <a:p>
+            <a:pPr marL="0" lvl="0" indent="0" algn="l" rtl="0">
+              <a:lnSpc>
+                <a:spcPct val="100000"/>
+              </a:lnSpc>
+              <a:spcBef>
+                <a:spcPts val="0"/>
+              </a:spcBef>
+              <a:spcAft>
+                <a:spcPts val="0"/>
+              </a:spcAft>
+              <a:buSzPts val="3000"/>
+              <a:buNone/>
+            </a:pPr>
+            <a:r>
+              <a:rPr lang="en-US" sz="1800" dirty="0">
+                <a:solidFill>
+                  <a:schemeClr val="dk1"/>
+                </a:solidFill>
+                <a:latin typeface="+mj-lt"/>
+                <a:ea typeface="Arial"/>
+                <a:cs typeface="Arial"/>
+                <a:sym typeface="Arial"/>
+              </a:rPr>
+              <a:t>Even if each individual pin is within its limit, the sum of all GPIO currents can exceed what the silicon, bond wires, or package can safely carry.</a:t>
+            </a:r>
+          </a:p>
+          <a:p>
+            <a:pPr marL="0" lvl="0" indent="0" algn="l" rtl="0">
+              <a:lnSpc>
+                <a:spcPct val="100000"/>
+              </a:lnSpc>
+              <a:spcBef>
+                <a:spcPts val="0"/>
+              </a:spcBef>
+              <a:spcAft>
+                <a:spcPts val="0"/>
+              </a:spcAft>
+              <a:buSzPts val="3000"/>
+              <a:buNone/>
+            </a:pPr>
+            <a:endParaRPr lang="en-US" sz="1800" dirty="0">
+              <a:latin typeface="+mj-lt"/>
+              <a:ea typeface="Arial"/>
+              <a:cs typeface="Arial"/>
+              <a:sym typeface="Arial"/>
+            </a:endParaRPr>
+          </a:p>
+          <a:p>
+            <a:pPr marL="0" lvl="0" indent="0" algn="l" rtl="0">
+              <a:lnSpc>
+                <a:spcPct val="100000"/>
+              </a:lnSpc>
+              <a:spcBef>
+                <a:spcPts val="0"/>
+              </a:spcBef>
+              <a:spcAft>
+                <a:spcPts val="0"/>
+              </a:spcAft>
+              <a:buSzPts val="3000"/>
+              <a:buNone/>
+            </a:pPr>
+            <a:r>
+              <a:rPr lang="en-US" sz="1800" dirty="0">
+                <a:solidFill>
+                  <a:schemeClr val="dk1"/>
+                </a:solidFill>
+                <a:latin typeface="+mj-lt"/>
+                <a:ea typeface="Arial"/>
+                <a:cs typeface="Arial"/>
+                <a:sym typeface="Arial"/>
+              </a:rPr>
+              <a:t>This is why microcontrollers specify both per-pin and total GPIO current limits, and why </a:t>
+            </a:r>
+            <a:r>
+              <a:rPr lang="en-US" sz="1800" b="1" dirty="0">
+                <a:solidFill>
+                  <a:schemeClr val="dk1"/>
+                </a:solidFill>
+                <a:latin typeface="+mj-lt"/>
+                <a:ea typeface="Arial"/>
+                <a:cs typeface="Arial"/>
+                <a:sym typeface="Arial"/>
+              </a:rPr>
+              <a:t>GPIOs must never be used as power supplies</a:t>
+            </a:r>
+            <a:r>
+              <a:rPr lang="en-US" sz="1800" dirty="0">
+                <a:solidFill>
+                  <a:schemeClr val="dk1"/>
+                </a:solidFill>
+                <a:latin typeface="+mj-lt"/>
+                <a:ea typeface="Arial"/>
+                <a:cs typeface="Arial"/>
+                <a:sym typeface="Arial"/>
+              </a:rPr>
+              <a:t>.</a:t>
+            </a:r>
+          </a:p>
+          <a:p>
+            <a:pPr marL="0" lvl="0" indent="0" algn="l" rtl="0">
+              <a:lnSpc>
+                <a:spcPct val="100000"/>
+              </a:lnSpc>
+              <a:spcBef>
+                <a:spcPts val="0"/>
+              </a:spcBef>
+              <a:spcAft>
+                <a:spcPts val="0"/>
+              </a:spcAft>
+              <a:buSzPts val="3000"/>
+              <a:buNone/>
+            </a:pPr>
+            <a:endParaRPr lang="en-US" sz="1800" dirty="0">
+              <a:latin typeface="+mj-lt"/>
+              <a:ea typeface="Arial"/>
+              <a:cs typeface="Arial"/>
+              <a:sym typeface="Arial"/>
+            </a:endParaRPr>
+          </a:p>
+          <a:p>
+            <a:pPr marL="0" lvl="0" indent="0">
+              <a:lnSpc>
+                <a:spcPct val="100000"/>
+              </a:lnSpc>
+              <a:spcBef>
+                <a:spcPts val="0"/>
+              </a:spcBef>
+              <a:buSzPts val="3000"/>
+              <a:buNone/>
+            </a:pPr>
+            <a:r>
+              <a:rPr lang="en-US" sz="1800" dirty="0">
+                <a:latin typeface="+mj-lt"/>
+              </a:rPr>
+              <a:t>Think of each GPIO as a faucet drawing water from the same pipe.</a:t>
+            </a:r>
+          </a:p>
+          <a:p>
+            <a:pPr marL="285750" indent="-285750">
+              <a:lnSpc>
+                <a:spcPct val="100000"/>
+              </a:lnSpc>
+              <a:spcBef>
+                <a:spcPts val="0"/>
+              </a:spcBef>
+              <a:buSzPts val="3000"/>
+            </a:pPr>
+            <a:r>
+              <a:rPr lang="en-US" sz="1800" dirty="0">
+                <a:solidFill>
+                  <a:schemeClr val="dk1"/>
+                </a:solidFill>
+                <a:latin typeface="+mj-lt"/>
+                <a:ea typeface="Arial"/>
+                <a:cs typeface="Arial"/>
+                <a:sym typeface="Arial"/>
+              </a:rPr>
+              <a:t>Each faucet has a </a:t>
+            </a:r>
+            <a:r>
+              <a:rPr lang="en-US" sz="1800" b="1" dirty="0">
+                <a:solidFill>
+                  <a:schemeClr val="dk1"/>
+                </a:solidFill>
+                <a:latin typeface="+mj-lt"/>
+                <a:ea typeface="Arial"/>
+                <a:cs typeface="Arial"/>
+                <a:sym typeface="Arial"/>
+              </a:rPr>
+              <a:t>local limit </a:t>
+            </a:r>
+            <a:r>
+              <a:rPr lang="en-US" sz="1800" dirty="0">
+                <a:solidFill>
+                  <a:schemeClr val="dk1"/>
+                </a:solidFill>
+                <a:latin typeface="+mj-lt"/>
+                <a:ea typeface="Arial"/>
+                <a:cs typeface="Arial"/>
+                <a:sym typeface="Arial"/>
+              </a:rPr>
+              <a:t>(per-pin current)</a:t>
+            </a:r>
+          </a:p>
+          <a:p>
+            <a:pPr marL="285750" indent="-285750">
+              <a:lnSpc>
+                <a:spcPct val="100000"/>
+              </a:lnSpc>
+              <a:spcBef>
+                <a:spcPts val="0"/>
+              </a:spcBef>
+              <a:buSzPts val="3000"/>
+            </a:pPr>
+            <a:r>
+              <a:rPr lang="en-US" sz="1800" dirty="0">
+                <a:solidFill>
+                  <a:schemeClr val="dk1"/>
+                </a:solidFill>
+                <a:latin typeface="+mj-lt"/>
+                <a:ea typeface="Arial"/>
+                <a:cs typeface="Arial"/>
+                <a:sym typeface="Arial"/>
+              </a:rPr>
+              <a:t>The pipe has a </a:t>
+            </a:r>
+            <a:r>
+              <a:rPr lang="en-US" sz="1800" b="1" dirty="0">
+                <a:solidFill>
+                  <a:schemeClr val="dk1"/>
+                </a:solidFill>
+                <a:latin typeface="+mj-lt"/>
+                <a:ea typeface="Arial"/>
+                <a:cs typeface="Arial"/>
+                <a:sym typeface="Arial"/>
+              </a:rPr>
+              <a:t>global flow limit </a:t>
+            </a:r>
+            <a:r>
+              <a:rPr lang="en-US" sz="1800" dirty="0">
+                <a:solidFill>
+                  <a:schemeClr val="dk1"/>
+                </a:solidFill>
+                <a:latin typeface="+mj-lt"/>
+                <a:ea typeface="Arial"/>
+                <a:cs typeface="Arial"/>
+                <a:sym typeface="Arial"/>
+              </a:rPr>
+              <a:t>(total GPIO current)</a:t>
+            </a:r>
+          </a:p>
+          <a:p>
+            <a:pPr marL="0" indent="0">
+              <a:lnSpc>
+                <a:spcPct val="100000"/>
+              </a:lnSpc>
+              <a:spcBef>
+                <a:spcPts val="0"/>
+              </a:spcBef>
+              <a:buSzPts val="3000"/>
+              <a:buNone/>
+            </a:pPr>
+            <a:r>
+              <a:rPr lang="en-US" sz="1800" dirty="0">
+                <a:solidFill>
+                  <a:schemeClr val="dk1"/>
+                </a:solidFill>
+                <a:latin typeface="+mj-lt"/>
+                <a:ea typeface="Arial"/>
+                <a:cs typeface="Arial"/>
+                <a:sym typeface="Arial"/>
+              </a:rPr>
+              <a:t>Opening too many faucets:</a:t>
+            </a:r>
+          </a:p>
+          <a:p>
+            <a:pPr marL="285750" indent="-285750">
+              <a:lnSpc>
+                <a:spcPct val="100000"/>
+              </a:lnSpc>
+              <a:spcBef>
+                <a:spcPts val="0"/>
+              </a:spcBef>
+              <a:buSzPts val="3000"/>
+            </a:pPr>
+            <a:r>
+              <a:rPr lang="en-US" sz="1800" dirty="0">
+                <a:solidFill>
+                  <a:schemeClr val="dk1"/>
+                </a:solidFill>
+                <a:latin typeface="+mj-lt"/>
+                <a:ea typeface="Arial"/>
+                <a:cs typeface="Arial"/>
+                <a:sym typeface="Arial"/>
+              </a:rPr>
+              <a:t>Reduces pressure</a:t>
+            </a:r>
+          </a:p>
+          <a:p>
+            <a:pPr marL="285750" indent="-285750">
+              <a:lnSpc>
+                <a:spcPct val="100000"/>
+              </a:lnSpc>
+              <a:spcBef>
+                <a:spcPts val="0"/>
+              </a:spcBef>
+              <a:buSzPts val="3000"/>
+            </a:pPr>
+            <a:r>
+              <a:rPr lang="en-US" sz="1800" dirty="0">
+                <a:solidFill>
+                  <a:schemeClr val="dk1"/>
+                </a:solidFill>
+                <a:latin typeface="+mj-lt"/>
+                <a:ea typeface="Arial"/>
+                <a:cs typeface="Arial"/>
+                <a:sym typeface="Arial"/>
+              </a:rPr>
+              <a:t>Stresses the pipe</a:t>
+            </a:r>
+          </a:p>
+          <a:p>
+            <a:pPr marL="285750" indent="-285750">
+              <a:lnSpc>
+                <a:spcPct val="100000"/>
+              </a:lnSpc>
+              <a:spcBef>
+                <a:spcPts val="0"/>
+              </a:spcBef>
+              <a:buSzPts val="3000"/>
+            </a:pPr>
+            <a:r>
+              <a:rPr lang="en-US" sz="1800" dirty="0">
+                <a:solidFill>
+                  <a:schemeClr val="dk1"/>
+                </a:solidFill>
+                <a:latin typeface="+mj-lt"/>
+                <a:ea typeface="Arial"/>
+                <a:cs typeface="Arial"/>
+                <a:sym typeface="Arial"/>
+              </a:rPr>
+              <a:t>Causes failure elsewhere</a:t>
+            </a:r>
+            <a:endParaRPr lang="en-US" sz="1800" dirty="0">
+              <a:latin typeface="+mj-lt"/>
+              <a:ea typeface="Arial"/>
+              <a:cs typeface="Arial"/>
+              <a:sym typeface="Arial"/>
+            </a:endParaRPr>
+          </a:p>
+        </p:txBody>
+      </p:sp>
+      <p:sp>
+        <p:nvSpPr>
+          <p:cNvPr id="119" name="Google Shape;119;p29">
+            <a:extLst>
+              <a:ext uri="{FF2B5EF4-FFF2-40B4-BE49-F238E27FC236}">
+                <a16:creationId xmlns:a16="http://schemas.microsoft.com/office/drawing/2014/main" id="{D5E40B6D-570B-BDCE-8559-6635E3508B19}"/>
+              </a:ext>
+            </a:extLst>
+          </p:cNvPr>
+          <p:cNvSpPr/>
+          <p:nvPr/>
+        </p:nvSpPr>
+        <p:spPr>
+          <a:xfrm rot="10800000" flipH="1">
+            <a:off x="0" y="0"/>
+            <a:ext cx="12192000" cy="868220"/>
+          </a:xfrm>
+          <a:prstGeom prst="rect">
+            <a:avLst/>
+          </a:prstGeom>
+          <a:solidFill>
+            <a:srgbClr val="13294B"/>
+          </a:solidFill>
+          <a:ln>
+            <a:noFill/>
+          </a:ln>
+        </p:spPr>
+        <p:txBody>
+          <a:bodyPr spcFirstLastPara="1" wrap="square" lIns="91425" tIns="45700" rIns="91425" bIns="45700" anchor="ctr" anchorCtr="0">
+            <a:noAutofit/>
+          </a:bodyPr>
+          <a:lstStyle/>
+          <a:p>
+            <a:pPr marL="0" marR="0" lvl="0" indent="0" algn="ctr" rtl="0">
+              <a:lnSpc>
+                <a:spcPct val="100000"/>
+              </a:lnSpc>
+              <a:spcBef>
+                <a:spcPts val="0"/>
+              </a:spcBef>
+              <a:spcAft>
+                <a:spcPts val="0"/>
+              </a:spcAft>
+              <a:buClr>
+                <a:schemeClr val="lt1"/>
+              </a:buClr>
+              <a:buSzPts val="1800"/>
+              <a:buFont typeface="Calibri"/>
+              <a:buNone/>
+            </a:pPr>
+            <a:endParaRPr sz="1800" b="0" i="0" u="none" strike="noStrike" cap="none">
+              <a:solidFill>
+                <a:srgbClr val="13294B"/>
+              </a:solidFill>
+              <a:latin typeface="Calibri"/>
+              <a:ea typeface="Calibri"/>
+              <a:cs typeface="Calibri"/>
+              <a:sym typeface="Calibri"/>
+            </a:endParaRPr>
+          </a:p>
+        </p:txBody>
+      </p:sp>
+      <p:sp>
+        <p:nvSpPr>
+          <p:cNvPr id="120" name="Google Shape;120;p29">
+            <a:extLst>
+              <a:ext uri="{FF2B5EF4-FFF2-40B4-BE49-F238E27FC236}">
+                <a16:creationId xmlns:a16="http://schemas.microsoft.com/office/drawing/2014/main" id="{6447384C-71F9-B962-244D-9EF7ADE6905B}"/>
+              </a:ext>
+            </a:extLst>
+          </p:cNvPr>
+          <p:cNvSpPr txBox="1"/>
+          <p:nvPr/>
+        </p:nvSpPr>
+        <p:spPr>
+          <a:xfrm>
+            <a:off x="376810" y="204051"/>
+            <a:ext cx="10910026" cy="461624"/>
+          </a:xfrm>
+          <a:prstGeom prst="rect">
+            <a:avLst/>
+          </a:prstGeom>
+          <a:noFill/>
+          <a:ln>
+            <a:noFill/>
+          </a:ln>
+        </p:spPr>
+        <p:txBody>
+          <a:bodyPr spcFirstLastPara="1" wrap="square" lIns="91425" tIns="45700" rIns="91425" bIns="45700" anchor="t" anchorCtr="0">
+            <a:spAutoFit/>
+          </a:bodyPr>
+          <a:lstStyle/>
+          <a:p>
+            <a:pPr marL="0" marR="0" lvl="0" indent="0" algn="l" rtl="0">
+              <a:lnSpc>
+                <a:spcPct val="100000"/>
+              </a:lnSpc>
+              <a:spcBef>
+                <a:spcPts val="0"/>
+              </a:spcBef>
+              <a:spcAft>
+                <a:spcPts val="0"/>
+              </a:spcAft>
+              <a:buClr>
+                <a:srgbClr val="000000"/>
+              </a:buClr>
+              <a:buSzPts val="2400"/>
+              <a:buFont typeface="Arial"/>
+              <a:buNone/>
+            </a:pPr>
+            <a:r>
+              <a:rPr lang="en-US" sz="2400" b="0" i="0" u="none" strike="noStrike" cap="none" dirty="0">
+                <a:solidFill>
+                  <a:schemeClr val="lt1"/>
+                </a:solidFill>
+                <a:latin typeface="Arial"/>
+                <a:ea typeface="Arial"/>
+                <a:cs typeface="Arial"/>
+                <a:sym typeface="Arial"/>
+              </a:rPr>
+              <a:t>Digital Outputs – too many GPIO output</a:t>
+            </a:r>
+            <a:endParaRPr sz="2400" b="0" i="0" u="none" strike="noStrike" cap="none" dirty="0">
+              <a:solidFill>
+                <a:schemeClr val="lt1"/>
+              </a:solidFill>
+              <a:latin typeface="Arial"/>
+              <a:ea typeface="Arial"/>
+              <a:cs typeface="Arial"/>
+              <a:sym typeface="Arial"/>
+            </a:endParaRPr>
+          </a:p>
+        </p:txBody>
+      </p:sp>
+      <p:pic>
+        <p:nvPicPr>
+          <p:cNvPr id="121" name="Google Shape;121;p29">
+            <a:extLst>
+              <a:ext uri="{FF2B5EF4-FFF2-40B4-BE49-F238E27FC236}">
+                <a16:creationId xmlns:a16="http://schemas.microsoft.com/office/drawing/2014/main" id="{0721AAC4-FC2E-66EB-89BB-8D1383B1ED02}"/>
+              </a:ext>
+            </a:extLst>
+          </p:cNvPr>
+          <p:cNvPicPr preferRelativeResize="0"/>
+          <p:nvPr/>
+        </p:nvPicPr>
+        <p:blipFill rotWithShape="1">
+          <a:blip r:embed="rId3">
+            <a:alphaModFix/>
+          </a:blip>
+          <a:srcRect/>
+          <a:stretch/>
+        </p:blipFill>
+        <p:spPr>
+          <a:xfrm>
+            <a:off x="11557509" y="233819"/>
+            <a:ext cx="271308" cy="389810"/>
+          </a:xfrm>
+          <a:prstGeom prst="rect">
+            <a:avLst/>
+          </a:prstGeom>
+          <a:noFill/>
+          <a:ln>
+            <a:noFill/>
+          </a:ln>
+        </p:spPr>
+      </p:pic>
+      <p:sp>
+        <p:nvSpPr>
+          <p:cNvPr id="122" name="Google Shape;122;p29">
+            <a:extLst>
+              <a:ext uri="{FF2B5EF4-FFF2-40B4-BE49-F238E27FC236}">
+                <a16:creationId xmlns:a16="http://schemas.microsoft.com/office/drawing/2014/main" id="{F7575B25-09D6-D8D2-8BF7-BF0B088EBD32}"/>
+              </a:ext>
+            </a:extLst>
+          </p:cNvPr>
+          <p:cNvSpPr txBox="1"/>
+          <p:nvPr/>
+        </p:nvSpPr>
+        <p:spPr>
+          <a:xfrm>
+            <a:off x="9335597" y="6524381"/>
+            <a:ext cx="2473415" cy="230792"/>
+          </a:xfrm>
+          <a:prstGeom prst="rect">
+            <a:avLst/>
+          </a:prstGeom>
+          <a:noFill/>
+          <a:ln>
+            <a:noFill/>
+          </a:ln>
+        </p:spPr>
+        <p:txBody>
+          <a:bodyPr spcFirstLastPara="1" wrap="square" lIns="91425" tIns="45700" rIns="91425" bIns="45700" anchor="t" anchorCtr="0">
+            <a:spAutoFit/>
+          </a:bodyPr>
+          <a:lstStyle/>
+          <a:p>
+            <a:pPr marL="0" marR="0" lvl="0" indent="0" algn="r" rtl="0">
+              <a:lnSpc>
+                <a:spcPct val="100000"/>
+              </a:lnSpc>
+              <a:spcBef>
+                <a:spcPts val="0"/>
+              </a:spcBef>
+              <a:spcAft>
+                <a:spcPts val="0"/>
+              </a:spcAft>
+              <a:buNone/>
+            </a:pPr>
+            <a:r>
+              <a:rPr lang="en-US" sz="900" b="0" i="0" u="none" strike="noStrike" cap="none">
+                <a:solidFill>
+                  <a:srgbClr val="13294B"/>
+                </a:solidFill>
+                <a:latin typeface="Arial"/>
+                <a:ea typeface="Arial"/>
+                <a:cs typeface="Arial"/>
+                <a:sym typeface="Arial"/>
+              </a:rPr>
+              <a:t>GRAINGER ENGINEERING</a:t>
+            </a:r>
+            <a:endParaRPr/>
+          </a:p>
+        </p:txBody>
+      </p:sp>
+      <p:sp>
+        <p:nvSpPr>
+          <p:cNvPr id="123" name="Google Shape;123;p29">
+            <a:extLst>
+              <a:ext uri="{FF2B5EF4-FFF2-40B4-BE49-F238E27FC236}">
+                <a16:creationId xmlns:a16="http://schemas.microsoft.com/office/drawing/2014/main" id="{E360783A-AA1F-2A77-A35F-1F06412D3A36}"/>
+              </a:ext>
+            </a:extLst>
+          </p:cNvPr>
+          <p:cNvSpPr txBox="1"/>
+          <p:nvPr/>
+        </p:nvSpPr>
+        <p:spPr>
+          <a:xfrm>
+            <a:off x="376807" y="6524381"/>
+            <a:ext cx="7991337" cy="230792"/>
+          </a:xfrm>
+          <a:prstGeom prst="rect">
+            <a:avLst/>
+          </a:prstGeom>
+          <a:noFill/>
+          <a:ln>
+            <a:noFill/>
+          </a:ln>
+        </p:spPr>
+        <p:txBody>
+          <a:bodyPr spcFirstLastPara="1" wrap="square" lIns="91425" tIns="45700" rIns="91425" bIns="45700" anchor="t" anchorCtr="0">
+            <a:spAutoFit/>
+          </a:bodyPr>
+          <a:lstStyle/>
+          <a:p>
+            <a:pPr marL="0" marR="0" lvl="0" indent="0" algn="l" rtl="0">
+              <a:lnSpc>
+                <a:spcPct val="100000"/>
+              </a:lnSpc>
+              <a:spcBef>
+                <a:spcPts val="0"/>
+              </a:spcBef>
+              <a:spcAft>
+                <a:spcPts val="0"/>
+              </a:spcAft>
+              <a:buNone/>
+            </a:pPr>
+            <a:r>
+              <a:rPr lang="en-US" sz="900" dirty="0">
+                <a:solidFill>
+                  <a:srgbClr val="13294B"/>
+                </a:solidFill>
+              </a:rPr>
+              <a:t>SYSTEMS ENGINEERING </a:t>
+            </a:r>
+            <a:endParaRPr dirty="0"/>
+          </a:p>
+        </p:txBody>
+      </p:sp>
+      <p:grpSp>
+        <p:nvGrpSpPr>
+          <p:cNvPr id="124" name="Google Shape;124;p29">
+            <a:extLst>
+              <a:ext uri="{FF2B5EF4-FFF2-40B4-BE49-F238E27FC236}">
+                <a16:creationId xmlns:a16="http://schemas.microsoft.com/office/drawing/2014/main" id="{C3638098-3DAE-64D5-7B8B-FCCE36321A0E}"/>
+              </a:ext>
+            </a:extLst>
+          </p:cNvPr>
+          <p:cNvGrpSpPr/>
+          <p:nvPr/>
+        </p:nvGrpSpPr>
+        <p:grpSpPr>
+          <a:xfrm>
+            <a:off x="4066674" y="6601537"/>
+            <a:ext cx="5233412" cy="70446"/>
+            <a:chOff x="4033424" y="6601537"/>
+            <a:chExt cx="5233412" cy="70446"/>
+          </a:xfrm>
+        </p:grpSpPr>
+        <p:cxnSp>
+          <p:nvCxnSpPr>
+            <p:cNvPr id="125" name="Google Shape;125;p29">
+              <a:extLst>
+                <a:ext uri="{FF2B5EF4-FFF2-40B4-BE49-F238E27FC236}">
+                  <a16:creationId xmlns:a16="http://schemas.microsoft.com/office/drawing/2014/main" id="{0FA1198A-55F2-0DB8-D7F7-173ED5D3DD9E}"/>
+                </a:ext>
+              </a:extLst>
+            </p:cNvPr>
+            <p:cNvCxnSpPr/>
+            <p:nvPr/>
+          </p:nvCxnSpPr>
+          <p:spPr>
+            <a:xfrm rot="10800000">
+              <a:off x="4033424" y="6639606"/>
+              <a:ext cx="5164651" cy="0"/>
+            </a:xfrm>
+            <a:prstGeom prst="straightConnector1">
+              <a:avLst/>
+            </a:prstGeom>
+            <a:noFill/>
+            <a:ln w="9525" cap="flat" cmpd="sng">
+              <a:solidFill>
+                <a:srgbClr val="13294B"/>
+              </a:solidFill>
+              <a:prstDash val="solid"/>
+              <a:round/>
+              <a:headEnd type="none" w="sm" len="sm"/>
+              <a:tailEnd type="none" w="sm" len="sm"/>
+            </a:ln>
+          </p:spPr>
+        </p:cxnSp>
+        <p:sp>
+          <p:nvSpPr>
+            <p:cNvPr id="126" name="Google Shape;126;p29">
+              <a:extLst>
+                <a:ext uri="{FF2B5EF4-FFF2-40B4-BE49-F238E27FC236}">
+                  <a16:creationId xmlns:a16="http://schemas.microsoft.com/office/drawing/2014/main" id="{92495BEC-F211-57CF-AAC2-2E3E43098DD0}"/>
+                </a:ext>
+              </a:extLst>
+            </p:cNvPr>
+            <p:cNvSpPr/>
+            <p:nvPr/>
+          </p:nvSpPr>
+          <p:spPr>
+            <a:xfrm>
+              <a:off x="9196390" y="6601537"/>
+              <a:ext cx="70446" cy="70446"/>
+            </a:xfrm>
+            <a:prstGeom prst="ellipse">
+              <a:avLst/>
+            </a:prstGeom>
+            <a:solidFill>
+              <a:srgbClr val="13294B"/>
+            </a:solidFill>
+            <a:ln>
+              <a:noFill/>
+            </a:ln>
+          </p:spPr>
+          <p:txBody>
+            <a:bodyPr spcFirstLastPara="1" wrap="square" lIns="91425" tIns="45700" rIns="91425" bIns="45700" anchor="ctr" anchorCtr="0">
+              <a:noAutofit/>
+            </a:bodyPr>
+            <a:lstStyle/>
+            <a:p>
+              <a:pPr marL="0" marR="0" lvl="0" indent="0" algn="ctr" rtl="0">
+                <a:lnSpc>
+                  <a:spcPct val="100000"/>
+                </a:lnSpc>
+                <a:spcBef>
+                  <a:spcPts val="0"/>
+                </a:spcBef>
+                <a:spcAft>
+                  <a:spcPts val="0"/>
+                </a:spcAft>
+                <a:buNone/>
+              </a:pPr>
+              <a:endParaRPr sz="1400" b="0" i="0" u="none" strike="noStrike" cap="none">
+                <a:solidFill>
+                  <a:srgbClr val="13294B"/>
+                </a:solidFill>
+                <a:latin typeface="Arial"/>
+                <a:ea typeface="Arial"/>
+                <a:cs typeface="Arial"/>
+                <a:sym typeface="Arial"/>
+              </a:endParaRPr>
+            </a:p>
+          </p:txBody>
+        </p:sp>
+      </p:grpSp>
+    </p:spTree>
+    <p:extLst>
+      <p:ext uri="{BB962C8B-B14F-4D97-AF65-F5344CB8AC3E}">
+        <p14:creationId xmlns:p14="http://schemas.microsoft.com/office/powerpoint/2010/main" val="2105740860"/>
       </p:ext>
     </p:extLst>
   </p:cSld>
@@ -38348,7 +38778,7 @@
         <p:cNvPr id="1" name="Shape 117">
           <a:extLst>
             <a:ext uri="{FF2B5EF4-FFF2-40B4-BE49-F238E27FC236}">
-              <a16:creationId xmlns:a16="http://schemas.microsoft.com/office/drawing/2014/main" id="{C755900A-1584-865A-E16E-977CAC8219FB}"/>
+              <a16:creationId xmlns:a16="http://schemas.microsoft.com/office/drawing/2014/main" id="{E14E8EE6-0038-1418-13F1-12417E07DF4F}"/>
             </a:ext>
           </a:extLst>
         </p:cNvPr>
@@ -38365,118 +38795,10 @@
       </p:grpSpPr>
       <p:sp>
         <p:nvSpPr>
-          <p:cNvPr id="118" name="Google Shape;118;p29">
-            <a:extLst>
-              <a:ext uri="{FF2B5EF4-FFF2-40B4-BE49-F238E27FC236}">
-                <a16:creationId xmlns:a16="http://schemas.microsoft.com/office/drawing/2014/main" id="{56E80A18-9A3D-C8B6-B42A-1FBA3D7DB142}"/>
-              </a:ext>
-            </a:extLst>
-          </p:cNvPr>
-          <p:cNvSpPr txBox="1">
-            <a:spLocks noGrp="1"/>
-          </p:cNvSpPr>
-          <p:nvPr>
-            <p:ph type="body" idx="1"/>
-          </p:nvPr>
-        </p:nvSpPr>
-        <p:spPr>
-          <a:xfrm>
-            <a:off x="376809" y="1334279"/>
-            <a:ext cx="11177401" cy="1028641"/>
-          </a:xfrm>
-          <a:prstGeom prst="rect">
-            <a:avLst/>
-          </a:prstGeom>
-          <a:noFill/>
-          <a:ln>
-            <a:noFill/>
-          </a:ln>
-        </p:spPr>
-        <p:txBody>
-          <a:bodyPr spcFirstLastPara="1" wrap="square" lIns="91425" tIns="45700" rIns="91425" bIns="45700" anchor="t" anchorCtr="0">
-            <a:noAutofit/>
-          </a:bodyPr>
-          <a:lstStyle/>
-          <a:p>
-            <a:pPr marL="0" lvl="0" indent="0" algn="l" rtl="0">
-              <a:lnSpc>
-                <a:spcPct val="100000"/>
-              </a:lnSpc>
-              <a:spcBef>
-                <a:spcPts val="0"/>
-              </a:spcBef>
-              <a:spcAft>
-                <a:spcPts val="0"/>
-              </a:spcAft>
-              <a:buSzPts val="3000"/>
-              <a:buNone/>
-            </a:pPr>
-            <a:r>
-              <a:rPr lang="en-US" sz="1800" dirty="0">
-                <a:solidFill>
-                  <a:schemeClr val="dk1"/>
-                </a:solidFill>
-                <a:latin typeface="Arial"/>
-                <a:ea typeface="Arial"/>
-                <a:cs typeface="Arial"/>
-                <a:sym typeface="Arial"/>
-              </a:rPr>
-              <a:t>Why would we run out of power?</a:t>
-            </a:r>
-          </a:p>
-          <a:p>
-            <a:pPr marL="0" lvl="0" indent="0" algn="l" rtl="0">
-              <a:lnSpc>
-                <a:spcPct val="100000"/>
-              </a:lnSpc>
-              <a:spcBef>
-                <a:spcPts val="0"/>
-              </a:spcBef>
-              <a:spcAft>
-                <a:spcPts val="0"/>
-              </a:spcAft>
-              <a:buSzPts val="3000"/>
-              <a:buNone/>
-            </a:pPr>
-            <a:endParaRPr lang="en-US" sz="1800" dirty="0">
-              <a:latin typeface="Arial"/>
-              <a:ea typeface="Arial"/>
-              <a:cs typeface="Arial"/>
-              <a:sym typeface="Arial"/>
-            </a:endParaRPr>
-          </a:p>
-          <a:p>
-            <a:pPr marL="0" lvl="0" indent="0" algn="l" rtl="0">
-              <a:lnSpc>
-                <a:spcPct val="100000"/>
-              </a:lnSpc>
-              <a:spcBef>
-                <a:spcPts val="0"/>
-              </a:spcBef>
-              <a:spcAft>
-                <a:spcPts val="0"/>
-              </a:spcAft>
-              <a:buSzPts val="3000"/>
-              <a:buNone/>
-            </a:pPr>
-            <a:r>
-              <a:rPr lang="en-US" sz="1800" dirty="0">
-                <a:latin typeface="Arial"/>
-                <a:ea typeface="Arial"/>
-                <a:cs typeface="Arial"/>
-                <a:sym typeface="Arial"/>
-              </a:rPr>
-              <a:t>Think of the GPIOs as being circuits connected in parallel</a:t>
-            </a:r>
-          </a:p>
-        </p:txBody>
-      </p:sp>
-      <p:sp>
-        <p:nvSpPr>
           <p:cNvPr id="119" name="Google Shape;119;p29">
             <a:extLst>
               <a:ext uri="{FF2B5EF4-FFF2-40B4-BE49-F238E27FC236}">
-                <a16:creationId xmlns:a16="http://schemas.microsoft.com/office/drawing/2014/main" id="{D5E40B6D-570B-BDCE-8559-6635E3508B19}"/>
+                <a16:creationId xmlns:a16="http://schemas.microsoft.com/office/drawing/2014/main" id="{961A4CA2-A9F9-5598-09B5-D3C5963C3C95}"/>
               </a:ext>
             </a:extLst>
           </p:cNvPr>
@@ -38538,7 +38860,7 @@
           <p:cNvPr id="120" name="Google Shape;120;p29">
             <a:extLst>
               <a:ext uri="{FF2B5EF4-FFF2-40B4-BE49-F238E27FC236}">
-                <a16:creationId xmlns:a16="http://schemas.microsoft.com/office/drawing/2014/main" id="{6447384C-71F9-B962-244D-9EF7ADE6905B}"/>
+                <a16:creationId xmlns:a16="http://schemas.microsoft.com/office/drawing/2014/main" id="{8022F7F3-70EB-761B-F816-7B2544C0E140}"/>
               </a:ext>
             </a:extLst>
           </p:cNvPr>
@@ -38591,7 +38913,7 @@
                 <a:cs typeface="Arial"/>
                 <a:sym typeface="Arial"/>
               </a:rPr>
-              <a:t>Digital Outputs</a:t>
+              <a:t>Controlling an LED</a:t>
             </a:r>
             <a:endParaRPr sz="2400" b="0" i="0" u="none" strike="noStrike" cap="none" dirty="0">
               <a:solidFill>
@@ -38610,7 +38932,7 @@
           <p:cNvPr id="121" name="Google Shape;121;p29">
             <a:extLst>
               <a:ext uri="{FF2B5EF4-FFF2-40B4-BE49-F238E27FC236}">
-                <a16:creationId xmlns:a16="http://schemas.microsoft.com/office/drawing/2014/main" id="{0721AAC4-FC2E-66EB-89BB-8D1383B1ED02}"/>
+                <a16:creationId xmlns:a16="http://schemas.microsoft.com/office/drawing/2014/main" id="{8A249E9B-FBB1-AA50-9FF9-4A3E043FC6B1}"/>
               </a:ext>
             </a:extLst>
           </p:cNvPr>
@@ -38618,7 +38940,7 @@
           <p:nvPr/>
         </p:nvPicPr>
         <p:blipFill rotWithShape="1">
-          <a:blip r:embed="rId3">
+          <a:blip r:embed="rId4">
             <a:alphaModFix/>
           </a:blip>
           <a:srcRect/>
@@ -38643,7 +38965,7 @@
           <p:cNvPr id="122" name="Google Shape;122;p29">
             <a:extLst>
               <a:ext uri="{FF2B5EF4-FFF2-40B4-BE49-F238E27FC236}">
-                <a16:creationId xmlns:a16="http://schemas.microsoft.com/office/drawing/2014/main" id="{F7575B25-09D6-D8D2-8BF7-BF0B088EBD32}"/>
+                <a16:creationId xmlns:a16="http://schemas.microsoft.com/office/drawing/2014/main" id="{545D7D80-37A9-CA3F-9F6E-F6822E9A9E6E}"/>
               </a:ext>
             </a:extLst>
           </p:cNvPr>
@@ -38702,7 +39024,7 @@
           <p:cNvPr id="123" name="Google Shape;123;p29">
             <a:extLst>
               <a:ext uri="{FF2B5EF4-FFF2-40B4-BE49-F238E27FC236}">
-                <a16:creationId xmlns:a16="http://schemas.microsoft.com/office/drawing/2014/main" id="{E360783A-AA1F-2A77-A35F-1F06412D3A36}"/>
+                <a16:creationId xmlns:a16="http://schemas.microsoft.com/office/drawing/2014/main" id="{252594CA-A07F-7DD2-D1A9-3345EE9D00E0}"/>
               </a:ext>
             </a:extLst>
           </p:cNvPr>
@@ -38757,7 +39079,7 @@
           <p:cNvPr id="124" name="Google Shape;124;p29">
             <a:extLst>
               <a:ext uri="{FF2B5EF4-FFF2-40B4-BE49-F238E27FC236}">
-                <a16:creationId xmlns:a16="http://schemas.microsoft.com/office/drawing/2014/main" id="{C3638098-3DAE-64D5-7B8B-FCCE36321A0E}"/>
+                <a16:creationId xmlns:a16="http://schemas.microsoft.com/office/drawing/2014/main" id="{C1D884F4-D591-96BF-FBDB-417AB7992224}"/>
               </a:ext>
             </a:extLst>
           </p:cNvPr>
@@ -38777,7 +39099,7 @@
             <p:cNvPr id="125" name="Google Shape;125;p29">
               <a:extLst>
                 <a:ext uri="{FF2B5EF4-FFF2-40B4-BE49-F238E27FC236}">
-                  <a16:creationId xmlns:a16="http://schemas.microsoft.com/office/drawing/2014/main" id="{0FA1198A-55F2-0DB8-D7F7-173ED5D3DD9E}"/>
+                  <a16:creationId xmlns:a16="http://schemas.microsoft.com/office/drawing/2014/main" id="{CEFF7A7D-C121-EEC3-5B40-03D6FECBE272}"/>
                 </a:ext>
               </a:extLst>
             </p:cNvPr>
@@ -38809,7 +39131,7 @@
             <p:cNvPr id="126" name="Google Shape;126;p29">
               <a:extLst>
                 <a:ext uri="{FF2B5EF4-FFF2-40B4-BE49-F238E27FC236}">
-                  <a16:creationId xmlns:a16="http://schemas.microsoft.com/office/drawing/2014/main" id="{92495BEC-F211-57CF-AAC2-2E3E43098DD0}"/>
+                  <a16:creationId xmlns:a16="http://schemas.microsoft.com/office/drawing/2014/main" id="{19318CDF-EF6E-9326-3DB5-DDEAB0804AF4}"/>
                 </a:ext>
               </a:extLst>
             </p:cNvPr>
@@ -38862,544 +39184,184 @@
           </p:txBody>
         </p:sp>
       </p:grpSp>
-      <p:grpSp>
-        <p:nvGrpSpPr>
-          <p:cNvPr id="7" name="Group 6">
+      <p:pic>
+        <p:nvPicPr>
+          <p:cNvPr id="4" name="Online Media 3" title="GPIO Led Control Animation">
+            <a:hlinkClick r:id="" action="ppaction://media"/>
             <a:extLst>
               <a:ext uri="{FF2B5EF4-FFF2-40B4-BE49-F238E27FC236}">
-                <a16:creationId xmlns:a16="http://schemas.microsoft.com/office/drawing/2014/main" id="{2EE8F457-2716-0AFD-6E89-8BCA5DBFAD9E}"/>
+                <a16:creationId xmlns:a16="http://schemas.microsoft.com/office/drawing/2014/main" id="{E92A1532-2B30-59C0-EEE0-EA0927948F96}"/>
               </a:ext>
             </a:extLst>
           </p:cNvPr>
-          <p:cNvGrpSpPr/>
-          <p:nvPr/>
-        </p:nvGrpSpPr>
-        <p:grpSpPr>
-          <a:xfrm>
-            <a:off x="3511393" y="2427731"/>
-            <a:ext cx="4640860" cy="2569692"/>
-            <a:chOff x="3508589" y="2542956"/>
-            <a:chExt cx="4640860" cy="2569692"/>
-          </a:xfrm>
-        </p:grpSpPr>
-        <p:pic>
-          <p:nvPicPr>
-            <p:cNvPr id="1026" name="Picture 2" descr="A diagram of several resistors, side by side, both leads of each connected to the same wires.">
-              <a:extLst>
-                <a:ext uri="{FF2B5EF4-FFF2-40B4-BE49-F238E27FC236}">
-                  <a16:creationId xmlns:a16="http://schemas.microsoft.com/office/drawing/2014/main" id="{06F07E3F-98CE-53FD-6B64-E47A883E10A1}"/>
-                </a:ext>
-              </a:extLst>
-            </p:cNvPr>
-            <p:cNvPicPr>
-              <a:picLocks noChangeAspect="1" noChangeArrowheads="1"/>
-            </p:cNvPicPr>
-            <p:nvPr/>
-          </p:nvPicPr>
-          <p:blipFill>
-            <a:blip r:embed="rId4">
-              <a:extLst>
-                <a:ext uri="{28A0092B-C50C-407E-A947-70E740481C1C}">
-                  <a14:useLocalDpi xmlns:a14="http://schemas.microsoft.com/office/drawing/2010/main" val="0"/>
-                </a:ext>
-              </a:extLst>
-            </a:blip>
-            <a:srcRect/>
-            <a:stretch>
-              <a:fillRect/>
-            </a:stretch>
-          </p:blipFill>
-          <p:spPr bwMode="auto">
-            <a:xfrm>
-              <a:off x="3781568" y="2542956"/>
-              <a:ext cx="4367881" cy="2569692"/>
-            </a:xfrm>
-            <a:prstGeom prst="rect">
-              <a:avLst/>
-            </a:prstGeom>
-            <a:noFill/>
-            <a:extLst>
-              <a:ext uri="{909E8E84-426E-40DD-AFC4-6F175D3DCCD1}">
-                <a14:hiddenFill xmlns:a14="http://schemas.microsoft.com/office/drawing/2010/main">
-                  <a:solidFill>
-                    <a:srgbClr val="FFFFFF"/>
-                  </a:solidFill>
-                </a14:hiddenFill>
-              </a:ext>
-            </a:extLst>
-          </p:spPr>
-        </p:pic>
-        <p:sp>
-          <p:nvSpPr>
-            <p:cNvPr id="2" name="TextBox 1">
-              <a:extLst>
-                <a:ext uri="{FF2B5EF4-FFF2-40B4-BE49-F238E27FC236}">
-                  <a16:creationId xmlns:a16="http://schemas.microsoft.com/office/drawing/2014/main" id="{DB589C1A-65D9-C0EA-AFC5-ABB86A850391}"/>
-                </a:ext>
-              </a:extLst>
-            </p:cNvPr>
-            <p:cNvSpPr txBox="1"/>
-            <p:nvPr/>
-          </p:nvSpPr>
-          <p:spPr>
-            <a:xfrm>
-              <a:off x="3508589" y="2917803"/>
-              <a:ext cx="634857" cy="307777"/>
-            </a:xfrm>
-            <a:prstGeom prst="rect">
-              <a:avLst/>
-            </a:prstGeom>
-            <a:noFill/>
-          </p:spPr>
-          <p:txBody>
-            <a:bodyPr wrap="square" rtlCol="0">
-              <a:spAutoFit/>
-            </a:bodyPr>
-            <a:lstStyle/>
-            <a:p>
-              <a:pPr algn="ctr"/>
-              <a:r>
-                <a:rPr lang="en-US" dirty="0"/>
-                <a:t>3.3V</a:t>
-              </a:r>
-            </a:p>
-          </p:txBody>
-        </p:sp>
-        <p:sp>
-          <p:nvSpPr>
-            <p:cNvPr id="3" name="TextBox 2">
-              <a:extLst>
-                <a:ext uri="{FF2B5EF4-FFF2-40B4-BE49-F238E27FC236}">
-                  <a16:creationId xmlns:a16="http://schemas.microsoft.com/office/drawing/2014/main" id="{59082C6A-B532-CF86-A057-5DBB4F3C4CF3}"/>
-                </a:ext>
-              </a:extLst>
-            </p:cNvPr>
-            <p:cNvSpPr txBox="1"/>
-            <p:nvPr/>
-          </p:nvSpPr>
-          <p:spPr>
-            <a:xfrm>
-              <a:off x="3584217" y="4592538"/>
-              <a:ext cx="634857" cy="307777"/>
-            </a:xfrm>
-            <a:prstGeom prst="rect">
-              <a:avLst/>
-            </a:prstGeom>
-            <a:noFill/>
-          </p:spPr>
-          <p:txBody>
-            <a:bodyPr wrap="square" rtlCol="0">
-              <a:spAutoFit/>
-            </a:bodyPr>
-            <a:lstStyle/>
-            <a:p>
-              <a:pPr algn="ctr"/>
-              <a:r>
-                <a:rPr lang="en-US" dirty="0"/>
-                <a:t>GND</a:t>
-              </a:r>
-            </a:p>
-          </p:txBody>
-        </p:sp>
-        <p:sp>
-          <p:nvSpPr>
-            <p:cNvPr id="4" name="TextBox 3">
-              <a:extLst>
-                <a:ext uri="{FF2B5EF4-FFF2-40B4-BE49-F238E27FC236}">
-                  <a16:creationId xmlns:a16="http://schemas.microsoft.com/office/drawing/2014/main" id="{A518102D-ED2D-705B-7561-F8363DB73B22}"/>
-                </a:ext>
-              </a:extLst>
-            </p:cNvPr>
-            <p:cNvSpPr txBox="1"/>
-            <p:nvPr/>
-          </p:nvSpPr>
-          <p:spPr>
-            <a:xfrm>
-              <a:off x="4679335" y="2610026"/>
-              <a:ext cx="777661" cy="307777"/>
-            </a:xfrm>
-            <a:prstGeom prst="rect">
-              <a:avLst/>
-            </a:prstGeom>
-            <a:noFill/>
-          </p:spPr>
-          <p:txBody>
-            <a:bodyPr wrap="square" rtlCol="0">
-              <a:spAutoFit/>
-            </a:bodyPr>
-            <a:lstStyle/>
-            <a:p>
-              <a:pPr algn="ctr"/>
-              <a:r>
-                <a:rPr lang="en-US" dirty="0"/>
-                <a:t>GPIO1</a:t>
-              </a:r>
-            </a:p>
-          </p:txBody>
-        </p:sp>
-        <p:sp>
-          <p:nvSpPr>
-            <p:cNvPr id="5" name="TextBox 4">
-              <a:extLst>
-                <a:ext uri="{FF2B5EF4-FFF2-40B4-BE49-F238E27FC236}">
-                  <a16:creationId xmlns:a16="http://schemas.microsoft.com/office/drawing/2014/main" id="{0BEA31BF-C102-6830-290C-58768FC90D1B}"/>
-                </a:ext>
-              </a:extLst>
-            </p:cNvPr>
-            <p:cNvSpPr txBox="1"/>
-            <p:nvPr/>
-          </p:nvSpPr>
-          <p:spPr>
-            <a:xfrm>
-              <a:off x="5442992" y="2610025"/>
-              <a:ext cx="777661" cy="307777"/>
-            </a:xfrm>
-            <a:prstGeom prst="rect">
-              <a:avLst/>
-            </a:prstGeom>
-            <a:noFill/>
-          </p:spPr>
-          <p:txBody>
-            <a:bodyPr wrap="square" rtlCol="0">
-              <a:spAutoFit/>
-            </a:bodyPr>
-            <a:lstStyle/>
-            <a:p>
-              <a:pPr algn="ctr"/>
-              <a:r>
-                <a:rPr lang="en-US" dirty="0"/>
-                <a:t>GPIO2</a:t>
-              </a:r>
-            </a:p>
-          </p:txBody>
-        </p:sp>
-        <p:sp>
-          <p:nvSpPr>
-            <p:cNvPr id="6" name="TextBox 5">
-              <a:extLst>
-                <a:ext uri="{FF2B5EF4-FFF2-40B4-BE49-F238E27FC236}">
-                  <a16:creationId xmlns:a16="http://schemas.microsoft.com/office/drawing/2014/main" id="{3F527522-1651-DA77-21B1-6EA77BBA3593}"/>
-                </a:ext>
-              </a:extLst>
-            </p:cNvPr>
-            <p:cNvSpPr txBox="1"/>
-            <p:nvPr/>
-          </p:nvSpPr>
-          <p:spPr>
-            <a:xfrm>
-              <a:off x="6984310" y="2611688"/>
-              <a:ext cx="777661" cy="307777"/>
-            </a:xfrm>
-            <a:prstGeom prst="rect">
-              <a:avLst/>
-            </a:prstGeom>
-            <a:noFill/>
-          </p:spPr>
-          <p:txBody>
-            <a:bodyPr wrap="square" rtlCol="0">
-              <a:spAutoFit/>
-            </a:bodyPr>
-            <a:lstStyle/>
-            <a:p>
-              <a:pPr algn="ctr"/>
-              <a:r>
-                <a:rPr lang="en-US" dirty="0"/>
-                <a:t>GPION</a:t>
-              </a:r>
-            </a:p>
-          </p:txBody>
-        </p:sp>
-      </p:grpSp>
-      <p:sp>
-        <p:nvSpPr>
-          <p:cNvPr id="13" name="TextBox 12">
-            <a:extLst>
-              <a:ext uri="{FF2B5EF4-FFF2-40B4-BE49-F238E27FC236}">
-                <a16:creationId xmlns:a16="http://schemas.microsoft.com/office/drawing/2014/main" id="{10228E5B-8037-FA54-82E8-0FB0840A71AB}"/>
-              </a:ext>
-            </a:extLst>
-          </p:cNvPr>
-          <p:cNvSpPr txBox="1"/>
-          <p:nvPr/>
-        </p:nvSpPr>
+          <p:cNvPicPr>
+            <a:picLocks noRot="1" noChangeAspect="1"/>
+          </p:cNvPicPr>
+          <p:nvPr>
+            <a:videoFile r:link="rId1"/>
+          </p:nvPr>
+        </p:nvPicPr>
+        <p:blipFill>
+          <a:blip r:embed="rId5"/>
+          <a:stretch>
+            <a:fillRect/>
+          </a:stretch>
+        </p:blipFill>
         <p:spPr>
           <a:xfrm>
-            <a:off x="376806" y="4906539"/>
-            <a:ext cx="11281793" cy="369332"/>
+            <a:off x="1381988" y="1072145"/>
+            <a:ext cx="9428024" cy="5326846"/>
           </a:xfrm>
           <a:prstGeom prst="rect">
             <a:avLst/>
           </a:prstGeom>
-          <a:noFill/>
         </p:spPr>
-        <p:txBody>
-          <a:bodyPr wrap="square" rtlCol="0">
-            <a:spAutoFit/>
-          </a:bodyPr>
-          <a:lstStyle/>
-          <a:p>
-            <a:pPr>
-              <a:buSzPts val="3000"/>
-            </a:pPr>
-            <a:r>
-              <a:rPr lang="en-US" sz="1800" dirty="0"/>
-              <a:t>The total current of each individual resistor is found by Ohm’s law ( assuming all resistors are LEDs):</a:t>
-            </a:r>
-          </a:p>
-        </p:txBody>
-      </p:sp>
-      <mc:AlternateContent xmlns:mc="http://schemas.openxmlformats.org/markup-compatibility/2006" xmlns:a14="http://schemas.microsoft.com/office/drawing/2010/main">
-        <mc:Choice Requires="a14">
-          <p:sp>
-            <p:nvSpPr>
-              <p:cNvPr id="14" name="TextBox 13">
-                <a:extLst>
-                  <a:ext uri="{FF2B5EF4-FFF2-40B4-BE49-F238E27FC236}">
-                    <a16:creationId xmlns:a16="http://schemas.microsoft.com/office/drawing/2014/main" id="{564095E7-6ED6-2DD6-1D44-E46267F81283}"/>
-                  </a:ext>
-                </a:extLst>
-              </p:cNvPr>
-              <p:cNvSpPr txBox="1"/>
-              <p:nvPr/>
-            </p:nvSpPr>
-            <p:spPr>
-              <a:xfrm>
-                <a:off x="4372475" y="5346196"/>
-                <a:ext cx="2529380" cy="847027"/>
-              </a:xfrm>
-              <a:prstGeom prst="rect">
-                <a:avLst/>
-              </a:prstGeom>
-              <a:noFill/>
-            </p:spPr>
-            <p:txBody>
-              <a:bodyPr wrap="square" rtlCol="0">
-                <a:spAutoFit/>
-              </a:bodyPr>
-              <a:lstStyle/>
-              <a:p>
-                <a:pPr/>
-                <a14:m>
-                  <m:oMathPara xmlns:m="http://schemas.openxmlformats.org/officeDocument/2006/math">
-                    <m:oMathParaPr>
-                      <m:jc m:val="centerGroup"/>
-                    </m:oMathParaPr>
-                    <m:oMath xmlns:m="http://schemas.openxmlformats.org/officeDocument/2006/math">
-                      <m:r>
-                        <m:rPr>
-                          <m:sty m:val="p"/>
-                        </m:rPr>
-                        <a:rPr lang="en-US" sz="1800" b="0" i="1" smtClean="0">
-                          <a:latin typeface="Cambria Math" panose="02040503050406030204" pitchFamily="18" charset="0"/>
-                        </a:rPr>
-                        <m:t>I</m:t>
-                      </m:r>
-                      <m:r>
-                        <a:rPr lang="en-US" sz="1800" b="0" i="1" smtClean="0">
-                          <a:latin typeface="Cambria Math" panose="02040503050406030204" pitchFamily="18" charset="0"/>
-                        </a:rPr>
-                        <m:t> = </m:t>
-                      </m:r>
-                      <m:r>
-                        <m:rPr>
-                          <m:sty m:val="p"/>
-                        </m:rPr>
-                        <a:rPr lang="en-US" sz="1800" b="0" i="1" smtClean="0">
-                          <a:latin typeface="Cambria Math" panose="02040503050406030204" pitchFamily="18" charset="0"/>
-                        </a:rPr>
-                        <m:t>V</m:t>
-                      </m:r>
-                      <m:nary>
-                        <m:naryPr>
-                          <m:chr m:val="∑"/>
-                          <m:ctrlPr>
-                            <a:rPr lang="en-US" sz="1800" b="0" i="1" smtClean="0">
-                              <a:latin typeface="Cambria Math" panose="02040503050406030204" pitchFamily="18" charset="0"/>
-                            </a:rPr>
-                          </m:ctrlPr>
-                        </m:naryPr>
-                        <m:sub>
-                          <m:r>
-                            <m:rPr>
-                              <m:sty m:val="p"/>
-                              <m:brk m:alnAt="23"/>
-                            </m:rPr>
-                            <a:rPr lang="en-US" sz="1800" b="0" i="1" smtClean="0">
-                              <a:latin typeface="Cambria Math" panose="02040503050406030204" pitchFamily="18" charset="0"/>
-                            </a:rPr>
-                            <m:t>i</m:t>
-                          </m:r>
-                          <m:r>
-                            <a:rPr lang="en-US" sz="1800" b="0" i="1" smtClean="0">
-                              <a:latin typeface="Cambria Math" panose="02040503050406030204" pitchFamily="18" charset="0"/>
-                            </a:rPr>
-                            <m:t>=1</m:t>
-                          </m:r>
-                        </m:sub>
-                        <m:sup>
-                          <m:r>
-                            <m:rPr>
-                              <m:sty m:val="p"/>
-                            </m:rPr>
-                            <a:rPr lang="en-US" sz="1800" b="0" i="1" smtClean="0">
-                              <a:latin typeface="Cambria Math" panose="02040503050406030204" pitchFamily="18" charset="0"/>
-                            </a:rPr>
-                            <m:t>n</m:t>
-                          </m:r>
-                        </m:sup>
-                        <m:e>
-                          <m:f>
-                            <m:fPr>
-                              <m:ctrlPr>
-                                <a:rPr lang="en-US" sz="1800" b="0" i="1" smtClean="0">
-                                  <a:latin typeface="Cambria Math" panose="02040503050406030204" pitchFamily="18" charset="0"/>
-                                </a:rPr>
-                              </m:ctrlPr>
-                            </m:fPr>
-                            <m:num>
-                              <m:r>
-                                <a:rPr lang="en-US" sz="1800" b="0" i="1" smtClean="0">
-                                  <a:latin typeface="Cambria Math" panose="02040503050406030204" pitchFamily="18" charset="0"/>
-                                </a:rPr>
-                                <m:t>1</m:t>
-                              </m:r>
-                            </m:num>
-                            <m:den>
-                              <m:sSub>
-                                <m:sSubPr>
-                                  <m:ctrlPr>
-                                    <a:rPr lang="en-US" sz="1800" b="0" i="1" smtClean="0">
-                                      <a:latin typeface="Cambria Math" panose="02040503050406030204" pitchFamily="18" charset="0"/>
-                                    </a:rPr>
-                                  </m:ctrlPr>
-                                </m:sSubPr>
-                                <m:e>
-                                  <m:r>
-                                    <m:rPr>
-                                      <m:sty m:val="p"/>
-                                    </m:rPr>
-                                    <a:rPr lang="en-US" sz="1800" b="0" i="1" smtClean="0">
-                                      <a:latin typeface="Cambria Math" panose="02040503050406030204" pitchFamily="18" charset="0"/>
-                                    </a:rPr>
-                                    <m:t>R</m:t>
-                                  </m:r>
-                                </m:e>
-                                <m:sub>
-                                  <m:r>
-                                    <m:rPr>
-                                      <m:sty m:val="p"/>
-                                    </m:rPr>
-                                    <a:rPr lang="en-US" sz="1800" b="0" i="1" smtClean="0">
-                                      <a:latin typeface="Cambria Math" panose="02040503050406030204" pitchFamily="18" charset="0"/>
-                                    </a:rPr>
-                                    <m:t>i</m:t>
-                                  </m:r>
-                                </m:sub>
-                              </m:sSub>
-                            </m:den>
-                          </m:f>
-                          <m:r>
-                            <a:rPr lang="en-US" sz="1800" b="0" i="1" smtClean="0">
-                              <a:latin typeface="Cambria Math" panose="02040503050406030204" pitchFamily="18" charset="0"/>
-                            </a:rPr>
-                            <m:t>=</m:t>
-                          </m:r>
-                          <m:f>
-                            <m:fPr>
-                              <m:ctrlPr>
-                                <a:rPr lang="en-US" sz="1800" b="0" i="1" smtClean="0">
-                                  <a:latin typeface="Cambria Math" panose="02040503050406030204" pitchFamily="18" charset="0"/>
-                                </a:rPr>
-                              </m:ctrlPr>
-                            </m:fPr>
-                            <m:num>
-                              <m:r>
-                                <m:rPr>
-                                  <m:sty m:val="p"/>
-                                </m:rPr>
-                                <a:rPr lang="en-US" sz="1800" b="0" i="1" smtClean="0">
-                                  <a:latin typeface="Cambria Math" panose="02040503050406030204" pitchFamily="18" charset="0"/>
-                                </a:rPr>
-                                <m:t>V</m:t>
-                              </m:r>
-                            </m:num>
-                            <m:den>
-                              <m:r>
-                                <m:rPr>
-                                  <m:sty m:val="p"/>
-                                </m:rPr>
-                                <a:rPr lang="en-US" sz="1800" b="0" i="1" smtClean="0">
-                                  <a:latin typeface="Cambria Math" panose="02040503050406030204" pitchFamily="18" charset="0"/>
-                                </a:rPr>
-                                <m:t>nR</m:t>
-                              </m:r>
-                            </m:den>
-                          </m:f>
-                        </m:e>
-                      </m:nary>
-                    </m:oMath>
-                  </m:oMathPara>
-                </a14:m>
-                <a:endParaRPr lang="en-US" sz="1800" dirty="0"/>
-              </a:p>
-            </p:txBody>
-          </p:sp>
-        </mc:Choice>
-        <mc:Fallback xmlns="">
-          <p:sp>
-            <p:nvSpPr>
-              <p:cNvPr id="14" name="TextBox 13">
-                <a:extLst>
-                  <a:ext uri="{FF2B5EF4-FFF2-40B4-BE49-F238E27FC236}">
-                    <a16:creationId xmlns:a16="http://schemas.microsoft.com/office/drawing/2014/main" id="{564095E7-6ED6-2DD6-1D44-E46267F81283}"/>
-                  </a:ext>
-                </a:extLst>
-              </p:cNvPr>
-              <p:cNvSpPr txBox="1">
-                <a:spLocks noRot="1" noChangeAspect="1" noMove="1" noResize="1" noEditPoints="1" noAdjustHandles="1" noChangeArrowheads="1" noChangeShapeType="1" noTextEdit="1"/>
-              </p:cNvSpPr>
-              <p:nvPr/>
-            </p:nvSpPr>
-            <p:spPr>
-              <a:xfrm>
-                <a:off x="4372475" y="5346196"/>
-                <a:ext cx="2529380" cy="847027"/>
-              </a:xfrm>
-              <a:prstGeom prst="rect">
-                <a:avLst/>
-              </a:prstGeom>
-              <a:blipFill>
-                <a:blip r:embed="rId5"/>
-                <a:stretch>
-                  <a:fillRect/>
-                </a:stretch>
-              </a:blipFill>
-            </p:spPr>
-            <p:txBody>
-              <a:bodyPr/>
-              <a:lstStyle/>
-              <a:p>
-                <a:r>
-                  <a:rPr lang="en-US">
-                    <a:noFill/>
-                  </a:rPr>
-                  <a:t> </a:t>
-                </a:r>
-              </a:p>
-            </p:txBody>
-          </p:sp>
-        </mc:Fallback>
-      </mc:AlternateContent>
+      </p:pic>
     </p:spTree>
     <p:extLst>
       <p:ext uri="{BB962C8B-B14F-4D97-AF65-F5344CB8AC3E}">
-        <p14:creationId xmlns:p14="http://schemas.microsoft.com/office/powerpoint/2010/main" val="2105740860"/>
+        <p14:creationId xmlns:p14="http://schemas.microsoft.com/office/powerpoint/2010/main" val="2257794054"/>
       </p:ext>
     </p:extLst>
   </p:cSld>
   <p:clrMapOvr>
     <a:masterClrMapping/>
   </p:clrMapOvr>
+  <p:timing>
+    <p:tnLst>
+      <p:par>
+        <p:cTn id="1" dur="indefinite" restart="never" nodeType="tmRoot">
+          <p:childTnLst>
+            <p:seq concurrent="1" nextAc="seek">
+              <p:cTn id="2" dur="indefinite" nodeType="mainSeq">
+                <p:childTnLst>
+                  <p:par>
+                    <p:cTn id="3" fill="hold">
+                      <p:stCondLst>
+                        <p:cond delay="indefinite"/>
+                      </p:stCondLst>
+                      <p:childTnLst>
+                        <p:par>
+                          <p:cTn id="4" fill="hold">
+                            <p:stCondLst>
+                              <p:cond delay="0"/>
+                            </p:stCondLst>
+                            <p:childTnLst>
+                              <p:par>
+                                <p:cTn id="5" presetID="1" presetClass="mediacall" presetSubtype="0" fill="hold" nodeType="clickEffect">
+                                  <p:stCondLst>
+                                    <p:cond delay="0"/>
+                                  </p:stCondLst>
+                                  <p:childTnLst>
+                                    <p:cmd type="call" cmd="playFrom(0.0)">
+                                      <p:cBhvr>
+                                        <p:cTn id="6" dur="1" fill="hold"/>
+                                        <p:tgtEl>
+                                          <p:spTgt spid="4"/>
+                                        </p:tgtEl>
+                                      </p:cBhvr>
+                                    </p:cmd>
+                                  </p:childTnLst>
+                                </p:cTn>
+                              </p:par>
+                            </p:childTnLst>
+                          </p:cTn>
+                        </p:par>
+                      </p:childTnLst>
+                    </p:cTn>
+                  </p:par>
+                </p:childTnLst>
+              </p:cTn>
+              <p:prevCondLst>
+                <p:cond evt="onPrev" delay="0">
+                  <p:tgtEl>
+                    <p:sldTgt/>
+                  </p:tgtEl>
+                </p:cond>
+              </p:prevCondLst>
+              <p:nextCondLst>
+                <p:cond evt="onNext" delay="0">
+                  <p:tgtEl>
+                    <p:sldTgt/>
+                  </p:tgtEl>
+                </p:cond>
+              </p:nextCondLst>
+            </p:seq>
+            <p:video>
+              <p:cMediaNode vol="80000">
+                <p:cTn id="7" fill="hold" display="0">
+                  <p:stCondLst>
+                    <p:cond delay="indefinite"/>
+                  </p:stCondLst>
+                </p:cTn>
+                <p:tgtEl>
+                  <p:spTgt spid="4"/>
+                </p:tgtEl>
+              </p:cMediaNode>
+            </p:video>
+            <p:seq concurrent="1" nextAc="seek">
+              <p:cTn id="8" restart="whenNotActive" fill="hold" evtFilter="cancelBubble" nodeType="interactiveSeq">
+                <p:stCondLst>
+                  <p:cond evt="onClick" delay="0">
+                    <p:tgtEl>
+                      <p:spTgt spid="4"/>
+                    </p:tgtEl>
+                  </p:cond>
+                </p:stCondLst>
+                <p:endSync evt="end" delay="0">
+                  <p:rtn val="all"/>
+                </p:endSync>
+                <p:childTnLst>
+                  <p:par>
+                    <p:cTn id="9" fill="hold">
+                      <p:stCondLst>
+                        <p:cond delay="0"/>
+                      </p:stCondLst>
+                      <p:childTnLst>
+                        <p:par>
+                          <p:cTn id="10" fill="hold">
+                            <p:stCondLst>
+                              <p:cond delay="0"/>
+                            </p:stCondLst>
+                            <p:childTnLst>
+                              <p:par>
+                                <p:cTn id="11" presetID="2" presetClass="mediacall" presetSubtype="0" fill="hold" nodeType="clickEffect">
+                                  <p:stCondLst>
+                                    <p:cond delay="0"/>
+                                  </p:stCondLst>
+                                  <p:childTnLst>
+                                    <p:cmd type="call" cmd="togglePause">
+                                      <p:cBhvr>
+                                        <p:cTn id="12" dur="1" fill="hold"/>
+                                        <p:tgtEl>
+                                          <p:spTgt spid="4"/>
+                                        </p:tgtEl>
+                                      </p:cBhvr>
+                                    </p:cmd>
+                                  </p:childTnLst>
+                                </p:cTn>
+                              </p:par>
+                            </p:childTnLst>
+                          </p:cTn>
+                        </p:par>
+                      </p:childTnLst>
+                    </p:cTn>
+                  </p:par>
+                </p:childTnLst>
+              </p:cTn>
+              <p:nextCondLst>
+                <p:cond evt="onClick" delay="0">
+                  <p:tgtEl>
+                    <p:spTgt spid="4"/>
+                  </p:tgtEl>
+                </p:cond>
+              </p:nextCondLst>
+            </p:seq>
+          </p:childTnLst>
+        </p:cTn>
+      </p:par>
+    </p:tnLst>
+  </p:timing>
 </p:sld>
 </file>
 

</xml_diff>

<commit_message>
corrected mistakes in slides, removed slide, added missing line
</commit_message>
<xml_diff>
--- a/Lectures/Slides/L3.pptx
+++ b/Lectures/Slides/L3.pptx
@@ -5,7 +5,7 @@
     <p:sldMasterId id="2147483648" r:id="rId1"/>
   </p:sldMasterIdLst>
   <p:notesMasterIdLst>
-    <p:notesMasterId r:id="rId30"/>
+    <p:notesMasterId r:id="rId29"/>
   </p:notesMasterIdLst>
   <p:sldIdLst>
     <p:sldId id="256" r:id="rId2"/>
@@ -22,20 +22,19 @@
     <p:sldId id="288" r:id="rId13"/>
     <p:sldId id="295" r:id="rId14"/>
     <p:sldId id="296" r:id="rId15"/>
-    <p:sldId id="297" r:id="rId16"/>
-    <p:sldId id="280" r:id="rId17"/>
-    <p:sldId id="298" r:id="rId18"/>
-    <p:sldId id="278" r:id="rId19"/>
-    <p:sldId id="282" r:id="rId20"/>
-    <p:sldId id="290" r:id="rId21"/>
-    <p:sldId id="289" r:id="rId22"/>
-    <p:sldId id="291" r:id="rId23"/>
-    <p:sldId id="293" r:id="rId24"/>
-    <p:sldId id="294" r:id="rId25"/>
-    <p:sldId id="281" r:id="rId26"/>
-    <p:sldId id="279" r:id="rId27"/>
-    <p:sldId id="271" r:id="rId28"/>
-    <p:sldId id="270" r:id="rId29"/>
+    <p:sldId id="280" r:id="rId16"/>
+    <p:sldId id="298" r:id="rId17"/>
+    <p:sldId id="278" r:id="rId18"/>
+    <p:sldId id="282" r:id="rId19"/>
+    <p:sldId id="290" r:id="rId20"/>
+    <p:sldId id="289" r:id="rId21"/>
+    <p:sldId id="291" r:id="rId22"/>
+    <p:sldId id="293" r:id="rId23"/>
+    <p:sldId id="294" r:id="rId24"/>
+    <p:sldId id="281" r:id="rId25"/>
+    <p:sldId id="279" r:id="rId26"/>
+    <p:sldId id="271" r:id="rId27"/>
+    <p:sldId id="270" r:id="rId28"/>
   </p:sldIdLst>
   <p:sldSz cx="12192000" cy="6858000"/>
   <p:notesSz cx="6858000" cy="9144000"/>
@@ -273,7 +272,7 @@
       <p15:sldGuideLst xmlns:p15="http://schemas.microsoft.com/office/powerpoint/2012/main"/>
     </p:ext>
     <p:ext uri="http://customooxmlschemas.google.com/">
-      <go:slidesCustomData xmlns:go="http://customooxmlschemas.google.com/" xmlns:ahyp="http://schemas.microsoft.com/office/drawing/2018/hyperlinkcolor" xmlns:p15="http://schemas.microsoft.com/office/powerpoint/2012/main" xmlns:p14="http://schemas.microsoft.com/office/powerpoint/2010/main" xmlns:com="http://schemas.openxmlformats.org/drawingml/2006/compatibility" xmlns:pvml="urn:schemas-microsoft-com:office:powerpoint" xmlns:v="urn:schemas-microsoft-com:vml" xmlns:o="urn:schemas-microsoft-com:office:office" xmlns:dgm="http://schemas.openxmlformats.org/drawingml/2006/diagram" xmlns:c="http://schemas.openxmlformats.org/drawingml/2006/chart" xmlns:mv="urn:schemas-microsoft-com:mac:vml" xmlns:mc="http://schemas.openxmlformats.org/markup-compatibility/2006" xmlns="" r:id="rId31" roundtripDataSignature="AMtx7mjKkk5wOoQj6sDPPETbbKgHU96Dzg=="/>
+      <go:slidesCustomData xmlns="" xmlns:mc="http://schemas.openxmlformats.org/markup-compatibility/2006" xmlns:mv="urn:schemas-microsoft-com:mac:vml" xmlns:c="http://schemas.openxmlformats.org/drawingml/2006/chart" xmlns:dgm="http://schemas.openxmlformats.org/drawingml/2006/diagram" xmlns:o="urn:schemas-microsoft-com:office:office" xmlns:v="urn:schemas-microsoft-com:vml" xmlns:pvml="urn:schemas-microsoft-com:office:powerpoint" xmlns:com="http://schemas.openxmlformats.org/drawingml/2006/compatibility" xmlns:p14="http://schemas.microsoft.com/office/powerpoint/2010/main" xmlns:p15="http://schemas.microsoft.com/office/powerpoint/2012/main" xmlns:ahyp="http://schemas.microsoft.com/office/drawing/2018/hyperlinkcolor" xmlns:go="http://customooxmlschemas.google.com/" r:id="rId31" roundtripDataSignature="AMtx7mjKkk5wOoQj6sDPPETbbKgHU96Dzg=="/>
     </p:ext>
   </p:extLst>
 </p:presentation>
@@ -2342,7 +2341,46 @@
               <a:buSzPts val="1400"/>
               <a:buNone/>
             </a:pPr>
-            <a:endParaRPr/>
+            <a:r>
+              <a:rPr lang="en-US" dirty="0"/>
+              <a:t>If input is high the NPN is turned on, PNP will be off current flows from +9 to ground. NPN sources current (called push)</a:t>
+            </a:r>
+          </a:p>
+          <a:p>
+            <a:pPr marL="0" lvl="0" indent="0" algn="l" rtl="0">
+              <a:lnSpc>
+                <a:spcPct val="100000"/>
+              </a:lnSpc>
+              <a:spcBef>
+                <a:spcPts val="0"/>
+              </a:spcBef>
+              <a:spcAft>
+                <a:spcPts val="0"/>
+              </a:spcAft>
+              <a:buSzPts val="1400"/>
+              <a:buNone/>
+            </a:pPr>
+            <a:endParaRPr lang="en-US" dirty="0"/>
+          </a:p>
+          <a:p>
+            <a:pPr marL="0" lvl="0" indent="0" algn="l" rtl="0">
+              <a:lnSpc>
+                <a:spcPct val="100000"/>
+              </a:lnSpc>
+              <a:spcBef>
+                <a:spcPts val="0"/>
+              </a:spcBef>
+              <a:spcAft>
+                <a:spcPts val="0"/>
+              </a:spcAft>
+              <a:buSzPts val="1400"/>
+              <a:buNone/>
+            </a:pPr>
+            <a:r>
+              <a:rPr lang="en-US" dirty="0"/>
+              <a:t>If input is low the PNP is turned on, NPN will be off, current flows from ground to -9V, PNP sinks current (called pull)</a:t>
+            </a:r>
+            <a:endParaRPr dirty="0"/>
           </a:p>
         </p:txBody>
       </p:sp>
@@ -2569,151 +2607,6 @@
         <p:cNvPr id="1" name="Shape 114">
           <a:extLst>
             <a:ext uri="{FF2B5EF4-FFF2-40B4-BE49-F238E27FC236}">
-              <a16:creationId xmlns:a16="http://schemas.microsoft.com/office/drawing/2014/main" id="{D7FDEC33-02E3-E6BF-B9E2-46FBEC0A3D5B}"/>
-            </a:ext>
-          </a:extLst>
-        </p:cNvPr>
-        <p:cNvGrpSpPr/>
-        <p:nvPr/>
-      </p:nvGrpSpPr>
-      <p:grpSpPr>
-        <a:xfrm>
-          <a:off x="0" y="0"/>
-          <a:ext cx="0" cy="0"/>
-          <a:chOff x="0" y="0"/>
-          <a:chExt cx="0" cy="0"/>
-        </a:xfrm>
-      </p:grpSpPr>
-      <p:sp>
-        <p:nvSpPr>
-          <p:cNvPr id="115" name="Google Shape;115;p29:notes">
-            <a:extLst>
-              <a:ext uri="{FF2B5EF4-FFF2-40B4-BE49-F238E27FC236}">
-                <a16:creationId xmlns:a16="http://schemas.microsoft.com/office/drawing/2014/main" id="{4B48470A-FB29-BEC2-17D4-B97F19EB966C}"/>
-              </a:ext>
-            </a:extLst>
-          </p:cNvPr>
-          <p:cNvSpPr txBox="1">
-            <a:spLocks noGrp="1"/>
-          </p:cNvSpPr>
-          <p:nvPr>
-            <p:ph type="body" idx="1"/>
-          </p:nvPr>
-        </p:nvSpPr>
-        <p:spPr>
-          <a:xfrm>
-            <a:off x="685800" y="4400550"/>
-            <a:ext cx="5486400" cy="3600450"/>
-          </a:xfrm>
-          <a:prstGeom prst="rect">
-            <a:avLst/>
-          </a:prstGeom>
-          <a:noFill/>
-          <a:ln>
-            <a:noFill/>
-          </a:ln>
-        </p:spPr>
-        <p:txBody>
-          <a:bodyPr spcFirstLastPara="1" wrap="square" lIns="91425" tIns="45700" rIns="91425" bIns="45700" anchor="t" anchorCtr="0">
-            <a:noAutofit/>
-          </a:bodyPr>
-          <a:lstStyle/>
-          <a:p>
-            <a:pPr marL="0" lvl="0" indent="0" algn="l" rtl="0">
-              <a:lnSpc>
-                <a:spcPct val="100000"/>
-              </a:lnSpc>
-              <a:spcBef>
-                <a:spcPts val="0"/>
-              </a:spcBef>
-              <a:spcAft>
-                <a:spcPts val="0"/>
-              </a:spcAft>
-              <a:buSzPts val="1400"/>
-              <a:buNone/>
-            </a:pPr>
-            <a:endParaRPr/>
-          </a:p>
-        </p:txBody>
-      </p:sp>
-      <p:sp>
-        <p:nvSpPr>
-          <p:cNvPr id="116" name="Google Shape;116;p29:notes">
-            <a:extLst>
-              <a:ext uri="{FF2B5EF4-FFF2-40B4-BE49-F238E27FC236}">
-                <a16:creationId xmlns:a16="http://schemas.microsoft.com/office/drawing/2014/main" id="{F99055CF-1B50-4029-5F94-032D66C0F191}"/>
-              </a:ext>
-            </a:extLst>
-          </p:cNvPr>
-          <p:cNvSpPr>
-            <a:spLocks noGrp="1" noRot="1" noChangeAspect="1"/>
-          </p:cNvSpPr>
-          <p:nvPr>
-            <p:ph type="sldImg" idx="2"/>
-          </p:nvPr>
-        </p:nvSpPr>
-        <p:spPr>
-          <a:xfrm>
-            <a:off x="685800" y="1143000"/>
-            <a:ext cx="5486400" cy="3086100"/>
-          </a:xfrm>
-          <a:custGeom>
-            <a:avLst/>
-            <a:gdLst/>
-            <a:ahLst/>
-            <a:cxnLst/>
-            <a:rect l="l" t="t" r="r" b="b"/>
-            <a:pathLst>
-              <a:path w="120000" h="120000" extrusionOk="0">
-                <a:moveTo>
-                  <a:pt x="0" y="0"/>
-                </a:moveTo>
-                <a:lnTo>
-                  <a:pt x="120000" y="0"/>
-                </a:lnTo>
-                <a:lnTo>
-                  <a:pt x="120000" y="120000"/>
-                </a:lnTo>
-                <a:lnTo>
-                  <a:pt x="0" y="120000"/>
-                </a:lnTo>
-                <a:close/>
-              </a:path>
-            </a:pathLst>
-          </a:custGeom>
-          <a:noFill/>
-          <a:ln w="12700" cap="flat" cmpd="sng">
-            <a:solidFill>
-              <a:srgbClr val="000000"/>
-            </a:solidFill>
-            <a:prstDash val="solid"/>
-            <a:round/>
-            <a:headEnd type="none" w="sm" len="sm"/>
-            <a:tailEnd type="none" w="sm" len="sm"/>
-          </a:ln>
-        </p:spPr>
-      </p:sp>
-    </p:spTree>
-    <p:extLst>
-      <p:ext uri="{BB962C8B-B14F-4D97-AF65-F5344CB8AC3E}">
-        <p14:creationId xmlns:p14="http://schemas.microsoft.com/office/powerpoint/2010/main" val="4011691641"/>
-      </p:ext>
-    </p:extLst>
-  </p:cSld>
-  <p:clrMapOvr>
-    <a:masterClrMapping/>
-  </p:clrMapOvr>
-</p:notes>
-</file>
-
-<file path=ppt/notesSlides/notesSlide16.xml><?xml version="1.0" encoding="utf-8"?>
-<p:notes xmlns:a="http://schemas.openxmlformats.org/drawingml/2006/main" xmlns:r="http://schemas.openxmlformats.org/officeDocument/2006/relationships" xmlns:p="http://schemas.openxmlformats.org/presentationml/2006/main" showMasterSp="0" showMasterPhAnim="0">
-  <p:cSld>
-    <p:spTree>
-      <p:nvGrpSpPr>
-        <p:cNvPr id="1" name="Shape 114">
-          <a:extLst>
-            <a:ext uri="{FF2B5EF4-FFF2-40B4-BE49-F238E27FC236}">
               <a16:creationId xmlns:a16="http://schemas.microsoft.com/office/drawing/2014/main" id="{9C72C5C3-A00E-0ABB-4C73-5ED76C1C6D25}"/>
             </a:ext>
           </a:extLst>
@@ -2851,7 +2744,7 @@
 </p:notes>
 </file>
 
-<file path=ppt/notesSlides/notesSlide17.xml><?xml version="1.0" encoding="utf-8"?>
+<file path=ppt/notesSlides/notesSlide16.xml><?xml version="1.0" encoding="utf-8"?>
 <p:notes xmlns:a="http://schemas.openxmlformats.org/drawingml/2006/main" xmlns:r="http://schemas.openxmlformats.org/officeDocument/2006/relationships" xmlns:p="http://schemas.openxmlformats.org/presentationml/2006/main" showMasterSp="0" showMasterPhAnim="0">
   <p:cSld>
     <p:spTree>
@@ -2996,7 +2889,7 @@
 </p:notes>
 </file>
 
-<file path=ppt/notesSlides/notesSlide18.xml><?xml version="1.0" encoding="utf-8"?>
+<file path=ppt/notesSlides/notesSlide17.xml><?xml version="1.0" encoding="utf-8"?>
 <p:notes xmlns:a="http://schemas.openxmlformats.org/drawingml/2006/main" xmlns:r="http://schemas.openxmlformats.org/officeDocument/2006/relationships" xmlns:p="http://schemas.openxmlformats.org/presentationml/2006/main" showMasterSp="0" showMasterPhAnim="0">
   <p:cSld>
     <p:spTree>
@@ -3123,7 +3016,7 @@
 </p:notes>
 </file>
 
-<file path=ppt/notesSlides/notesSlide19.xml><?xml version="1.0" encoding="utf-8"?>
+<file path=ppt/notesSlides/notesSlide18.xml><?xml version="1.0" encoding="utf-8"?>
 <p:notes xmlns:a="http://schemas.openxmlformats.org/drawingml/2006/main" xmlns:r="http://schemas.openxmlformats.org/officeDocument/2006/relationships" xmlns:p="http://schemas.openxmlformats.org/presentationml/2006/main" showMasterSp="0" showMasterPhAnim="0">
   <p:cSld>
     <p:spTree>
@@ -3259,6 +3152,151 @@
     <p:extLst>
       <p:ext uri="{BB962C8B-B14F-4D97-AF65-F5344CB8AC3E}">
         <p14:creationId xmlns:p14="http://schemas.microsoft.com/office/powerpoint/2010/main" val="3051017161"/>
+      </p:ext>
+    </p:extLst>
+  </p:cSld>
+  <p:clrMapOvr>
+    <a:masterClrMapping/>
+  </p:clrMapOvr>
+</p:notes>
+</file>
+
+<file path=ppt/notesSlides/notesSlide19.xml><?xml version="1.0" encoding="utf-8"?>
+<p:notes xmlns:a="http://schemas.openxmlformats.org/drawingml/2006/main" xmlns:r="http://schemas.openxmlformats.org/officeDocument/2006/relationships" xmlns:p="http://schemas.openxmlformats.org/presentationml/2006/main" showMasterSp="0" showMasterPhAnim="0">
+  <p:cSld>
+    <p:spTree>
+      <p:nvGrpSpPr>
+        <p:cNvPr id="1" name="Shape 114">
+          <a:extLst>
+            <a:ext uri="{FF2B5EF4-FFF2-40B4-BE49-F238E27FC236}">
+              <a16:creationId xmlns:a16="http://schemas.microsoft.com/office/drawing/2014/main" id="{E58AAF12-34E0-088E-0454-EBA87B2B3D43}"/>
+            </a:ext>
+          </a:extLst>
+        </p:cNvPr>
+        <p:cNvGrpSpPr/>
+        <p:nvPr/>
+      </p:nvGrpSpPr>
+      <p:grpSpPr>
+        <a:xfrm>
+          <a:off x="0" y="0"/>
+          <a:ext cx="0" cy="0"/>
+          <a:chOff x="0" y="0"/>
+          <a:chExt cx="0" cy="0"/>
+        </a:xfrm>
+      </p:grpSpPr>
+      <p:sp>
+        <p:nvSpPr>
+          <p:cNvPr id="115" name="Google Shape;115;p29:notes">
+            <a:extLst>
+              <a:ext uri="{FF2B5EF4-FFF2-40B4-BE49-F238E27FC236}">
+                <a16:creationId xmlns:a16="http://schemas.microsoft.com/office/drawing/2014/main" id="{2E84DFB4-C905-825D-852D-09E32C97236D}"/>
+              </a:ext>
+            </a:extLst>
+          </p:cNvPr>
+          <p:cNvSpPr txBox="1">
+            <a:spLocks noGrp="1"/>
+          </p:cNvSpPr>
+          <p:nvPr>
+            <p:ph type="body" idx="1"/>
+          </p:nvPr>
+        </p:nvSpPr>
+        <p:spPr>
+          <a:xfrm>
+            <a:off x="685800" y="4400550"/>
+            <a:ext cx="5486400" cy="3600450"/>
+          </a:xfrm>
+          <a:prstGeom prst="rect">
+            <a:avLst/>
+          </a:prstGeom>
+          <a:noFill/>
+          <a:ln>
+            <a:noFill/>
+          </a:ln>
+        </p:spPr>
+        <p:txBody>
+          <a:bodyPr spcFirstLastPara="1" wrap="square" lIns="91425" tIns="45700" rIns="91425" bIns="45700" anchor="t" anchorCtr="0">
+            <a:noAutofit/>
+          </a:bodyPr>
+          <a:lstStyle/>
+          <a:p>
+            <a:pPr marL="0" lvl="0" indent="0" algn="l" rtl="0">
+              <a:lnSpc>
+                <a:spcPct val="100000"/>
+              </a:lnSpc>
+              <a:spcBef>
+                <a:spcPts val="0"/>
+              </a:spcBef>
+              <a:spcAft>
+                <a:spcPts val="0"/>
+              </a:spcAft>
+              <a:buSzPts val="1400"/>
+              <a:buNone/>
+            </a:pPr>
+            <a:endParaRPr/>
+          </a:p>
+        </p:txBody>
+      </p:sp>
+      <p:sp>
+        <p:nvSpPr>
+          <p:cNvPr id="116" name="Google Shape;116;p29:notes">
+            <a:extLst>
+              <a:ext uri="{FF2B5EF4-FFF2-40B4-BE49-F238E27FC236}">
+                <a16:creationId xmlns:a16="http://schemas.microsoft.com/office/drawing/2014/main" id="{FB133C7C-D57A-17A7-D319-06A8A7799A6E}"/>
+              </a:ext>
+            </a:extLst>
+          </p:cNvPr>
+          <p:cNvSpPr>
+            <a:spLocks noGrp="1" noRot="1" noChangeAspect="1"/>
+          </p:cNvSpPr>
+          <p:nvPr>
+            <p:ph type="sldImg" idx="2"/>
+          </p:nvPr>
+        </p:nvSpPr>
+        <p:spPr>
+          <a:xfrm>
+            <a:off x="685800" y="1143000"/>
+            <a:ext cx="5486400" cy="3086100"/>
+          </a:xfrm>
+          <a:custGeom>
+            <a:avLst/>
+            <a:gdLst/>
+            <a:ahLst/>
+            <a:cxnLst/>
+            <a:rect l="l" t="t" r="r" b="b"/>
+            <a:pathLst>
+              <a:path w="120000" h="120000" extrusionOk="0">
+                <a:moveTo>
+                  <a:pt x="0" y="0"/>
+                </a:moveTo>
+                <a:lnTo>
+                  <a:pt x="120000" y="0"/>
+                </a:lnTo>
+                <a:lnTo>
+                  <a:pt x="120000" y="120000"/>
+                </a:lnTo>
+                <a:lnTo>
+                  <a:pt x="0" y="120000"/>
+                </a:lnTo>
+                <a:close/>
+              </a:path>
+            </a:pathLst>
+          </a:custGeom>
+          <a:noFill/>
+          <a:ln w="12700" cap="flat" cmpd="sng">
+            <a:solidFill>
+              <a:srgbClr val="000000"/>
+            </a:solidFill>
+            <a:prstDash val="solid"/>
+            <a:round/>
+            <a:headEnd type="none" w="sm" len="sm"/>
+            <a:tailEnd type="none" w="sm" len="sm"/>
+          </a:ln>
+        </p:spPr>
+      </p:sp>
+    </p:spTree>
+    <p:extLst>
+      <p:ext uri="{BB962C8B-B14F-4D97-AF65-F5344CB8AC3E}">
+        <p14:creationId xmlns:p14="http://schemas.microsoft.com/office/powerpoint/2010/main" val="921419817"/>
       </p:ext>
     </p:extLst>
   </p:cSld>
@@ -3421,151 +3459,6 @@
         <p:cNvPr id="1" name="Shape 114">
           <a:extLst>
             <a:ext uri="{FF2B5EF4-FFF2-40B4-BE49-F238E27FC236}">
-              <a16:creationId xmlns:a16="http://schemas.microsoft.com/office/drawing/2014/main" id="{E58AAF12-34E0-088E-0454-EBA87B2B3D43}"/>
-            </a:ext>
-          </a:extLst>
-        </p:cNvPr>
-        <p:cNvGrpSpPr/>
-        <p:nvPr/>
-      </p:nvGrpSpPr>
-      <p:grpSpPr>
-        <a:xfrm>
-          <a:off x="0" y="0"/>
-          <a:ext cx="0" cy="0"/>
-          <a:chOff x="0" y="0"/>
-          <a:chExt cx="0" cy="0"/>
-        </a:xfrm>
-      </p:grpSpPr>
-      <p:sp>
-        <p:nvSpPr>
-          <p:cNvPr id="115" name="Google Shape;115;p29:notes">
-            <a:extLst>
-              <a:ext uri="{FF2B5EF4-FFF2-40B4-BE49-F238E27FC236}">
-                <a16:creationId xmlns:a16="http://schemas.microsoft.com/office/drawing/2014/main" id="{2E84DFB4-C905-825D-852D-09E32C97236D}"/>
-              </a:ext>
-            </a:extLst>
-          </p:cNvPr>
-          <p:cNvSpPr txBox="1">
-            <a:spLocks noGrp="1"/>
-          </p:cNvSpPr>
-          <p:nvPr>
-            <p:ph type="body" idx="1"/>
-          </p:nvPr>
-        </p:nvSpPr>
-        <p:spPr>
-          <a:xfrm>
-            <a:off x="685800" y="4400550"/>
-            <a:ext cx="5486400" cy="3600450"/>
-          </a:xfrm>
-          <a:prstGeom prst="rect">
-            <a:avLst/>
-          </a:prstGeom>
-          <a:noFill/>
-          <a:ln>
-            <a:noFill/>
-          </a:ln>
-        </p:spPr>
-        <p:txBody>
-          <a:bodyPr spcFirstLastPara="1" wrap="square" lIns="91425" tIns="45700" rIns="91425" bIns="45700" anchor="t" anchorCtr="0">
-            <a:noAutofit/>
-          </a:bodyPr>
-          <a:lstStyle/>
-          <a:p>
-            <a:pPr marL="0" lvl="0" indent="0" algn="l" rtl="0">
-              <a:lnSpc>
-                <a:spcPct val="100000"/>
-              </a:lnSpc>
-              <a:spcBef>
-                <a:spcPts val="0"/>
-              </a:spcBef>
-              <a:spcAft>
-                <a:spcPts val="0"/>
-              </a:spcAft>
-              <a:buSzPts val="1400"/>
-              <a:buNone/>
-            </a:pPr>
-            <a:endParaRPr/>
-          </a:p>
-        </p:txBody>
-      </p:sp>
-      <p:sp>
-        <p:nvSpPr>
-          <p:cNvPr id="116" name="Google Shape;116;p29:notes">
-            <a:extLst>
-              <a:ext uri="{FF2B5EF4-FFF2-40B4-BE49-F238E27FC236}">
-                <a16:creationId xmlns:a16="http://schemas.microsoft.com/office/drawing/2014/main" id="{FB133C7C-D57A-17A7-D319-06A8A7799A6E}"/>
-              </a:ext>
-            </a:extLst>
-          </p:cNvPr>
-          <p:cNvSpPr>
-            <a:spLocks noGrp="1" noRot="1" noChangeAspect="1"/>
-          </p:cNvSpPr>
-          <p:nvPr>
-            <p:ph type="sldImg" idx="2"/>
-          </p:nvPr>
-        </p:nvSpPr>
-        <p:spPr>
-          <a:xfrm>
-            <a:off x="685800" y="1143000"/>
-            <a:ext cx="5486400" cy="3086100"/>
-          </a:xfrm>
-          <a:custGeom>
-            <a:avLst/>
-            <a:gdLst/>
-            <a:ahLst/>
-            <a:cxnLst/>
-            <a:rect l="l" t="t" r="r" b="b"/>
-            <a:pathLst>
-              <a:path w="120000" h="120000" extrusionOk="0">
-                <a:moveTo>
-                  <a:pt x="0" y="0"/>
-                </a:moveTo>
-                <a:lnTo>
-                  <a:pt x="120000" y="0"/>
-                </a:lnTo>
-                <a:lnTo>
-                  <a:pt x="120000" y="120000"/>
-                </a:lnTo>
-                <a:lnTo>
-                  <a:pt x="0" y="120000"/>
-                </a:lnTo>
-                <a:close/>
-              </a:path>
-            </a:pathLst>
-          </a:custGeom>
-          <a:noFill/>
-          <a:ln w="12700" cap="flat" cmpd="sng">
-            <a:solidFill>
-              <a:srgbClr val="000000"/>
-            </a:solidFill>
-            <a:prstDash val="solid"/>
-            <a:round/>
-            <a:headEnd type="none" w="sm" len="sm"/>
-            <a:tailEnd type="none" w="sm" len="sm"/>
-          </a:ln>
-        </p:spPr>
-      </p:sp>
-    </p:spTree>
-    <p:extLst>
-      <p:ext uri="{BB962C8B-B14F-4D97-AF65-F5344CB8AC3E}">
-        <p14:creationId xmlns:p14="http://schemas.microsoft.com/office/powerpoint/2010/main" val="921419817"/>
-      </p:ext>
-    </p:extLst>
-  </p:cSld>
-  <p:clrMapOvr>
-    <a:masterClrMapping/>
-  </p:clrMapOvr>
-</p:notes>
-</file>
-
-<file path=ppt/notesSlides/notesSlide21.xml><?xml version="1.0" encoding="utf-8"?>
-<p:notes xmlns:a="http://schemas.openxmlformats.org/drawingml/2006/main" xmlns:r="http://schemas.openxmlformats.org/officeDocument/2006/relationships" xmlns:p="http://schemas.openxmlformats.org/presentationml/2006/main" showMasterSp="0" showMasterPhAnim="0">
-  <p:cSld>
-    <p:spTree>
-      <p:nvGrpSpPr>
-        <p:cNvPr id="1" name="Shape 114">
-          <a:extLst>
-            <a:ext uri="{FF2B5EF4-FFF2-40B4-BE49-F238E27FC236}">
               <a16:creationId xmlns:a16="http://schemas.microsoft.com/office/drawing/2014/main" id="{225ED896-0A2C-8924-68AC-4D97268ABE8B}"/>
             </a:ext>
           </a:extLst>
@@ -3703,7 +3596,7 @@
 </p:notes>
 </file>
 
-<file path=ppt/notesSlides/notesSlide22.xml><?xml version="1.0" encoding="utf-8"?>
+<file path=ppt/notesSlides/notesSlide21.xml><?xml version="1.0" encoding="utf-8"?>
 <p:notes xmlns:a="http://schemas.openxmlformats.org/drawingml/2006/main" xmlns:r="http://schemas.openxmlformats.org/officeDocument/2006/relationships" xmlns:p="http://schemas.openxmlformats.org/presentationml/2006/main" showMasterSp="0" showMasterPhAnim="0">
   <p:cSld>
     <p:spTree>
@@ -3887,7 +3780,7 @@
 </p:notes>
 </file>
 
-<file path=ppt/notesSlides/notesSlide23.xml><?xml version="1.0" encoding="utf-8"?>
+<file path=ppt/notesSlides/notesSlide22.xml><?xml version="1.0" encoding="utf-8"?>
 <p:notes xmlns:a="http://schemas.openxmlformats.org/drawingml/2006/main" xmlns:r="http://schemas.openxmlformats.org/officeDocument/2006/relationships" xmlns:p="http://schemas.openxmlformats.org/presentationml/2006/main" showMasterSp="0" showMasterPhAnim="0">
   <p:cSld>
     <p:spTree>
@@ -4032,7 +3925,7 @@
 </p:notes>
 </file>
 
-<file path=ppt/notesSlides/notesSlide24.xml><?xml version="1.0" encoding="utf-8"?>
+<file path=ppt/notesSlides/notesSlide23.xml><?xml version="1.0" encoding="utf-8"?>
 <p:notes xmlns:a="http://schemas.openxmlformats.org/drawingml/2006/main" xmlns:r="http://schemas.openxmlformats.org/officeDocument/2006/relationships" xmlns:p="http://schemas.openxmlformats.org/presentationml/2006/main" showMasterSp="0" showMasterPhAnim="0">
   <p:cSld>
     <p:spTree>
@@ -4177,7 +4070,7 @@
 </p:notes>
 </file>
 
-<file path=ppt/notesSlides/notesSlide25.xml><?xml version="1.0" encoding="utf-8"?>
+<file path=ppt/notesSlides/notesSlide24.xml><?xml version="1.0" encoding="utf-8"?>
 <p:notes xmlns:a="http://schemas.openxmlformats.org/drawingml/2006/main" xmlns:r="http://schemas.openxmlformats.org/officeDocument/2006/relationships" xmlns:p="http://schemas.openxmlformats.org/presentationml/2006/main" showMasterSp="0" showMasterPhAnim="0">
   <p:cSld>
     <p:spTree>
@@ -4304,7 +4197,7 @@
 </p:notes>
 </file>
 
-<file path=ppt/notesSlides/notesSlide26.xml><?xml version="1.0" encoding="utf-8"?>
+<file path=ppt/notesSlides/notesSlide25.xml><?xml version="1.0" encoding="utf-8"?>
 <p:notes xmlns:a="http://schemas.openxmlformats.org/drawingml/2006/main" xmlns:r="http://schemas.openxmlformats.org/officeDocument/2006/relationships" xmlns:p="http://schemas.openxmlformats.org/presentationml/2006/main" showMasterSp="0" showMasterPhAnim="0">
   <p:cSld>
     <p:spTree>
@@ -4449,7 +4342,7 @@
 </p:notes>
 </file>
 
-<file path=ppt/notesSlides/notesSlide27.xml><?xml version="1.0" encoding="utf-8"?>
+<file path=ppt/notesSlides/notesSlide26.xml><?xml version="1.0" encoding="utf-8"?>
 <p:notes xmlns:a="http://schemas.openxmlformats.org/drawingml/2006/main" xmlns:r="http://schemas.openxmlformats.org/officeDocument/2006/relationships" xmlns:p="http://schemas.openxmlformats.org/presentationml/2006/main" showMasterSp="0" showMasterPhAnim="0">
   <p:cSld>
     <p:spTree>
@@ -4576,7 +4469,7 @@
 </p:notes>
 </file>
 
-<file path=ppt/notesSlides/notesSlide28.xml><?xml version="1.0" encoding="utf-8"?>
+<file path=ppt/notesSlides/notesSlide27.xml><?xml version="1.0" encoding="utf-8"?>
 <p:notes xmlns:a="http://schemas.openxmlformats.org/drawingml/2006/main" xmlns:r="http://schemas.openxmlformats.org/officeDocument/2006/relationships" xmlns:p="http://schemas.openxmlformats.org/presentationml/2006/main" showMasterSp="0" showMasterPhAnim="0">
   <p:cSld>
     <p:spTree>
@@ -22269,14 +22162,6 @@
               <a:rPr lang="en-US" sz="1800" dirty="0">
                 <a:latin typeface="+mj-lt"/>
               </a:rPr>
-              <a:t>Weak</a:t>
-            </a:r>
-          </a:p>
-          <a:p>
-            <a:r>
-              <a:rPr lang="en-US" sz="1800" dirty="0">
-                <a:latin typeface="+mj-lt"/>
-              </a:rPr>
               <a:t>Slow</a:t>
             </a:r>
           </a:p>
@@ -23062,883 +22947,6 @@
         <p:cNvPr id="1" name="Shape 117">
           <a:extLst>
             <a:ext uri="{FF2B5EF4-FFF2-40B4-BE49-F238E27FC236}">
-              <a16:creationId xmlns:a16="http://schemas.microsoft.com/office/drawing/2014/main" id="{15B9FDA8-6471-8C53-D666-84E001CDA33C}"/>
-            </a:ext>
-          </a:extLst>
-        </p:cNvPr>
-        <p:cNvGrpSpPr/>
-        <p:nvPr/>
-      </p:nvGrpSpPr>
-      <p:grpSpPr>
-        <a:xfrm>
-          <a:off x="0" y="0"/>
-          <a:ext cx="0" cy="0"/>
-          <a:chOff x="0" y="0"/>
-          <a:chExt cx="0" cy="0"/>
-        </a:xfrm>
-      </p:grpSpPr>
-      <p:sp>
-        <p:nvSpPr>
-          <p:cNvPr id="118" name="Google Shape;118;p29">
-            <a:extLst>
-              <a:ext uri="{FF2B5EF4-FFF2-40B4-BE49-F238E27FC236}">
-                <a16:creationId xmlns:a16="http://schemas.microsoft.com/office/drawing/2014/main" id="{D3F17A95-4F12-3B49-74A1-4B46F91A9428}"/>
-              </a:ext>
-            </a:extLst>
-          </p:cNvPr>
-          <p:cNvSpPr txBox="1">
-            <a:spLocks noGrp="1"/>
-          </p:cNvSpPr>
-          <p:nvPr>
-            <p:ph type="body" idx="1"/>
-          </p:nvPr>
-        </p:nvSpPr>
-        <p:spPr>
-          <a:xfrm>
-            <a:off x="376810" y="1334279"/>
-            <a:ext cx="5569988" cy="4821102"/>
-          </a:xfrm>
-          <a:prstGeom prst="rect">
-            <a:avLst/>
-          </a:prstGeom>
-          <a:noFill/>
-          <a:ln>
-            <a:noFill/>
-          </a:ln>
-        </p:spPr>
-        <p:txBody>
-          <a:bodyPr spcFirstLastPara="1" wrap="square" lIns="91425" tIns="45700" rIns="91425" bIns="45700" anchor="t" anchorCtr="0">
-            <a:noAutofit/>
-          </a:bodyPr>
-          <a:lstStyle/>
-          <a:p>
-            <a:pPr marL="114300" indent="0">
-              <a:buNone/>
-            </a:pPr>
-            <a:r>
-              <a:rPr lang="en-US" sz="1800" dirty="0">
-                <a:latin typeface="+mj-lt"/>
-              </a:rPr>
-              <a:t>Why not pull-up on outputs?</a:t>
-            </a:r>
-          </a:p>
-          <a:p>
-            <a:pPr marL="114300" indent="0">
-              <a:buNone/>
-            </a:pPr>
-            <a:r>
-              <a:rPr lang="en-US" sz="1800" dirty="0">
-                <a:latin typeface="+mj-lt"/>
-              </a:rPr>
-              <a:t>If you enabled a pull-up on an output:</a:t>
-            </a:r>
-          </a:p>
-          <a:p>
-            <a:r>
-              <a:rPr lang="en-US" sz="1800" dirty="0">
-                <a:latin typeface="+mj-lt"/>
-              </a:rPr>
-              <a:t>When output = LOW → pull-up fights the NMOS transistor</a:t>
-            </a:r>
-          </a:p>
-          <a:p>
-            <a:pPr marL="114300" indent="0">
-              <a:buNone/>
-            </a:pPr>
-            <a:r>
-              <a:rPr lang="en-US" sz="1800" dirty="0">
-                <a:latin typeface="+mj-lt"/>
-              </a:rPr>
-              <a:t>Causes:</a:t>
-            </a:r>
-          </a:p>
-          <a:p>
-            <a:r>
-              <a:rPr lang="en-US" sz="1800" dirty="0">
-                <a:latin typeface="+mj-lt"/>
-              </a:rPr>
-              <a:t>Unnecessary current draw (for the transistors)</a:t>
-            </a:r>
-          </a:p>
-          <a:p>
-            <a:r>
-              <a:rPr lang="en-US" sz="1800" dirty="0">
-                <a:latin typeface="+mj-lt"/>
-              </a:rPr>
-              <a:t>Increased power dissipation</a:t>
-            </a:r>
-          </a:p>
-          <a:p>
-            <a:r>
-              <a:rPr lang="en-US" sz="1800" dirty="0">
-                <a:latin typeface="+mj-lt"/>
-              </a:rPr>
-              <a:t>Potential electromagnetic interference</a:t>
-            </a:r>
-          </a:p>
-          <a:p>
-            <a:r>
-              <a:rPr lang="en-US" sz="1800" dirty="0">
-                <a:latin typeface="+mj-lt"/>
-              </a:rPr>
-              <a:t>No benefit whatsoever</a:t>
-            </a:r>
-          </a:p>
-        </p:txBody>
-      </p:sp>
-      <p:sp>
-        <p:nvSpPr>
-          <p:cNvPr id="119" name="Google Shape;119;p29">
-            <a:extLst>
-              <a:ext uri="{FF2B5EF4-FFF2-40B4-BE49-F238E27FC236}">
-                <a16:creationId xmlns:a16="http://schemas.microsoft.com/office/drawing/2014/main" id="{38924974-188D-7212-BD3A-E05A98755411}"/>
-              </a:ext>
-            </a:extLst>
-          </p:cNvPr>
-          <p:cNvSpPr/>
-          <p:nvPr/>
-        </p:nvSpPr>
-        <p:spPr>
-          <a:xfrm rot="10800000" flipH="1">
-            <a:off x="0" y="0"/>
-            <a:ext cx="12192000" cy="868220"/>
-          </a:xfrm>
-          <a:prstGeom prst="rect">
-            <a:avLst/>
-          </a:prstGeom>
-          <a:solidFill>
-            <a:srgbClr val="13294B"/>
-          </a:solidFill>
-          <a:ln>
-            <a:noFill/>
-          </a:ln>
-        </p:spPr>
-        <p:txBody>
-          <a:bodyPr spcFirstLastPara="1" wrap="square" lIns="91425" tIns="45700" rIns="91425" bIns="45700" anchor="ctr" anchorCtr="0">
-            <a:noAutofit/>
-          </a:bodyPr>
-          <a:lstStyle/>
-          <a:p>
-            <a:pPr marL="0" marR="0" lvl="0" indent="0" algn="ctr" rtl="0">
-              <a:lnSpc>
-                <a:spcPct val="100000"/>
-              </a:lnSpc>
-              <a:spcBef>
-                <a:spcPts val="0"/>
-              </a:spcBef>
-              <a:spcAft>
-                <a:spcPts val="0"/>
-              </a:spcAft>
-              <a:buClr>
-                <a:schemeClr val="lt1"/>
-              </a:buClr>
-              <a:buSzPts val="1800"/>
-              <a:buFont typeface="Calibri"/>
-              <a:buNone/>
-            </a:pPr>
-            <a:endParaRPr sz="1800" b="0" i="0" u="none" strike="noStrike" cap="none">
-              <a:solidFill>
-                <a:srgbClr val="13294B"/>
-              </a:solidFill>
-              <a:latin typeface="Calibri"/>
-              <a:ea typeface="Calibri"/>
-              <a:cs typeface="Calibri"/>
-              <a:sym typeface="Calibri"/>
-            </a:endParaRPr>
-          </a:p>
-        </p:txBody>
-      </p:sp>
-      <p:sp>
-        <p:nvSpPr>
-          <p:cNvPr id="120" name="Google Shape;120;p29">
-            <a:extLst>
-              <a:ext uri="{FF2B5EF4-FFF2-40B4-BE49-F238E27FC236}">
-                <a16:creationId xmlns:a16="http://schemas.microsoft.com/office/drawing/2014/main" id="{EDEE202E-58D4-3DDC-C561-58D443B7E31D}"/>
-              </a:ext>
-            </a:extLst>
-          </p:cNvPr>
-          <p:cNvSpPr txBox="1"/>
-          <p:nvPr/>
-        </p:nvSpPr>
-        <p:spPr>
-          <a:xfrm>
-            <a:off x="376810" y="204051"/>
-            <a:ext cx="10910026" cy="461624"/>
-          </a:xfrm>
-          <a:prstGeom prst="rect">
-            <a:avLst/>
-          </a:prstGeom>
-          <a:noFill/>
-          <a:ln>
-            <a:noFill/>
-          </a:ln>
-        </p:spPr>
-        <p:txBody>
-          <a:bodyPr spcFirstLastPara="1" wrap="square" lIns="91425" tIns="45700" rIns="91425" bIns="45700" anchor="t" anchorCtr="0">
-            <a:spAutoFit/>
-          </a:bodyPr>
-          <a:lstStyle/>
-          <a:p>
-            <a:pPr marL="0" marR="0" lvl="0" indent="0" algn="l" rtl="0">
-              <a:lnSpc>
-                <a:spcPct val="100000"/>
-              </a:lnSpc>
-              <a:spcBef>
-                <a:spcPts val="0"/>
-              </a:spcBef>
-              <a:spcAft>
-                <a:spcPts val="0"/>
-              </a:spcAft>
-              <a:buClr>
-                <a:srgbClr val="000000"/>
-              </a:buClr>
-              <a:buSzPts val="2400"/>
-              <a:buFont typeface="Arial"/>
-              <a:buNone/>
-            </a:pPr>
-            <a:r>
-              <a:rPr lang="en-US" sz="2400" b="0" i="0" u="none" strike="noStrike" cap="none" dirty="0">
-                <a:solidFill>
-                  <a:schemeClr val="lt1"/>
-                </a:solidFill>
-                <a:latin typeface="Arial"/>
-                <a:ea typeface="Arial"/>
-                <a:cs typeface="Arial"/>
-                <a:sym typeface="Arial"/>
-              </a:rPr>
-              <a:t>Push-Pull - Output</a:t>
-            </a:r>
-            <a:endParaRPr sz="2400" b="0" i="0" u="none" strike="noStrike" cap="none" dirty="0">
-              <a:solidFill>
-                <a:schemeClr val="lt1"/>
-              </a:solidFill>
-              <a:latin typeface="Arial"/>
-              <a:ea typeface="Arial"/>
-              <a:cs typeface="Arial"/>
-              <a:sym typeface="Arial"/>
-            </a:endParaRPr>
-          </a:p>
-        </p:txBody>
-      </p:sp>
-      <p:pic>
-        <p:nvPicPr>
-          <p:cNvPr id="121" name="Google Shape;121;p29">
-            <a:extLst>
-              <a:ext uri="{FF2B5EF4-FFF2-40B4-BE49-F238E27FC236}">
-                <a16:creationId xmlns:a16="http://schemas.microsoft.com/office/drawing/2014/main" id="{D5F1156F-A06E-0920-B772-50C4201830E4}"/>
-              </a:ext>
-            </a:extLst>
-          </p:cNvPr>
-          <p:cNvPicPr preferRelativeResize="0"/>
-          <p:nvPr/>
-        </p:nvPicPr>
-        <p:blipFill rotWithShape="1">
-          <a:blip r:embed="rId3">
-            <a:alphaModFix/>
-          </a:blip>
-          <a:srcRect/>
-          <a:stretch/>
-        </p:blipFill>
-        <p:spPr>
-          <a:xfrm>
-            <a:off x="11557509" y="233819"/>
-            <a:ext cx="271308" cy="389810"/>
-          </a:xfrm>
-          <a:prstGeom prst="rect">
-            <a:avLst/>
-          </a:prstGeom>
-          <a:noFill/>
-          <a:ln>
-            <a:noFill/>
-          </a:ln>
-        </p:spPr>
-      </p:pic>
-      <p:sp>
-        <p:nvSpPr>
-          <p:cNvPr id="122" name="Google Shape;122;p29">
-            <a:extLst>
-              <a:ext uri="{FF2B5EF4-FFF2-40B4-BE49-F238E27FC236}">
-                <a16:creationId xmlns:a16="http://schemas.microsoft.com/office/drawing/2014/main" id="{6E4DDDFB-D47F-C060-AE93-4431454F3767}"/>
-              </a:ext>
-            </a:extLst>
-          </p:cNvPr>
-          <p:cNvSpPr txBox="1"/>
-          <p:nvPr/>
-        </p:nvSpPr>
-        <p:spPr>
-          <a:xfrm>
-            <a:off x="9335597" y="6524381"/>
-            <a:ext cx="2473415" cy="230792"/>
-          </a:xfrm>
-          <a:prstGeom prst="rect">
-            <a:avLst/>
-          </a:prstGeom>
-          <a:noFill/>
-          <a:ln>
-            <a:noFill/>
-          </a:ln>
-        </p:spPr>
-        <p:txBody>
-          <a:bodyPr spcFirstLastPara="1" wrap="square" lIns="91425" tIns="45700" rIns="91425" bIns="45700" anchor="t" anchorCtr="0">
-            <a:spAutoFit/>
-          </a:bodyPr>
-          <a:lstStyle/>
-          <a:p>
-            <a:pPr marL="0" marR="0" lvl="0" indent="0" algn="r" rtl="0">
-              <a:lnSpc>
-                <a:spcPct val="100000"/>
-              </a:lnSpc>
-              <a:spcBef>
-                <a:spcPts val="0"/>
-              </a:spcBef>
-              <a:spcAft>
-                <a:spcPts val="0"/>
-              </a:spcAft>
-              <a:buNone/>
-            </a:pPr>
-            <a:r>
-              <a:rPr lang="en-US" sz="900" b="0" i="0" u="none" strike="noStrike" cap="none">
-                <a:solidFill>
-                  <a:srgbClr val="13294B"/>
-                </a:solidFill>
-                <a:latin typeface="Arial"/>
-                <a:ea typeface="Arial"/>
-                <a:cs typeface="Arial"/>
-                <a:sym typeface="Arial"/>
-              </a:rPr>
-              <a:t>GRAINGER ENGINEERING</a:t>
-            </a:r>
-            <a:endParaRPr/>
-          </a:p>
-        </p:txBody>
-      </p:sp>
-      <p:sp>
-        <p:nvSpPr>
-          <p:cNvPr id="123" name="Google Shape;123;p29">
-            <a:extLst>
-              <a:ext uri="{FF2B5EF4-FFF2-40B4-BE49-F238E27FC236}">
-                <a16:creationId xmlns:a16="http://schemas.microsoft.com/office/drawing/2014/main" id="{23FC077A-7F33-9ABC-CFCA-3DF45686BA4A}"/>
-              </a:ext>
-            </a:extLst>
-          </p:cNvPr>
-          <p:cNvSpPr txBox="1"/>
-          <p:nvPr/>
-        </p:nvSpPr>
-        <p:spPr>
-          <a:xfrm>
-            <a:off x="376807" y="6524381"/>
-            <a:ext cx="7991337" cy="230792"/>
-          </a:xfrm>
-          <a:prstGeom prst="rect">
-            <a:avLst/>
-          </a:prstGeom>
-          <a:noFill/>
-          <a:ln>
-            <a:noFill/>
-          </a:ln>
-        </p:spPr>
-        <p:txBody>
-          <a:bodyPr spcFirstLastPara="1" wrap="square" lIns="91425" tIns="45700" rIns="91425" bIns="45700" anchor="t" anchorCtr="0">
-            <a:spAutoFit/>
-          </a:bodyPr>
-          <a:lstStyle/>
-          <a:p>
-            <a:pPr marL="0" marR="0" lvl="0" indent="0" algn="l" rtl="0">
-              <a:lnSpc>
-                <a:spcPct val="100000"/>
-              </a:lnSpc>
-              <a:spcBef>
-                <a:spcPts val="0"/>
-              </a:spcBef>
-              <a:spcAft>
-                <a:spcPts val="0"/>
-              </a:spcAft>
-              <a:buNone/>
-            </a:pPr>
-            <a:r>
-              <a:rPr lang="en-US" sz="900" dirty="0">
-                <a:solidFill>
-                  <a:srgbClr val="13294B"/>
-                </a:solidFill>
-              </a:rPr>
-              <a:t>SYSTEMS ENGINEERING </a:t>
-            </a:r>
-            <a:endParaRPr dirty="0"/>
-          </a:p>
-        </p:txBody>
-      </p:sp>
-      <p:grpSp>
-        <p:nvGrpSpPr>
-          <p:cNvPr id="124" name="Google Shape;124;p29">
-            <a:extLst>
-              <a:ext uri="{FF2B5EF4-FFF2-40B4-BE49-F238E27FC236}">
-                <a16:creationId xmlns:a16="http://schemas.microsoft.com/office/drawing/2014/main" id="{77B74BA4-79E4-2489-956E-B4B34E8A5BED}"/>
-              </a:ext>
-            </a:extLst>
-          </p:cNvPr>
-          <p:cNvGrpSpPr/>
-          <p:nvPr/>
-        </p:nvGrpSpPr>
-        <p:grpSpPr>
-          <a:xfrm>
-            <a:off x="4066674" y="6601537"/>
-            <a:ext cx="5233412" cy="70446"/>
-            <a:chOff x="4033424" y="6601537"/>
-            <a:chExt cx="5233412" cy="70446"/>
-          </a:xfrm>
-        </p:grpSpPr>
-        <p:cxnSp>
-          <p:nvCxnSpPr>
-            <p:cNvPr id="125" name="Google Shape;125;p29">
-              <a:extLst>
-                <a:ext uri="{FF2B5EF4-FFF2-40B4-BE49-F238E27FC236}">
-                  <a16:creationId xmlns:a16="http://schemas.microsoft.com/office/drawing/2014/main" id="{20AEFD07-837F-97E5-0738-F7541FF12971}"/>
-                </a:ext>
-              </a:extLst>
-            </p:cNvPr>
-            <p:cNvCxnSpPr/>
-            <p:nvPr/>
-          </p:nvCxnSpPr>
-          <p:spPr>
-            <a:xfrm rot="10800000">
-              <a:off x="4033424" y="6639606"/>
-              <a:ext cx="5164651" cy="0"/>
-            </a:xfrm>
-            <a:prstGeom prst="straightConnector1">
-              <a:avLst/>
-            </a:prstGeom>
-            <a:noFill/>
-            <a:ln w="9525" cap="flat" cmpd="sng">
-              <a:solidFill>
-                <a:srgbClr val="13294B"/>
-              </a:solidFill>
-              <a:prstDash val="solid"/>
-              <a:round/>
-              <a:headEnd type="none" w="sm" len="sm"/>
-              <a:tailEnd type="none" w="sm" len="sm"/>
-            </a:ln>
-          </p:spPr>
-        </p:cxnSp>
-        <p:sp>
-          <p:nvSpPr>
-            <p:cNvPr id="126" name="Google Shape;126;p29">
-              <a:extLst>
-                <a:ext uri="{FF2B5EF4-FFF2-40B4-BE49-F238E27FC236}">
-                  <a16:creationId xmlns:a16="http://schemas.microsoft.com/office/drawing/2014/main" id="{235B5F7E-F09F-7C04-C5FB-1189BA76FB09}"/>
-                </a:ext>
-              </a:extLst>
-            </p:cNvPr>
-            <p:cNvSpPr/>
-            <p:nvPr/>
-          </p:nvSpPr>
-          <p:spPr>
-            <a:xfrm>
-              <a:off x="9196390" y="6601537"/>
-              <a:ext cx="70446" cy="70446"/>
-            </a:xfrm>
-            <a:prstGeom prst="ellipse">
-              <a:avLst/>
-            </a:prstGeom>
-            <a:solidFill>
-              <a:srgbClr val="13294B"/>
-            </a:solidFill>
-            <a:ln>
-              <a:noFill/>
-            </a:ln>
-          </p:spPr>
-          <p:txBody>
-            <a:bodyPr spcFirstLastPara="1" wrap="square" lIns="91425" tIns="45700" rIns="91425" bIns="45700" anchor="ctr" anchorCtr="0">
-              <a:noAutofit/>
-            </a:bodyPr>
-            <a:lstStyle/>
-            <a:p>
-              <a:pPr marL="0" marR="0" lvl="0" indent="0" algn="ctr" rtl="0">
-                <a:lnSpc>
-                  <a:spcPct val="100000"/>
-                </a:lnSpc>
-                <a:spcBef>
-                  <a:spcPts val="0"/>
-                </a:spcBef>
-                <a:spcAft>
-                  <a:spcPts val="0"/>
-                </a:spcAft>
-                <a:buNone/>
-              </a:pPr>
-              <a:endParaRPr sz="1400" b="0" i="0" u="none" strike="noStrike" cap="none">
-                <a:solidFill>
-                  <a:srgbClr val="13294B"/>
-                </a:solidFill>
-                <a:latin typeface="Arial"/>
-                <a:ea typeface="Arial"/>
-                <a:cs typeface="Arial"/>
-                <a:sym typeface="Arial"/>
-              </a:endParaRPr>
-            </a:p>
-          </p:txBody>
-        </p:sp>
-      </p:grpSp>
-      <p:pic>
-        <p:nvPicPr>
-          <p:cNvPr id="4098" name="Picture 2" descr="undefined">
-            <a:extLst>
-              <a:ext uri="{FF2B5EF4-FFF2-40B4-BE49-F238E27FC236}">
-                <a16:creationId xmlns:a16="http://schemas.microsoft.com/office/drawing/2014/main" id="{AE218386-6505-8AB5-C0CF-520DB9378E98}"/>
-              </a:ext>
-            </a:extLst>
-          </p:cNvPr>
-          <p:cNvPicPr>
-            <a:picLocks noChangeAspect="1" noChangeArrowheads="1"/>
-          </p:cNvPicPr>
-          <p:nvPr/>
-        </p:nvPicPr>
-        <p:blipFill>
-          <a:blip r:embed="rId4">
-            <a:extLst>
-              <a:ext uri="{28A0092B-C50C-407E-A947-70E740481C1C}">
-                <a14:useLocalDpi xmlns:a14="http://schemas.microsoft.com/office/drawing/2010/main" val="0"/>
-              </a:ext>
-            </a:extLst>
-          </a:blip>
-          <a:srcRect/>
-          <a:stretch>
-            <a:fillRect/>
-          </a:stretch>
-        </p:blipFill>
-        <p:spPr bwMode="auto">
-          <a:xfrm>
-            <a:off x="5743030" y="1662545"/>
-            <a:ext cx="6286978" cy="3929361"/>
-          </a:xfrm>
-          <a:prstGeom prst="rect">
-            <a:avLst/>
-          </a:prstGeom>
-          <a:noFill/>
-          <a:extLst>
-            <a:ext uri="{909E8E84-426E-40DD-AFC4-6F175D3DCCD1}">
-              <a14:hiddenFill xmlns:a14="http://schemas.microsoft.com/office/drawing/2010/main">
-                <a:solidFill>
-                  <a:srgbClr val="FFFFFF"/>
-                </a:solidFill>
-              </a14:hiddenFill>
-            </a:ext>
-          </a:extLst>
-        </p:spPr>
-      </p:pic>
-      <p:sp>
-        <p:nvSpPr>
-          <p:cNvPr id="2" name="Rectangle 3">
-            <a:extLst>
-              <a:ext uri="{FF2B5EF4-FFF2-40B4-BE49-F238E27FC236}">
-                <a16:creationId xmlns:a16="http://schemas.microsoft.com/office/drawing/2014/main" id="{4E6561AE-93D5-16C8-E07D-859B48486B2F}"/>
-              </a:ext>
-            </a:extLst>
-          </p:cNvPr>
-          <p:cNvSpPr>
-            <a:spLocks noChangeArrowheads="1"/>
-          </p:cNvSpPr>
-          <p:nvPr/>
-        </p:nvSpPr>
-        <p:spPr bwMode="auto">
-          <a:xfrm>
-            <a:off x="0" y="0"/>
-            <a:ext cx="12192000" cy="0"/>
-          </a:xfrm>
-          <a:prstGeom prst="rect">
-            <a:avLst/>
-          </a:prstGeom>
-          <a:noFill/>
-          <a:ln>
-            <a:noFill/>
-          </a:ln>
-          <a:effectLst/>
-          <a:extLst>
-            <a:ext uri="{909E8E84-426E-40DD-AFC4-6F175D3DCCD1}">
-              <a14:hiddenFill xmlns:a14="http://schemas.microsoft.com/office/drawing/2010/main">
-                <a:solidFill>
-                  <a:schemeClr val="accent1"/>
-                </a:solidFill>
-              </a14:hiddenFill>
-            </a:ext>
-            <a:ext uri="{91240B29-F687-4F45-9708-019B960494DF}">
-              <a14:hiddenLine xmlns:a14="http://schemas.microsoft.com/office/drawing/2010/main" w="9525">
-                <a:solidFill>
-                  <a:schemeClr val="tx1"/>
-                </a:solidFill>
-                <a:miter lim="800000"/>
-                <a:headEnd/>
-                <a:tailEnd/>
-              </a14:hiddenLine>
-            </a:ext>
-            <a:ext uri="{AF507438-7753-43E0-B8FC-AC1667EBCBE1}">
-              <a14:hiddenEffects xmlns:a14="http://schemas.microsoft.com/office/drawing/2010/main">
-                <a:effectLst>
-                  <a:outerShdw dist="35921" dir="2700000" algn="ctr" rotWithShape="0">
-                    <a:schemeClr val="bg2"/>
-                  </a:outerShdw>
-                </a:effectLst>
-              </a14:hiddenEffects>
-            </a:ext>
-          </a:extLst>
-        </p:spPr>
-        <p:txBody>
-          <a:bodyPr vert="horz" wrap="none" lIns="91440" tIns="45720" rIns="91440" bIns="45720" numCol="1" anchor="ctr" anchorCtr="0" compatLnSpc="1">
-            <a:prstTxWarp prst="textNoShape">
-              <a:avLst/>
-            </a:prstTxWarp>
-            <a:spAutoFit/>
-          </a:bodyPr>
-          <a:lstStyle/>
-          <a:p>
-            <a:pPr marL="0" marR="0" lvl="0" indent="0" algn="l" defTabSz="914400" rtl="0" eaLnBrk="0" fontAlgn="base" latinLnBrk="0" hangingPunct="0">
-              <a:lnSpc>
-                <a:spcPct val="100000"/>
-              </a:lnSpc>
-              <a:spcBef>
-                <a:spcPct val="0"/>
-              </a:spcBef>
-              <a:spcAft>
-                <a:spcPct val="0"/>
-              </a:spcAft>
-              <a:buClrTx/>
-              <a:buSzTx/>
-              <a:buFontTx/>
-              <a:buChar char="•"/>
-              <a:tabLst/>
-            </a:pPr>
-            <a:r>
-              <a:rPr kumimoji="0" lang="en-US" altLang="en-US" sz="1800" b="0" i="0" u="none" strike="noStrike" cap="none" normalizeH="0" baseline="0">
-                <a:ln>
-                  <a:noFill/>
-                </a:ln>
-                <a:solidFill>
-                  <a:schemeClr val="tx1"/>
-                </a:solidFill>
-                <a:effectLst/>
-                <a:latin typeface="Arial" panose="020B0604020202020204" pitchFamily="34" charset="0"/>
-              </a:rPr>
-              <a:t>A PMOS transistor pulls the pin </a:t>
-            </a:r>
-            <a:r>
-              <a:rPr kumimoji="0" lang="en-US" altLang="en-US" sz="1800" b="1" i="0" u="none" strike="noStrike" cap="none" normalizeH="0" baseline="0">
-                <a:ln>
-                  <a:noFill/>
-                </a:ln>
-                <a:solidFill>
-                  <a:schemeClr val="tx1"/>
-                </a:solidFill>
-                <a:effectLst/>
-                <a:latin typeface="Arial" panose="020B0604020202020204" pitchFamily="34" charset="0"/>
-              </a:rPr>
-              <a:t>up</a:t>
-            </a:r>
-            <a:r>
-              <a:rPr kumimoji="0" lang="en-US" altLang="en-US" sz="1800" b="0" i="0" u="none" strike="noStrike" cap="none" normalizeH="0" baseline="0">
-                <a:ln>
-                  <a:noFill/>
-                </a:ln>
-                <a:solidFill>
-                  <a:schemeClr val="tx1"/>
-                </a:solidFill>
-                <a:effectLst/>
-                <a:latin typeface="Arial" panose="020B0604020202020204" pitchFamily="34" charset="0"/>
-              </a:rPr>
-              <a:t> to 3.3 V</a:t>
-            </a:r>
-          </a:p>
-          <a:p>
-            <a:pPr marL="0" marR="0" lvl="0" indent="0" algn="l" defTabSz="914400" rtl="0" eaLnBrk="0" fontAlgn="base" latinLnBrk="0" hangingPunct="0">
-              <a:lnSpc>
-                <a:spcPct val="100000"/>
-              </a:lnSpc>
-              <a:spcBef>
-                <a:spcPct val="0"/>
-              </a:spcBef>
-              <a:spcAft>
-                <a:spcPct val="0"/>
-              </a:spcAft>
-              <a:buClrTx/>
-              <a:buSzTx/>
-              <a:buFontTx/>
-              <a:buChar char="•"/>
-              <a:tabLst/>
-            </a:pPr>
-            <a:endParaRPr kumimoji="0" lang="en-US" altLang="en-US" sz="1800" b="0" i="0" u="none" strike="noStrike" cap="none" normalizeH="0" baseline="0">
-              <a:ln>
-                <a:noFill/>
-              </a:ln>
-              <a:solidFill>
-                <a:schemeClr val="tx1"/>
-              </a:solidFill>
-              <a:effectLst/>
-              <a:latin typeface="Arial" panose="020B0604020202020204" pitchFamily="34" charset="0"/>
-            </a:endParaRPr>
-          </a:p>
-        </p:txBody>
-      </p:sp>
-      <p:sp>
-        <p:nvSpPr>
-          <p:cNvPr id="3" name="TextBox 2">
-            <a:extLst>
-              <a:ext uri="{FF2B5EF4-FFF2-40B4-BE49-F238E27FC236}">
-                <a16:creationId xmlns:a16="http://schemas.microsoft.com/office/drawing/2014/main" id="{689843F0-EEDA-DC34-A3DD-3F42C9214915}"/>
-              </a:ext>
-            </a:extLst>
-          </p:cNvPr>
-          <p:cNvSpPr txBox="1"/>
-          <p:nvPr/>
-        </p:nvSpPr>
-        <p:spPr>
-          <a:xfrm>
-            <a:off x="6934861" y="5591906"/>
-            <a:ext cx="4730449" cy="523220"/>
-          </a:xfrm>
-          <a:prstGeom prst="rect">
-            <a:avLst/>
-          </a:prstGeom>
-          <a:noFill/>
-        </p:spPr>
-        <p:txBody>
-          <a:bodyPr wrap="square" rtlCol="0">
-            <a:spAutoFit/>
-          </a:bodyPr>
-          <a:lstStyle/>
-          <a:p>
-            <a:r>
-              <a:rPr lang="en-US" dirty="0"/>
-              <a:t>( I wanted to create the animation for this, but if this text is still here, then it has not been done yet.) </a:t>
-            </a:r>
-          </a:p>
-        </p:txBody>
-      </p:sp>
-      <p:sp>
-        <p:nvSpPr>
-          <p:cNvPr id="4" name="TextBox 3">
-            <a:extLst>
-              <a:ext uri="{FF2B5EF4-FFF2-40B4-BE49-F238E27FC236}">
-                <a16:creationId xmlns:a16="http://schemas.microsoft.com/office/drawing/2014/main" id="{4824AB6D-23DD-07A5-3D8D-3F4FDA53C1BE}"/>
-              </a:ext>
-            </a:extLst>
-          </p:cNvPr>
-          <p:cNvSpPr txBox="1"/>
-          <p:nvPr/>
-        </p:nvSpPr>
-        <p:spPr>
-          <a:xfrm>
-            <a:off x="8267966" y="2302161"/>
-            <a:ext cx="914400" cy="307777"/>
-          </a:xfrm>
-          <a:prstGeom prst="rect">
-            <a:avLst/>
-          </a:prstGeom>
-          <a:noFill/>
-        </p:spPr>
-        <p:txBody>
-          <a:bodyPr wrap="square" rtlCol="0">
-            <a:spAutoFit/>
-          </a:bodyPr>
-          <a:lstStyle/>
-          <a:p>
-            <a:pPr algn="ctr"/>
-            <a:r>
-              <a:rPr lang="en-US" dirty="0"/>
-              <a:t>NMOS</a:t>
-            </a:r>
-          </a:p>
-        </p:txBody>
-      </p:sp>
-      <p:sp>
-        <p:nvSpPr>
-          <p:cNvPr id="5" name="TextBox 4">
-            <a:extLst>
-              <a:ext uri="{FF2B5EF4-FFF2-40B4-BE49-F238E27FC236}">
-                <a16:creationId xmlns:a16="http://schemas.microsoft.com/office/drawing/2014/main" id="{4726AAE3-6FA7-36F3-1001-C332110065FE}"/>
-              </a:ext>
-            </a:extLst>
-          </p:cNvPr>
-          <p:cNvSpPr txBox="1"/>
-          <p:nvPr/>
-        </p:nvSpPr>
-        <p:spPr>
-          <a:xfrm>
-            <a:off x="8315240" y="3696300"/>
-            <a:ext cx="914400" cy="307777"/>
-          </a:xfrm>
-          <a:prstGeom prst="rect">
-            <a:avLst/>
-          </a:prstGeom>
-          <a:noFill/>
-        </p:spPr>
-        <p:txBody>
-          <a:bodyPr wrap="square" rtlCol="0">
-            <a:spAutoFit/>
-          </a:bodyPr>
-          <a:lstStyle/>
-          <a:p>
-            <a:pPr algn="ctr"/>
-            <a:r>
-              <a:rPr lang="en-US" dirty="0"/>
-              <a:t>PMOS</a:t>
-            </a:r>
-          </a:p>
-        </p:txBody>
-      </p:sp>
-      <p:sp>
-        <p:nvSpPr>
-          <p:cNvPr id="6" name="TextBox 5">
-            <a:extLst>
-              <a:ext uri="{FF2B5EF4-FFF2-40B4-BE49-F238E27FC236}">
-                <a16:creationId xmlns:a16="http://schemas.microsoft.com/office/drawing/2014/main" id="{DD61276D-E309-C3EC-6C69-08351058263B}"/>
-              </a:ext>
-            </a:extLst>
-          </p:cNvPr>
-          <p:cNvSpPr txBox="1"/>
-          <p:nvPr/>
-        </p:nvSpPr>
-        <p:spPr>
-          <a:xfrm>
-            <a:off x="6712086" y="2769140"/>
-            <a:ext cx="1193259" cy="523220"/>
-          </a:xfrm>
-          <a:prstGeom prst="rect">
-            <a:avLst/>
-          </a:prstGeom>
-          <a:noFill/>
-        </p:spPr>
-        <p:txBody>
-          <a:bodyPr wrap="square" rtlCol="0">
-            <a:spAutoFit/>
-          </a:bodyPr>
-          <a:lstStyle/>
-          <a:p>
-            <a:pPr algn="ctr"/>
-            <a:r>
-              <a:rPr lang="en-US" dirty="0"/>
-              <a:t>Operational Amplifier</a:t>
-            </a:r>
-          </a:p>
-        </p:txBody>
-      </p:sp>
-    </p:spTree>
-    <p:extLst>
-      <p:ext uri="{BB962C8B-B14F-4D97-AF65-F5344CB8AC3E}">
-        <p14:creationId xmlns:p14="http://schemas.microsoft.com/office/powerpoint/2010/main" val="1217446402"/>
-      </p:ext>
-    </p:extLst>
-  </p:cSld>
-  <p:clrMapOvr>
-    <a:masterClrMapping/>
-  </p:clrMapOvr>
-</p:sld>
-</file>
-
-<file path=ppt/slides/slide16.xml><?xml version="1.0" encoding="utf-8"?>
-<p:sld xmlns:a="http://schemas.openxmlformats.org/drawingml/2006/main" xmlns:r="http://schemas.openxmlformats.org/officeDocument/2006/relationships" xmlns:p="http://schemas.openxmlformats.org/presentationml/2006/main">
-  <p:cSld>
-    <p:spTree>
-      <p:nvGrpSpPr>
-        <p:cNvPr id="1" name="Shape 117">
-          <a:extLst>
-            <a:ext uri="{FF2B5EF4-FFF2-40B4-BE49-F238E27FC236}">
               <a16:creationId xmlns:a16="http://schemas.microsoft.com/office/drawing/2014/main" id="{C755900A-1584-865A-E16E-977CAC8219FB}"/>
             </a:ext>
           </a:extLst>
@@ -24848,7 +23856,7 @@
 </p:sld>
 </file>
 
-<file path=ppt/slides/slide17.xml><?xml version="1.0" encoding="utf-8"?>
+<file path=ppt/slides/slide16.xml><?xml version="1.0" encoding="utf-8"?>
 <p:sld xmlns:a="http://schemas.openxmlformats.org/drawingml/2006/main" xmlns:r="http://schemas.openxmlformats.org/officeDocument/2006/relationships" xmlns:p="http://schemas.openxmlformats.org/presentationml/2006/main">
   <p:cSld>
     <p:spTree>
@@ -24929,7 +23937,7 @@
                 <a:cs typeface="Arial"/>
                 <a:sym typeface="Arial"/>
               </a:rPr>
-              <a:t>When used as an input:</a:t>
+              <a:t>What an input pin is:</a:t>
             </a:r>
           </a:p>
           <a:p>
@@ -25587,7 +24595,7 @@
 </p:sld>
 </file>
 
-<file path=ppt/slides/slide18.xml><?xml version="1.0" encoding="utf-8"?>
+<file path=ppt/slides/slide17.xml><?xml version="1.0" encoding="utf-8"?>
 <p:sld xmlns:a="http://schemas.openxmlformats.org/drawingml/2006/main" xmlns:r="http://schemas.openxmlformats.org/officeDocument/2006/relationships" xmlns:p="http://schemas.openxmlformats.org/presentationml/2006/main">
   <p:cSld>
     <p:bg>
@@ -26042,7 +25050,7 @@
 </p:sld>
 </file>
 
-<file path=ppt/slides/slide19.xml><?xml version="1.0" encoding="utf-8"?>
+<file path=ppt/slides/slide18.xml><?xml version="1.0" encoding="utf-8"?>
 <p:sld xmlns:a="http://schemas.openxmlformats.org/drawingml/2006/main" xmlns:r="http://schemas.openxmlformats.org/officeDocument/2006/relationships" xmlns:p="http://schemas.openxmlformats.org/presentationml/2006/main">
   <p:cSld>
     <p:spTree>
@@ -26918,6 +25926,602 @@
 </p:sld>
 </file>
 
+<file path=ppt/slides/slide19.xml><?xml version="1.0" encoding="utf-8"?>
+<p:sld xmlns:a="http://schemas.openxmlformats.org/drawingml/2006/main" xmlns:r="http://schemas.openxmlformats.org/officeDocument/2006/relationships" xmlns:p="http://schemas.openxmlformats.org/presentationml/2006/main">
+  <p:cSld>
+    <p:spTree>
+      <p:nvGrpSpPr>
+        <p:cNvPr id="1" name="Shape 117">
+          <a:extLst>
+            <a:ext uri="{FF2B5EF4-FFF2-40B4-BE49-F238E27FC236}">
+              <a16:creationId xmlns:a16="http://schemas.microsoft.com/office/drawing/2014/main" id="{49398413-0AE8-370B-215E-E0D9673AAEDC}"/>
+            </a:ext>
+          </a:extLst>
+        </p:cNvPr>
+        <p:cNvGrpSpPr/>
+        <p:nvPr/>
+      </p:nvGrpSpPr>
+      <p:grpSpPr>
+        <a:xfrm>
+          <a:off x="0" y="0"/>
+          <a:ext cx="0" cy="0"/>
+          <a:chOff x="0" y="0"/>
+          <a:chExt cx="0" cy="0"/>
+        </a:xfrm>
+      </p:grpSpPr>
+      <p:sp>
+        <p:nvSpPr>
+          <p:cNvPr id="118" name="Google Shape;118;p29">
+            <a:extLst>
+              <a:ext uri="{FF2B5EF4-FFF2-40B4-BE49-F238E27FC236}">
+                <a16:creationId xmlns:a16="http://schemas.microsoft.com/office/drawing/2014/main" id="{E3537289-3906-F61A-FE9B-9E812E11117B}"/>
+              </a:ext>
+            </a:extLst>
+          </p:cNvPr>
+          <p:cNvSpPr txBox="1">
+            <a:spLocks noGrp="1"/>
+          </p:cNvSpPr>
+          <p:nvPr>
+            <p:ph type="body" idx="1"/>
+          </p:nvPr>
+        </p:nvSpPr>
+        <p:spPr>
+          <a:xfrm>
+            <a:off x="376809" y="1334279"/>
+            <a:ext cx="11177401" cy="4821102"/>
+          </a:xfrm>
+          <a:prstGeom prst="rect">
+            <a:avLst/>
+          </a:prstGeom>
+          <a:noFill/>
+          <a:ln>
+            <a:noFill/>
+          </a:ln>
+        </p:spPr>
+        <p:txBody>
+          <a:bodyPr spcFirstLastPara="1" wrap="square" lIns="91425" tIns="45700" rIns="91425" bIns="45700" anchor="t" anchorCtr="0">
+            <a:noAutofit/>
+          </a:bodyPr>
+          <a:lstStyle/>
+          <a:p>
+            <a:pPr marL="0" lvl="0" indent="0" algn="l" rtl="0">
+              <a:lnSpc>
+                <a:spcPct val="100000"/>
+              </a:lnSpc>
+              <a:spcBef>
+                <a:spcPts val="0"/>
+              </a:spcBef>
+              <a:spcAft>
+                <a:spcPts val="0"/>
+              </a:spcAft>
+              <a:buSzPts val="3000"/>
+              <a:buNone/>
+            </a:pPr>
+            <a:r>
+              <a:rPr lang="en-US" sz="1800" dirty="0">
+                <a:latin typeface="Arial"/>
+                <a:ea typeface="Arial"/>
+                <a:cs typeface="Arial"/>
+                <a:sym typeface="Arial"/>
+              </a:rPr>
+              <a:t>This is a hardware switch that selects which peripheral controls a pin:</a:t>
+            </a:r>
+          </a:p>
+        </p:txBody>
+      </p:sp>
+      <p:sp>
+        <p:nvSpPr>
+          <p:cNvPr id="119" name="Google Shape;119;p29">
+            <a:extLst>
+              <a:ext uri="{FF2B5EF4-FFF2-40B4-BE49-F238E27FC236}">
+                <a16:creationId xmlns:a16="http://schemas.microsoft.com/office/drawing/2014/main" id="{7879F98A-C3A8-4D8F-0C7B-E69DFF82549F}"/>
+              </a:ext>
+            </a:extLst>
+          </p:cNvPr>
+          <p:cNvSpPr/>
+          <p:nvPr/>
+        </p:nvSpPr>
+        <p:spPr>
+          <a:xfrm rot="10800000" flipH="1">
+            <a:off x="0" y="0"/>
+            <a:ext cx="12192000" cy="868220"/>
+          </a:xfrm>
+          <a:prstGeom prst="rect">
+            <a:avLst/>
+          </a:prstGeom>
+          <a:solidFill>
+            <a:srgbClr val="13294B"/>
+          </a:solidFill>
+          <a:ln>
+            <a:noFill/>
+          </a:ln>
+        </p:spPr>
+        <p:txBody>
+          <a:bodyPr spcFirstLastPara="1" wrap="square" lIns="91425" tIns="45700" rIns="91425" bIns="45700" anchor="ctr" anchorCtr="0">
+            <a:noAutofit/>
+          </a:bodyPr>
+          <a:lstStyle/>
+          <a:p>
+            <a:pPr marL="0" marR="0" lvl="0" indent="0" algn="ctr" rtl="0">
+              <a:lnSpc>
+                <a:spcPct val="100000"/>
+              </a:lnSpc>
+              <a:spcBef>
+                <a:spcPts val="0"/>
+              </a:spcBef>
+              <a:spcAft>
+                <a:spcPts val="0"/>
+              </a:spcAft>
+              <a:buClr>
+                <a:schemeClr val="lt1"/>
+              </a:buClr>
+              <a:buSzPts val="1800"/>
+              <a:buFont typeface="Calibri"/>
+              <a:buNone/>
+            </a:pPr>
+            <a:endParaRPr sz="1800" b="0" i="0" u="none" strike="noStrike" cap="none">
+              <a:solidFill>
+                <a:srgbClr val="13294B"/>
+              </a:solidFill>
+              <a:latin typeface="Calibri"/>
+              <a:ea typeface="Calibri"/>
+              <a:cs typeface="Calibri"/>
+              <a:sym typeface="Calibri"/>
+            </a:endParaRPr>
+          </a:p>
+        </p:txBody>
+      </p:sp>
+      <p:sp>
+        <p:nvSpPr>
+          <p:cNvPr id="120" name="Google Shape;120;p29">
+            <a:extLst>
+              <a:ext uri="{FF2B5EF4-FFF2-40B4-BE49-F238E27FC236}">
+                <a16:creationId xmlns:a16="http://schemas.microsoft.com/office/drawing/2014/main" id="{467EDB08-73DB-4D7F-CF91-C0FAEAF3D833}"/>
+              </a:ext>
+            </a:extLst>
+          </p:cNvPr>
+          <p:cNvSpPr txBox="1"/>
+          <p:nvPr/>
+        </p:nvSpPr>
+        <p:spPr>
+          <a:xfrm>
+            <a:off x="376810" y="204051"/>
+            <a:ext cx="10910026" cy="461624"/>
+          </a:xfrm>
+          <a:prstGeom prst="rect">
+            <a:avLst/>
+          </a:prstGeom>
+          <a:noFill/>
+          <a:ln>
+            <a:noFill/>
+          </a:ln>
+        </p:spPr>
+        <p:txBody>
+          <a:bodyPr spcFirstLastPara="1" wrap="square" lIns="91425" tIns="45700" rIns="91425" bIns="45700" anchor="t" anchorCtr="0">
+            <a:spAutoFit/>
+          </a:bodyPr>
+          <a:lstStyle/>
+          <a:p>
+            <a:pPr marL="0" marR="0" lvl="0" indent="0" algn="l" rtl="0">
+              <a:lnSpc>
+                <a:spcPct val="100000"/>
+              </a:lnSpc>
+              <a:spcBef>
+                <a:spcPts val="0"/>
+              </a:spcBef>
+              <a:spcAft>
+                <a:spcPts val="0"/>
+              </a:spcAft>
+              <a:buClr>
+                <a:srgbClr val="000000"/>
+              </a:buClr>
+              <a:buSzPts val="2400"/>
+              <a:buFont typeface="Arial"/>
+              <a:buNone/>
+            </a:pPr>
+            <a:r>
+              <a:rPr lang="en-US" sz="2400" b="0" i="0" u="none" strike="noStrike" cap="none" dirty="0">
+                <a:solidFill>
+                  <a:schemeClr val="lt1"/>
+                </a:solidFill>
+                <a:latin typeface="Arial"/>
+                <a:ea typeface="Arial"/>
+                <a:cs typeface="Arial"/>
+                <a:sym typeface="Arial"/>
+              </a:rPr>
+              <a:t>What is the Pin Multiplexer (</a:t>
+            </a:r>
+            <a:r>
+              <a:rPr lang="en-US" sz="2400" b="0" i="0" u="none" strike="noStrike" cap="none" dirty="0" err="1">
+                <a:solidFill>
+                  <a:schemeClr val="lt1"/>
+                </a:solidFill>
+                <a:latin typeface="Arial"/>
+                <a:ea typeface="Arial"/>
+                <a:cs typeface="Arial"/>
+                <a:sym typeface="Arial"/>
+              </a:rPr>
+              <a:t>PinMux</a:t>
+            </a:r>
+            <a:r>
+              <a:rPr lang="en-US" sz="2400" b="0" i="0" u="none" strike="noStrike" cap="none" dirty="0">
+                <a:solidFill>
+                  <a:schemeClr val="lt1"/>
+                </a:solidFill>
+                <a:latin typeface="Arial"/>
+                <a:ea typeface="Arial"/>
+                <a:cs typeface="Arial"/>
+                <a:sym typeface="Arial"/>
+              </a:rPr>
+              <a:t>)</a:t>
+            </a:r>
+          </a:p>
+        </p:txBody>
+      </p:sp>
+      <p:pic>
+        <p:nvPicPr>
+          <p:cNvPr id="121" name="Google Shape;121;p29">
+            <a:extLst>
+              <a:ext uri="{FF2B5EF4-FFF2-40B4-BE49-F238E27FC236}">
+                <a16:creationId xmlns:a16="http://schemas.microsoft.com/office/drawing/2014/main" id="{7839535F-2085-901B-16EA-FFF8C73FA9FA}"/>
+              </a:ext>
+            </a:extLst>
+          </p:cNvPr>
+          <p:cNvPicPr preferRelativeResize="0"/>
+          <p:nvPr/>
+        </p:nvPicPr>
+        <p:blipFill rotWithShape="1">
+          <a:blip r:embed="rId3">
+            <a:alphaModFix/>
+          </a:blip>
+          <a:srcRect/>
+          <a:stretch/>
+        </p:blipFill>
+        <p:spPr>
+          <a:xfrm>
+            <a:off x="11557509" y="233819"/>
+            <a:ext cx="271308" cy="389810"/>
+          </a:xfrm>
+          <a:prstGeom prst="rect">
+            <a:avLst/>
+          </a:prstGeom>
+          <a:noFill/>
+          <a:ln>
+            <a:noFill/>
+          </a:ln>
+        </p:spPr>
+      </p:pic>
+      <p:sp>
+        <p:nvSpPr>
+          <p:cNvPr id="122" name="Google Shape;122;p29">
+            <a:extLst>
+              <a:ext uri="{FF2B5EF4-FFF2-40B4-BE49-F238E27FC236}">
+                <a16:creationId xmlns:a16="http://schemas.microsoft.com/office/drawing/2014/main" id="{3A3305E7-1E0C-6370-88F7-7DECF32F1349}"/>
+              </a:ext>
+            </a:extLst>
+          </p:cNvPr>
+          <p:cNvSpPr txBox="1"/>
+          <p:nvPr/>
+        </p:nvSpPr>
+        <p:spPr>
+          <a:xfrm>
+            <a:off x="9335597" y="6524381"/>
+            <a:ext cx="2473415" cy="230792"/>
+          </a:xfrm>
+          <a:prstGeom prst="rect">
+            <a:avLst/>
+          </a:prstGeom>
+          <a:noFill/>
+          <a:ln>
+            <a:noFill/>
+          </a:ln>
+        </p:spPr>
+        <p:txBody>
+          <a:bodyPr spcFirstLastPara="1" wrap="square" lIns="91425" tIns="45700" rIns="91425" bIns="45700" anchor="t" anchorCtr="0">
+            <a:spAutoFit/>
+          </a:bodyPr>
+          <a:lstStyle/>
+          <a:p>
+            <a:pPr marL="0" marR="0" lvl="0" indent="0" algn="r" rtl="0">
+              <a:lnSpc>
+                <a:spcPct val="100000"/>
+              </a:lnSpc>
+              <a:spcBef>
+                <a:spcPts val="0"/>
+              </a:spcBef>
+              <a:spcAft>
+                <a:spcPts val="0"/>
+              </a:spcAft>
+              <a:buNone/>
+            </a:pPr>
+            <a:r>
+              <a:rPr lang="en-US" sz="900" b="0" i="0" u="none" strike="noStrike" cap="none">
+                <a:solidFill>
+                  <a:srgbClr val="13294B"/>
+                </a:solidFill>
+                <a:latin typeface="Arial"/>
+                <a:ea typeface="Arial"/>
+                <a:cs typeface="Arial"/>
+                <a:sym typeface="Arial"/>
+              </a:rPr>
+              <a:t>GRAINGER ENGINEERING</a:t>
+            </a:r>
+            <a:endParaRPr/>
+          </a:p>
+        </p:txBody>
+      </p:sp>
+      <p:sp>
+        <p:nvSpPr>
+          <p:cNvPr id="123" name="Google Shape;123;p29">
+            <a:extLst>
+              <a:ext uri="{FF2B5EF4-FFF2-40B4-BE49-F238E27FC236}">
+                <a16:creationId xmlns:a16="http://schemas.microsoft.com/office/drawing/2014/main" id="{D95221AE-87F9-789F-FD98-900CBD8F4AC2}"/>
+              </a:ext>
+            </a:extLst>
+          </p:cNvPr>
+          <p:cNvSpPr txBox="1"/>
+          <p:nvPr/>
+        </p:nvSpPr>
+        <p:spPr>
+          <a:xfrm>
+            <a:off x="376807" y="6524381"/>
+            <a:ext cx="7991337" cy="230792"/>
+          </a:xfrm>
+          <a:prstGeom prst="rect">
+            <a:avLst/>
+          </a:prstGeom>
+          <a:noFill/>
+          <a:ln>
+            <a:noFill/>
+          </a:ln>
+        </p:spPr>
+        <p:txBody>
+          <a:bodyPr spcFirstLastPara="1" wrap="square" lIns="91425" tIns="45700" rIns="91425" bIns="45700" anchor="t" anchorCtr="0">
+            <a:spAutoFit/>
+          </a:bodyPr>
+          <a:lstStyle/>
+          <a:p>
+            <a:pPr marL="0" marR="0" lvl="0" indent="0" algn="l" rtl="0">
+              <a:lnSpc>
+                <a:spcPct val="100000"/>
+              </a:lnSpc>
+              <a:spcBef>
+                <a:spcPts val="0"/>
+              </a:spcBef>
+              <a:spcAft>
+                <a:spcPts val="0"/>
+              </a:spcAft>
+              <a:buNone/>
+            </a:pPr>
+            <a:r>
+              <a:rPr lang="en-US" sz="900" dirty="0">
+                <a:solidFill>
+                  <a:srgbClr val="13294B"/>
+                </a:solidFill>
+              </a:rPr>
+              <a:t>SYSTEMS ENGINEERING </a:t>
+            </a:r>
+            <a:endParaRPr dirty="0"/>
+          </a:p>
+        </p:txBody>
+      </p:sp>
+      <p:grpSp>
+        <p:nvGrpSpPr>
+          <p:cNvPr id="124" name="Google Shape;124;p29">
+            <a:extLst>
+              <a:ext uri="{FF2B5EF4-FFF2-40B4-BE49-F238E27FC236}">
+                <a16:creationId xmlns:a16="http://schemas.microsoft.com/office/drawing/2014/main" id="{6DFE2DF4-8F43-04E5-11F2-073A81C9BC04}"/>
+              </a:ext>
+            </a:extLst>
+          </p:cNvPr>
+          <p:cNvGrpSpPr/>
+          <p:nvPr/>
+        </p:nvGrpSpPr>
+        <p:grpSpPr>
+          <a:xfrm>
+            <a:off x="4066674" y="6601537"/>
+            <a:ext cx="5233412" cy="70446"/>
+            <a:chOff x="4033424" y="6601537"/>
+            <a:chExt cx="5233412" cy="70446"/>
+          </a:xfrm>
+        </p:grpSpPr>
+        <p:cxnSp>
+          <p:nvCxnSpPr>
+            <p:cNvPr id="125" name="Google Shape;125;p29">
+              <a:extLst>
+                <a:ext uri="{FF2B5EF4-FFF2-40B4-BE49-F238E27FC236}">
+                  <a16:creationId xmlns:a16="http://schemas.microsoft.com/office/drawing/2014/main" id="{EED5B125-0354-5134-ADBE-3ABC3EE1CFC5}"/>
+                </a:ext>
+              </a:extLst>
+            </p:cNvPr>
+            <p:cNvCxnSpPr/>
+            <p:nvPr/>
+          </p:nvCxnSpPr>
+          <p:spPr>
+            <a:xfrm rot="10800000">
+              <a:off x="4033424" y="6639606"/>
+              <a:ext cx="5164651" cy="0"/>
+            </a:xfrm>
+            <a:prstGeom prst="straightConnector1">
+              <a:avLst/>
+            </a:prstGeom>
+            <a:noFill/>
+            <a:ln w="9525" cap="flat" cmpd="sng">
+              <a:solidFill>
+                <a:srgbClr val="13294B"/>
+              </a:solidFill>
+              <a:prstDash val="solid"/>
+              <a:round/>
+              <a:headEnd type="none" w="sm" len="sm"/>
+              <a:tailEnd type="none" w="sm" len="sm"/>
+            </a:ln>
+          </p:spPr>
+        </p:cxnSp>
+        <p:sp>
+          <p:nvSpPr>
+            <p:cNvPr id="126" name="Google Shape;126;p29">
+              <a:extLst>
+                <a:ext uri="{FF2B5EF4-FFF2-40B4-BE49-F238E27FC236}">
+                  <a16:creationId xmlns:a16="http://schemas.microsoft.com/office/drawing/2014/main" id="{E6A367AE-B2AD-9223-6B3D-C61E4BC5AA1B}"/>
+                </a:ext>
+              </a:extLst>
+            </p:cNvPr>
+            <p:cNvSpPr/>
+            <p:nvPr/>
+          </p:nvSpPr>
+          <p:spPr>
+            <a:xfrm>
+              <a:off x="9196390" y="6601537"/>
+              <a:ext cx="70446" cy="70446"/>
+            </a:xfrm>
+            <a:prstGeom prst="ellipse">
+              <a:avLst/>
+            </a:prstGeom>
+            <a:solidFill>
+              <a:srgbClr val="13294B"/>
+            </a:solidFill>
+            <a:ln>
+              <a:noFill/>
+            </a:ln>
+          </p:spPr>
+          <p:txBody>
+            <a:bodyPr spcFirstLastPara="1" wrap="square" lIns="91425" tIns="45700" rIns="91425" bIns="45700" anchor="ctr" anchorCtr="0">
+              <a:noAutofit/>
+            </a:bodyPr>
+            <a:lstStyle/>
+            <a:p>
+              <a:pPr marL="0" marR="0" lvl="0" indent="0" algn="ctr" rtl="0">
+                <a:lnSpc>
+                  <a:spcPct val="100000"/>
+                </a:lnSpc>
+                <a:spcBef>
+                  <a:spcPts val="0"/>
+                </a:spcBef>
+                <a:spcAft>
+                  <a:spcPts val="0"/>
+                </a:spcAft>
+                <a:buNone/>
+              </a:pPr>
+              <a:endParaRPr sz="1400" b="0" i="0" u="none" strike="noStrike" cap="none">
+                <a:solidFill>
+                  <a:srgbClr val="13294B"/>
+                </a:solidFill>
+                <a:latin typeface="Arial"/>
+                <a:ea typeface="Arial"/>
+                <a:cs typeface="Arial"/>
+                <a:sym typeface="Arial"/>
+              </a:endParaRPr>
+            </a:p>
+          </p:txBody>
+        </p:sp>
+      </p:grpSp>
+      <p:pic>
+        <p:nvPicPr>
+          <p:cNvPr id="3076" name="Picture 4" descr="undefined">
+            <a:extLst>
+              <a:ext uri="{FF2B5EF4-FFF2-40B4-BE49-F238E27FC236}">
+                <a16:creationId xmlns:a16="http://schemas.microsoft.com/office/drawing/2014/main" id="{951CD270-E96E-0C94-E14F-8969C8EC804E}"/>
+              </a:ext>
+            </a:extLst>
+          </p:cNvPr>
+          <p:cNvPicPr>
+            <a:picLocks noChangeAspect="1" noChangeArrowheads="1"/>
+          </p:cNvPicPr>
+          <p:nvPr/>
+        </p:nvPicPr>
+        <p:blipFill>
+          <a:blip r:embed="rId4">
+            <a:extLst>
+              <a:ext uri="{28A0092B-C50C-407E-A947-70E740481C1C}">
+                <a14:useLocalDpi xmlns:a14="http://schemas.microsoft.com/office/drawing/2010/main" val="0"/>
+              </a:ext>
+            </a:extLst>
+          </a:blip>
+          <a:srcRect/>
+          <a:stretch>
+            <a:fillRect/>
+          </a:stretch>
+        </p:blipFill>
+        <p:spPr bwMode="auto">
+          <a:xfrm>
+            <a:off x="3092289" y="1920479"/>
+            <a:ext cx="5746439" cy="2532025"/>
+          </a:xfrm>
+          <a:prstGeom prst="rect">
+            <a:avLst/>
+          </a:prstGeom>
+          <a:noFill/>
+          <a:extLst>
+            <a:ext uri="{909E8E84-426E-40DD-AFC4-6F175D3DCCD1}">
+              <a14:hiddenFill xmlns:a14="http://schemas.microsoft.com/office/drawing/2010/main">
+                <a:solidFill>
+                  <a:srgbClr val="FFFFFF"/>
+                </a:solidFill>
+              </a14:hiddenFill>
+            </a:ext>
+          </a:extLst>
+        </p:spPr>
+      </p:pic>
+      <p:pic>
+        <p:nvPicPr>
+          <p:cNvPr id="3078" name="Picture 6" descr="16-to-1 mux">
+            <a:extLst>
+              <a:ext uri="{FF2B5EF4-FFF2-40B4-BE49-F238E27FC236}">
+                <a16:creationId xmlns:a16="http://schemas.microsoft.com/office/drawing/2014/main" id="{AC7668CD-BA9C-41F4-D48B-CB43716E3FEA}"/>
+              </a:ext>
+            </a:extLst>
+          </p:cNvPr>
+          <p:cNvPicPr>
+            <a:picLocks noChangeAspect="1" noChangeArrowheads="1"/>
+          </p:cNvPicPr>
+          <p:nvPr/>
+        </p:nvPicPr>
+        <p:blipFill>
+          <a:blip r:embed="rId5">
+            <a:extLst>
+              <a:ext uri="{28A0092B-C50C-407E-A947-70E740481C1C}">
+                <a14:useLocalDpi xmlns:a14="http://schemas.microsoft.com/office/drawing/2010/main" val="0"/>
+              </a:ext>
+            </a:extLst>
+          </a:blip>
+          <a:srcRect/>
+          <a:stretch>
+            <a:fillRect/>
+          </a:stretch>
+        </p:blipFill>
+        <p:spPr bwMode="auto">
+          <a:xfrm>
+            <a:off x="2524849" y="4668348"/>
+            <a:ext cx="6613948" cy="1653487"/>
+          </a:xfrm>
+          <a:prstGeom prst="rect">
+            <a:avLst/>
+          </a:prstGeom>
+          <a:noFill/>
+          <a:extLst>
+            <a:ext uri="{909E8E84-426E-40DD-AFC4-6F175D3DCCD1}">
+              <a14:hiddenFill xmlns:a14="http://schemas.microsoft.com/office/drawing/2010/main">
+                <a:solidFill>
+                  <a:srgbClr val="FFFFFF"/>
+                </a:solidFill>
+              </a14:hiddenFill>
+            </a:ext>
+          </a:extLst>
+        </p:spPr>
+      </p:pic>
+    </p:spTree>
+    <p:extLst>
+      <p:ext uri="{BB962C8B-B14F-4D97-AF65-F5344CB8AC3E}">
+        <p14:creationId xmlns:p14="http://schemas.microsoft.com/office/powerpoint/2010/main" val="1279149816"/>
+      </p:ext>
+    </p:extLst>
+  </p:cSld>
+  <p:clrMapOvr>
+    <a:masterClrMapping/>
+  </p:clrMapOvr>
+</p:sld>
+</file>
+
 <file path=ppt/slides/slide2.xml><?xml version="1.0" encoding="utf-8"?>
 <p:sld xmlns:a="http://schemas.openxmlformats.org/drawingml/2006/main" xmlns:r="http://schemas.openxmlformats.org/officeDocument/2006/relationships" xmlns:p="http://schemas.openxmlformats.org/presentationml/2006/main">
   <p:cSld>
@@ -27994,602 +27598,6 @@
         <p:cNvPr id="1" name="Shape 117">
           <a:extLst>
             <a:ext uri="{FF2B5EF4-FFF2-40B4-BE49-F238E27FC236}">
-              <a16:creationId xmlns:a16="http://schemas.microsoft.com/office/drawing/2014/main" id="{49398413-0AE8-370B-215E-E0D9673AAEDC}"/>
-            </a:ext>
-          </a:extLst>
-        </p:cNvPr>
-        <p:cNvGrpSpPr/>
-        <p:nvPr/>
-      </p:nvGrpSpPr>
-      <p:grpSpPr>
-        <a:xfrm>
-          <a:off x="0" y="0"/>
-          <a:ext cx="0" cy="0"/>
-          <a:chOff x="0" y="0"/>
-          <a:chExt cx="0" cy="0"/>
-        </a:xfrm>
-      </p:grpSpPr>
-      <p:sp>
-        <p:nvSpPr>
-          <p:cNvPr id="118" name="Google Shape;118;p29">
-            <a:extLst>
-              <a:ext uri="{FF2B5EF4-FFF2-40B4-BE49-F238E27FC236}">
-                <a16:creationId xmlns:a16="http://schemas.microsoft.com/office/drawing/2014/main" id="{E3537289-3906-F61A-FE9B-9E812E11117B}"/>
-              </a:ext>
-            </a:extLst>
-          </p:cNvPr>
-          <p:cNvSpPr txBox="1">
-            <a:spLocks noGrp="1"/>
-          </p:cNvSpPr>
-          <p:nvPr>
-            <p:ph type="body" idx="1"/>
-          </p:nvPr>
-        </p:nvSpPr>
-        <p:spPr>
-          <a:xfrm>
-            <a:off x="376809" y="1334279"/>
-            <a:ext cx="11177401" cy="4821102"/>
-          </a:xfrm>
-          <a:prstGeom prst="rect">
-            <a:avLst/>
-          </a:prstGeom>
-          <a:noFill/>
-          <a:ln>
-            <a:noFill/>
-          </a:ln>
-        </p:spPr>
-        <p:txBody>
-          <a:bodyPr spcFirstLastPara="1" wrap="square" lIns="91425" tIns="45700" rIns="91425" bIns="45700" anchor="t" anchorCtr="0">
-            <a:noAutofit/>
-          </a:bodyPr>
-          <a:lstStyle/>
-          <a:p>
-            <a:pPr marL="0" lvl="0" indent="0" algn="l" rtl="0">
-              <a:lnSpc>
-                <a:spcPct val="100000"/>
-              </a:lnSpc>
-              <a:spcBef>
-                <a:spcPts val="0"/>
-              </a:spcBef>
-              <a:spcAft>
-                <a:spcPts val="0"/>
-              </a:spcAft>
-              <a:buSzPts val="3000"/>
-              <a:buNone/>
-            </a:pPr>
-            <a:r>
-              <a:rPr lang="en-US" sz="1800" dirty="0">
-                <a:latin typeface="Arial"/>
-                <a:ea typeface="Arial"/>
-                <a:cs typeface="Arial"/>
-                <a:sym typeface="Arial"/>
-              </a:rPr>
-              <a:t>This is a hardware switch that selects which peripheral controls a pin:</a:t>
-            </a:r>
-          </a:p>
-        </p:txBody>
-      </p:sp>
-      <p:sp>
-        <p:nvSpPr>
-          <p:cNvPr id="119" name="Google Shape;119;p29">
-            <a:extLst>
-              <a:ext uri="{FF2B5EF4-FFF2-40B4-BE49-F238E27FC236}">
-                <a16:creationId xmlns:a16="http://schemas.microsoft.com/office/drawing/2014/main" id="{7879F98A-C3A8-4D8F-0C7B-E69DFF82549F}"/>
-              </a:ext>
-            </a:extLst>
-          </p:cNvPr>
-          <p:cNvSpPr/>
-          <p:nvPr/>
-        </p:nvSpPr>
-        <p:spPr>
-          <a:xfrm rot="10800000" flipH="1">
-            <a:off x="0" y="0"/>
-            <a:ext cx="12192000" cy="868220"/>
-          </a:xfrm>
-          <a:prstGeom prst="rect">
-            <a:avLst/>
-          </a:prstGeom>
-          <a:solidFill>
-            <a:srgbClr val="13294B"/>
-          </a:solidFill>
-          <a:ln>
-            <a:noFill/>
-          </a:ln>
-        </p:spPr>
-        <p:txBody>
-          <a:bodyPr spcFirstLastPara="1" wrap="square" lIns="91425" tIns="45700" rIns="91425" bIns="45700" anchor="ctr" anchorCtr="0">
-            <a:noAutofit/>
-          </a:bodyPr>
-          <a:lstStyle/>
-          <a:p>
-            <a:pPr marL="0" marR="0" lvl="0" indent="0" algn="ctr" rtl="0">
-              <a:lnSpc>
-                <a:spcPct val="100000"/>
-              </a:lnSpc>
-              <a:spcBef>
-                <a:spcPts val="0"/>
-              </a:spcBef>
-              <a:spcAft>
-                <a:spcPts val="0"/>
-              </a:spcAft>
-              <a:buClr>
-                <a:schemeClr val="lt1"/>
-              </a:buClr>
-              <a:buSzPts val="1800"/>
-              <a:buFont typeface="Calibri"/>
-              <a:buNone/>
-            </a:pPr>
-            <a:endParaRPr sz="1800" b="0" i="0" u="none" strike="noStrike" cap="none">
-              <a:solidFill>
-                <a:srgbClr val="13294B"/>
-              </a:solidFill>
-              <a:latin typeface="Calibri"/>
-              <a:ea typeface="Calibri"/>
-              <a:cs typeface="Calibri"/>
-              <a:sym typeface="Calibri"/>
-            </a:endParaRPr>
-          </a:p>
-        </p:txBody>
-      </p:sp>
-      <p:sp>
-        <p:nvSpPr>
-          <p:cNvPr id="120" name="Google Shape;120;p29">
-            <a:extLst>
-              <a:ext uri="{FF2B5EF4-FFF2-40B4-BE49-F238E27FC236}">
-                <a16:creationId xmlns:a16="http://schemas.microsoft.com/office/drawing/2014/main" id="{467EDB08-73DB-4D7F-CF91-C0FAEAF3D833}"/>
-              </a:ext>
-            </a:extLst>
-          </p:cNvPr>
-          <p:cNvSpPr txBox="1"/>
-          <p:nvPr/>
-        </p:nvSpPr>
-        <p:spPr>
-          <a:xfrm>
-            <a:off x="376810" y="204051"/>
-            <a:ext cx="10910026" cy="461624"/>
-          </a:xfrm>
-          <a:prstGeom prst="rect">
-            <a:avLst/>
-          </a:prstGeom>
-          <a:noFill/>
-          <a:ln>
-            <a:noFill/>
-          </a:ln>
-        </p:spPr>
-        <p:txBody>
-          <a:bodyPr spcFirstLastPara="1" wrap="square" lIns="91425" tIns="45700" rIns="91425" bIns="45700" anchor="t" anchorCtr="0">
-            <a:spAutoFit/>
-          </a:bodyPr>
-          <a:lstStyle/>
-          <a:p>
-            <a:pPr marL="0" marR="0" lvl="0" indent="0" algn="l" rtl="0">
-              <a:lnSpc>
-                <a:spcPct val="100000"/>
-              </a:lnSpc>
-              <a:spcBef>
-                <a:spcPts val="0"/>
-              </a:spcBef>
-              <a:spcAft>
-                <a:spcPts val="0"/>
-              </a:spcAft>
-              <a:buClr>
-                <a:srgbClr val="000000"/>
-              </a:buClr>
-              <a:buSzPts val="2400"/>
-              <a:buFont typeface="Arial"/>
-              <a:buNone/>
-            </a:pPr>
-            <a:r>
-              <a:rPr lang="en-US" sz="2400" b="0" i="0" u="none" strike="noStrike" cap="none" dirty="0">
-                <a:solidFill>
-                  <a:schemeClr val="lt1"/>
-                </a:solidFill>
-                <a:latin typeface="Arial"/>
-                <a:ea typeface="Arial"/>
-                <a:cs typeface="Arial"/>
-                <a:sym typeface="Arial"/>
-              </a:rPr>
-              <a:t>What is the Pin Multiplexer (</a:t>
-            </a:r>
-            <a:r>
-              <a:rPr lang="en-US" sz="2400" b="0" i="0" u="none" strike="noStrike" cap="none" dirty="0" err="1">
-                <a:solidFill>
-                  <a:schemeClr val="lt1"/>
-                </a:solidFill>
-                <a:latin typeface="Arial"/>
-                <a:ea typeface="Arial"/>
-                <a:cs typeface="Arial"/>
-                <a:sym typeface="Arial"/>
-              </a:rPr>
-              <a:t>PinMux</a:t>
-            </a:r>
-            <a:r>
-              <a:rPr lang="en-US" sz="2400" b="0" i="0" u="none" strike="noStrike" cap="none" dirty="0">
-                <a:solidFill>
-                  <a:schemeClr val="lt1"/>
-                </a:solidFill>
-                <a:latin typeface="Arial"/>
-                <a:ea typeface="Arial"/>
-                <a:cs typeface="Arial"/>
-                <a:sym typeface="Arial"/>
-              </a:rPr>
-              <a:t>)</a:t>
-            </a:r>
-          </a:p>
-        </p:txBody>
-      </p:sp>
-      <p:pic>
-        <p:nvPicPr>
-          <p:cNvPr id="121" name="Google Shape;121;p29">
-            <a:extLst>
-              <a:ext uri="{FF2B5EF4-FFF2-40B4-BE49-F238E27FC236}">
-                <a16:creationId xmlns:a16="http://schemas.microsoft.com/office/drawing/2014/main" id="{7839535F-2085-901B-16EA-FFF8C73FA9FA}"/>
-              </a:ext>
-            </a:extLst>
-          </p:cNvPr>
-          <p:cNvPicPr preferRelativeResize="0"/>
-          <p:nvPr/>
-        </p:nvPicPr>
-        <p:blipFill rotWithShape="1">
-          <a:blip r:embed="rId3">
-            <a:alphaModFix/>
-          </a:blip>
-          <a:srcRect/>
-          <a:stretch/>
-        </p:blipFill>
-        <p:spPr>
-          <a:xfrm>
-            <a:off x="11557509" y="233819"/>
-            <a:ext cx="271308" cy="389810"/>
-          </a:xfrm>
-          <a:prstGeom prst="rect">
-            <a:avLst/>
-          </a:prstGeom>
-          <a:noFill/>
-          <a:ln>
-            <a:noFill/>
-          </a:ln>
-        </p:spPr>
-      </p:pic>
-      <p:sp>
-        <p:nvSpPr>
-          <p:cNvPr id="122" name="Google Shape;122;p29">
-            <a:extLst>
-              <a:ext uri="{FF2B5EF4-FFF2-40B4-BE49-F238E27FC236}">
-                <a16:creationId xmlns:a16="http://schemas.microsoft.com/office/drawing/2014/main" id="{3A3305E7-1E0C-6370-88F7-7DECF32F1349}"/>
-              </a:ext>
-            </a:extLst>
-          </p:cNvPr>
-          <p:cNvSpPr txBox="1"/>
-          <p:nvPr/>
-        </p:nvSpPr>
-        <p:spPr>
-          <a:xfrm>
-            <a:off x="9335597" y="6524381"/>
-            <a:ext cx="2473415" cy="230792"/>
-          </a:xfrm>
-          <a:prstGeom prst="rect">
-            <a:avLst/>
-          </a:prstGeom>
-          <a:noFill/>
-          <a:ln>
-            <a:noFill/>
-          </a:ln>
-        </p:spPr>
-        <p:txBody>
-          <a:bodyPr spcFirstLastPara="1" wrap="square" lIns="91425" tIns="45700" rIns="91425" bIns="45700" anchor="t" anchorCtr="0">
-            <a:spAutoFit/>
-          </a:bodyPr>
-          <a:lstStyle/>
-          <a:p>
-            <a:pPr marL="0" marR="0" lvl="0" indent="0" algn="r" rtl="0">
-              <a:lnSpc>
-                <a:spcPct val="100000"/>
-              </a:lnSpc>
-              <a:spcBef>
-                <a:spcPts val="0"/>
-              </a:spcBef>
-              <a:spcAft>
-                <a:spcPts val="0"/>
-              </a:spcAft>
-              <a:buNone/>
-            </a:pPr>
-            <a:r>
-              <a:rPr lang="en-US" sz="900" b="0" i="0" u="none" strike="noStrike" cap="none">
-                <a:solidFill>
-                  <a:srgbClr val="13294B"/>
-                </a:solidFill>
-                <a:latin typeface="Arial"/>
-                <a:ea typeface="Arial"/>
-                <a:cs typeface="Arial"/>
-                <a:sym typeface="Arial"/>
-              </a:rPr>
-              <a:t>GRAINGER ENGINEERING</a:t>
-            </a:r>
-            <a:endParaRPr/>
-          </a:p>
-        </p:txBody>
-      </p:sp>
-      <p:sp>
-        <p:nvSpPr>
-          <p:cNvPr id="123" name="Google Shape;123;p29">
-            <a:extLst>
-              <a:ext uri="{FF2B5EF4-FFF2-40B4-BE49-F238E27FC236}">
-                <a16:creationId xmlns:a16="http://schemas.microsoft.com/office/drawing/2014/main" id="{D95221AE-87F9-789F-FD98-900CBD8F4AC2}"/>
-              </a:ext>
-            </a:extLst>
-          </p:cNvPr>
-          <p:cNvSpPr txBox="1"/>
-          <p:nvPr/>
-        </p:nvSpPr>
-        <p:spPr>
-          <a:xfrm>
-            <a:off x="376807" y="6524381"/>
-            <a:ext cx="7991337" cy="230792"/>
-          </a:xfrm>
-          <a:prstGeom prst="rect">
-            <a:avLst/>
-          </a:prstGeom>
-          <a:noFill/>
-          <a:ln>
-            <a:noFill/>
-          </a:ln>
-        </p:spPr>
-        <p:txBody>
-          <a:bodyPr spcFirstLastPara="1" wrap="square" lIns="91425" tIns="45700" rIns="91425" bIns="45700" anchor="t" anchorCtr="0">
-            <a:spAutoFit/>
-          </a:bodyPr>
-          <a:lstStyle/>
-          <a:p>
-            <a:pPr marL="0" marR="0" lvl="0" indent="0" algn="l" rtl="0">
-              <a:lnSpc>
-                <a:spcPct val="100000"/>
-              </a:lnSpc>
-              <a:spcBef>
-                <a:spcPts val="0"/>
-              </a:spcBef>
-              <a:spcAft>
-                <a:spcPts val="0"/>
-              </a:spcAft>
-              <a:buNone/>
-            </a:pPr>
-            <a:r>
-              <a:rPr lang="en-US" sz="900" dirty="0">
-                <a:solidFill>
-                  <a:srgbClr val="13294B"/>
-                </a:solidFill>
-              </a:rPr>
-              <a:t>SYSTEMS ENGINEERING </a:t>
-            </a:r>
-            <a:endParaRPr dirty="0"/>
-          </a:p>
-        </p:txBody>
-      </p:sp>
-      <p:grpSp>
-        <p:nvGrpSpPr>
-          <p:cNvPr id="124" name="Google Shape;124;p29">
-            <a:extLst>
-              <a:ext uri="{FF2B5EF4-FFF2-40B4-BE49-F238E27FC236}">
-                <a16:creationId xmlns:a16="http://schemas.microsoft.com/office/drawing/2014/main" id="{6DFE2DF4-8F43-04E5-11F2-073A81C9BC04}"/>
-              </a:ext>
-            </a:extLst>
-          </p:cNvPr>
-          <p:cNvGrpSpPr/>
-          <p:nvPr/>
-        </p:nvGrpSpPr>
-        <p:grpSpPr>
-          <a:xfrm>
-            <a:off x="4066674" y="6601537"/>
-            <a:ext cx="5233412" cy="70446"/>
-            <a:chOff x="4033424" y="6601537"/>
-            <a:chExt cx="5233412" cy="70446"/>
-          </a:xfrm>
-        </p:grpSpPr>
-        <p:cxnSp>
-          <p:nvCxnSpPr>
-            <p:cNvPr id="125" name="Google Shape;125;p29">
-              <a:extLst>
-                <a:ext uri="{FF2B5EF4-FFF2-40B4-BE49-F238E27FC236}">
-                  <a16:creationId xmlns:a16="http://schemas.microsoft.com/office/drawing/2014/main" id="{EED5B125-0354-5134-ADBE-3ABC3EE1CFC5}"/>
-                </a:ext>
-              </a:extLst>
-            </p:cNvPr>
-            <p:cNvCxnSpPr/>
-            <p:nvPr/>
-          </p:nvCxnSpPr>
-          <p:spPr>
-            <a:xfrm rot="10800000">
-              <a:off x="4033424" y="6639606"/>
-              <a:ext cx="5164651" cy="0"/>
-            </a:xfrm>
-            <a:prstGeom prst="straightConnector1">
-              <a:avLst/>
-            </a:prstGeom>
-            <a:noFill/>
-            <a:ln w="9525" cap="flat" cmpd="sng">
-              <a:solidFill>
-                <a:srgbClr val="13294B"/>
-              </a:solidFill>
-              <a:prstDash val="solid"/>
-              <a:round/>
-              <a:headEnd type="none" w="sm" len="sm"/>
-              <a:tailEnd type="none" w="sm" len="sm"/>
-            </a:ln>
-          </p:spPr>
-        </p:cxnSp>
-        <p:sp>
-          <p:nvSpPr>
-            <p:cNvPr id="126" name="Google Shape;126;p29">
-              <a:extLst>
-                <a:ext uri="{FF2B5EF4-FFF2-40B4-BE49-F238E27FC236}">
-                  <a16:creationId xmlns:a16="http://schemas.microsoft.com/office/drawing/2014/main" id="{E6A367AE-B2AD-9223-6B3D-C61E4BC5AA1B}"/>
-                </a:ext>
-              </a:extLst>
-            </p:cNvPr>
-            <p:cNvSpPr/>
-            <p:nvPr/>
-          </p:nvSpPr>
-          <p:spPr>
-            <a:xfrm>
-              <a:off x="9196390" y="6601537"/>
-              <a:ext cx="70446" cy="70446"/>
-            </a:xfrm>
-            <a:prstGeom prst="ellipse">
-              <a:avLst/>
-            </a:prstGeom>
-            <a:solidFill>
-              <a:srgbClr val="13294B"/>
-            </a:solidFill>
-            <a:ln>
-              <a:noFill/>
-            </a:ln>
-          </p:spPr>
-          <p:txBody>
-            <a:bodyPr spcFirstLastPara="1" wrap="square" lIns="91425" tIns="45700" rIns="91425" bIns="45700" anchor="ctr" anchorCtr="0">
-              <a:noAutofit/>
-            </a:bodyPr>
-            <a:lstStyle/>
-            <a:p>
-              <a:pPr marL="0" marR="0" lvl="0" indent="0" algn="ctr" rtl="0">
-                <a:lnSpc>
-                  <a:spcPct val="100000"/>
-                </a:lnSpc>
-                <a:spcBef>
-                  <a:spcPts val="0"/>
-                </a:spcBef>
-                <a:spcAft>
-                  <a:spcPts val="0"/>
-                </a:spcAft>
-                <a:buNone/>
-              </a:pPr>
-              <a:endParaRPr sz="1400" b="0" i="0" u="none" strike="noStrike" cap="none">
-                <a:solidFill>
-                  <a:srgbClr val="13294B"/>
-                </a:solidFill>
-                <a:latin typeface="Arial"/>
-                <a:ea typeface="Arial"/>
-                <a:cs typeface="Arial"/>
-                <a:sym typeface="Arial"/>
-              </a:endParaRPr>
-            </a:p>
-          </p:txBody>
-        </p:sp>
-      </p:grpSp>
-      <p:pic>
-        <p:nvPicPr>
-          <p:cNvPr id="3076" name="Picture 4" descr="undefined">
-            <a:extLst>
-              <a:ext uri="{FF2B5EF4-FFF2-40B4-BE49-F238E27FC236}">
-                <a16:creationId xmlns:a16="http://schemas.microsoft.com/office/drawing/2014/main" id="{951CD270-E96E-0C94-E14F-8969C8EC804E}"/>
-              </a:ext>
-            </a:extLst>
-          </p:cNvPr>
-          <p:cNvPicPr>
-            <a:picLocks noChangeAspect="1" noChangeArrowheads="1"/>
-          </p:cNvPicPr>
-          <p:nvPr/>
-        </p:nvPicPr>
-        <p:blipFill>
-          <a:blip r:embed="rId4">
-            <a:extLst>
-              <a:ext uri="{28A0092B-C50C-407E-A947-70E740481C1C}">
-                <a14:useLocalDpi xmlns:a14="http://schemas.microsoft.com/office/drawing/2010/main" val="0"/>
-              </a:ext>
-            </a:extLst>
-          </a:blip>
-          <a:srcRect/>
-          <a:stretch>
-            <a:fillRect/>
-          </a:stretch>
-        </p:blipFill>
-        <p:spPr bwMode="auto">
-          <a:xfrm>
-            <a:off x="3092289" y="1920479"/>
-            <a:ext cx="5746439" cy="2532025"/>
-          </a:xfrm>
-          <a:prstGeom prst="rect">
-            <a:avLst/>
-          </a:prstGeom>
-          <a:noFill/>
-          <a:extLst>
-            <a:ext uri="{909E8E84-426E-40DD-AFC4-6F175D3DCCD1}">
-              <a14:hiddenFill xmlns:a14="http://schemas.microsoft.com/office/drawing/2010/main">
-                <a:solidFill>
-                  <a:srgbClr val="FFFFFF"/>
-                </a:solidFill>
-              </a14:hiddenFill>
-            </a:ext>
-          </a:extLst>
-        </p:spPr>
-      </p:pic>
-      <p:pic>
-        <p:nvPicPr>
-          <p:cNvPr id="3078" name="Picture 6" descr="16-to-1 mux">
-            <a:extLst>
-              <a:ext uri="{FF2B5EF4-FFF2-40B4-BE49-F238E27FC236}">
-                <a16:creationId xmlns:a16="http://schemas.microsoft.com/office/drawing/2014/main" id="{AC7668CD-BA9C-41F4-D48B-CB43716E3FEA}"/>
-              </a:ext>
-            </a:extLst>
-          </p:cNvPr>
-          <p:cNvPicPr>
-            <a:picLocks noChangeAspect="1" noChangeArrowheads="1"/>
-          </p:cNvPicPr>
-          <p:nvPr/>
-        </p:nvPicPr>
-        <p:blipFill>
-          <a:blip r:embed="rId5">
-            <a:extLst>
-              <a:ext uri="{28A0092B-C50C-407E-A947-70E740481C1C}">
-                <a14:useLocalDpi xmlns:a14="http://schemas.microsoft.com/office/drawing/2010/main" val="0"/>
-              </a:ext>
-            </a:extLst>
-          </a:blip>
-          <a:srcRect/>
-          <a:stretch>
-            <a:fillRect/>
-          </a:stretch>
-        </p:blipFill>
-        <p:spPr bwMode="auto">
-          <a:xfrm>
-            <a:off x="2524849" y="4668348"/>
-            <a:ext cx="6613948" cy="1653487"/>
-          </a:xfrm>
-          <a:prstGeom prst="rect">
-            <a:avLst/>
-          </a:prstGeom>
-          <a:noFill/>
-          <a:extLst>
-            <a:ext uri="{909E8E84-426E-40DD-AFC4-6F175D3DCCD1}">
-              <a14:hiddenFill xmlns:a14="http://schemas.microsoft.com/office/drawing/2010/main">
-                <a:solidFill>
-                  <a:srgbClr val="FFFFFF"/>
-                </a:solidFill>
-              </a14:hiddenFill>
-            </a:ext>
-          </a:extLst>
-        </p:spPr>
-      </p:pic>
-    </p:spTree>
-    <p:extLst>
-      <p:ext uri="{BB962C8B-B14F-4D97-AF65-F5344CB8AC3E}">
-        <p14:creationId xmlns:p14="http://schemas.microsoft.com/office/powerpoint/2010/main" val="1279149816"/>
-      </p:ext>
-    </p:extLst>
-  </p:cSld>
-  <p:clrMapOvr>
-    <a:masterClrMapping/>
-  </p:clrMapOvr>
-</p:sld>
-</file>
-
-<file path=ppt/slides/slide21.xml><?xml version="1.0" encoding="utf-8"?>
-<p:sld xmlns:a="http://schemas.openxmlformats.org/drawingml/2006/main" xmlns:r="http://schemas.openxmlformats.org/officeDocument/2006/relationships" xmlns:p="http://schemas.openxmlformats.org/presentationml/2006/main">
-  <p:cSld>
-    <p:spTree>
-      <p:nvGrpSpPr>
-        <p:cNvPr id="1" name="Shape 117">
-          <a:extLst>
-            <a:ext uri="{FF2B5EF4-FFF2-40B4-BE49-F238E27FC236}">
               <a16:creationId xmlns:a16="http://schemas.microsoft.com/office/drawing/2014/main" id="{7408E2A6-449A-9603-FE69-F109BC54CCFF}"/>
             </a:ext>
           </a:extLst>
@@ -29633,7 +28641,7 @@
 </p:sld>
 </file>
 
-<file path=ppt/slides/slide22.xml><?xml version="1.0" encoding="utf-8"?>
+<file path=ppt/slides/slide21.xml><?xml version="1.0" encoding="utf-8"?>
 <p:sld xmlns:a="http://schemas.openxmlformats.org/drawingml/2006/main" xmlns:r="http://schemas.openxmlformats.org/officeDocument/2006/relationships" xmlns:p="http://schemas.openxmlformats.org/presentationml/2006/main">
   <p:cSld>
     <p:spTree>
@@ -30465,7 +29473,7 @@
 </p:sld>
 </file>
 
-<file path=ppt/slides/slide23.xml><?xml version="1.0" encoding="utf-8"?>
+<file path=ppt/slides/slide22.xml><?xml version="1.0" encoding="utf-8"?>
 <p:sld xmlns:a="http://schemas.openxmlformats.org/drawingml/2006/main" xmlns:r="http://schemas.openxmlformats.org/officeDocument/2006/relationships" xmlns:p="http://schemas.openxmlformats.org/presentationml/2006/main">
   <p:cSld>
     <p:spTree>
@@ -30692,7 +29700,7 @@
             </a:r>
           </a:p>
           <a:p>
-            <a:pPr marL="0" indent="0" algn="l">
+            <a:pPr marL="0" indent="0">
               <a:spcBef>
                 <a:spcPts val="0"/>
               </a:spcBef>
@@ -30759,8 +29767,23 @@
                 </a:solidFill>
                 <a:latin typeface="Consolas" panose="020B0609020204030204" pitchFamily="49" charset="0"/>
               </a:rPr>
-              <a:t>;</a:t>
-            </a:r>
+              <a:t>; </a:t>
+            </a:r>
+            <a:r>
+              <a:rPr lang="en-US" sz="1300" dirty="0">
+                <a:solidFill>
+                  <a:srgbClr val="3F7F5F"/>
+                </a:solidFill>
+                <a:latin typeface="Consolas" panose="020B0609020204030204" pitchFamily="49" charset="0"/>
+              </a:rPr>
+              <a:t>// volatile means that the variable may change from external sources (i.e. interrupts)</a:t>
+            </a:r>
+            <a:endParaRPr lang="en-US" sz="1300" dirty="0">
+              <a:solidFill>
+                <a:srgbClr val="000000"/>
+              </a:solidFill>
+              <a:latin typeface="Consolas" panose="020B0609020204030204" pitchFamily="49" charset="0"/>
+            </a:endParaRPr>
           </a:p>
           <a:p>
             <a:pPr marL="0" indent="0" algn="l">
@@ -31262,7 +30285,7 @@
             </a:r>
           </a:p>
           <a:p>
-            <a:pPr marL="0" indent="0" algn="l">
+            <a:pPr marL="0" indent="0">
               <a:spcBef>
                 <a:spcPts val="0"/>
               </a:spcBef>
@@ -31273,7 +30296,7 @@
             </a:endParaRPr>
           </a:p>
           <a:p>
-            <a:pPr marL="0" indent="0" algn="l">
+            <a:pPr marL="0" indent="0">
               <a:spcBef>
                 <a:spcPts val="0"/>
               </a:spcBef>
@@ -31286,8 +30309,23 @@
                 </a:solidFill>
                 <a:latin typeface="Consolas" panose="020B0609020204030204" pitchFamily="49" charset="0"/>
               </a:rPr>
-              <a:t>    EALLOW;</a:t>
-            </a:r>
+              <a:t>    EALLOW; </a:t>
+            </a:r>
+            <a:r>
+              <a:rPr lang="en-US" sz="1300" dirty="0">
+                <a:solidFill>
+                  <a:srgbClr val="3F7F5F"/>
+                </a:solidFill>
+                <a:latin typeface="Consolas" panose="020B0609020204030204" pitchFamily="49" charset="0"/>
+              </a:rPr>
+              <a:t>// block that controls the physical multiplexer</a:t>
+            </a:r>
+            <a:endParaRPr lang="en-US" sz="1300" dirty="0">
+              <a:solidFill>
+                <a:srgbClr val="000000"/>
+              </a:solidFill>
+              <a:latin typeface="Consolas" panose="020B0609020204030204" pitchFamily="49" charset="0"/>
+            </a:endParaRPr>
           </a:p>
           <a:p>
             <a:pPr marL="0" indent="0" algn="l">
@@ -32077,7 +31115,7 @@
 </p:sld>
 </file>
 
-<file path=ppt/slides/slide24.xml><?xml version="1.0" encoding="utf-8"?>
+<file path=ppt/slides/slide23.xml><?xml version="1.0" encoding="utf-8"?>
 <p:sld xmlns:a="http://schemas.openxmlformats.org/drawingml/2006/main" xmlns:r="http://schemas.openxmlformats.org/officeDocument/2006/relationships" xmlns:p="http://schemas.openxmlformats.org/presentationml/2006/main">
   <p:cSld>
     <p:spTree>
@@ -32158,6 +31196,32 @@
                 <a:latin typeface="Consolas" panose="020B0609020204030204" pitchFamily="49" charset="0"/>
               </a:rPr>
               <a:t>(19, GPIO_MUX_CPU1, 0);</a:t>
+            </a:r>
+          </a:p>
+          <a:p>
+            <a:pPr marL="0" indent="0" algn="ctr">
+              <a:spcBef>
+                <a:spcPts val="0"/>
+              </a:spcBef>
+              <a:buNone/>
+            </a:pPr>
+            <a:r>
+              <a:rPr lang="en-US" sz="1800" dirty="0" err="1">
+                <a:solidFill>
+                  <a:srgbClr val="642880"/>
+                </a:solidFill>
+                <a:latin typeface="Consolas" panose="020B0609020204030204" pitchFamily="49" charset="0"/>
+              </a:rPr>
+              <a:t>GPIO_SetupPinOptions</a:t>
+            </a:r>
+            <a:r>
+              <a:rPr lang="en-US" sz="1800" dirty="0">
+                <a:solidFill>
+                  <a:srgbClr val="000000"/>
+                </a:solidFill>
+                <a:latin typeface="Consolas" panose="020B0609020204030204" pitchFamily="49" charset="0"/>
+              </a:rPr>
+              <a:t>(19, GPIO_OUTPUT, GPIO_PUSHPULL);</a:t>
             </a:r>
           </a:p>
           <a:p>
@@ -32702,7 +31766,7 @@
 </p:sld>
 </file>
 
-<file path=ppt/slides/slide25.xml><?xml version="1.0" encoding="utf-8"?>
+<file path=ppt/slides/slide24.xml><?xml version="1.0" encoding="utf-8"?>
 <p:sld xmlns:a="http://schemas.openxmlformats.org/drawingml/2006/main" xmlns:r="http://schemas.openxmlformats.org/officeDocument/2006/relationships" xmlns:p="http://schemas.openxmlformats.org/presentationml/2006/main">
   <p:cSld>
     <p:bg>
@@ -33157,7 +32221,7 @@
 </p:sld>
 </file>
 
-<file path=ppt/slides/slide26.xml><?xml version="1.0" encoding="utf-8"?>
+<file path=ppt/slides/slide25.xml><?xml version="1.0" encoding="utf-8"?>
 <p:sld xmlns:a="http://schemas.openxmlformats.org/drawingml/2006/main" xmlns:r="http://schemas.openxmlformats.org/officeDocument/2006/relationships" xmlns:p="http://schemas.openxmlformats.org/presentationml/2006/main">
   <p:cSld>
     <p:spTree>
@@ -33343,7 +32407,7 @@
               <a:buNone/>
             </a:pPr>
             <a:r>
-              <a:rPr lang="en-US" sz="2400" b="0" i="0" u="none" strike="noStrike" cap="none" dirty="0">
+              <a:rPr lang="en-US" sz="2400" b="0" i="0" u="none" strike="noStrike" cap="none">
                 <a:solidFill>
                   <a:schemeClr val="lt1"/>
                 </a:solidFill>
@@ -33352,7 +32416,7 @@
                 <a:cs typeface="Arial"/>
                 <a:sym typeface="Arial"/>
               </a:rPr>
-              <a:t>GitHub</a:t>
+              <a:t>Git / GitHub</a:t>
             </a:r>
             <a:endParaRPr sz="2400" b="0" i="0" u="none" strike="noStrike" cap="none" dirty="0">
               <a:solidFill>
@@ -34007,8 +33071,8 @@
         </p:nvSpPr>
         <p:spPr>
           <a:xfrm>
-            <a:off x="3206415" y="958603"/>
-            <a:ext cx="1720516" cy="707886"/>
+            <a:off x="2427205" y="926572"/>
+            <a:ext cx="3296653" cy="707886"/>
           </a:xfrm>
           <a:prstGeom prst="rect">
             <a:avLst/>
@@ -34024,7 +33088,7 @@
             <a:pPr algn="ctr"/>
             <a:r>
               <a:rPr lang="en-US" sz="4000" dirty="0"/>
-              <a:t>Local</a:t>
+              <a:t>Local (git)</a:t>
             </a:r>
           </a:p>
         </p:txBody>
@@ -34043,8 +33107,8 @@
         </p:nvSpPr>
         <p:spPr>
           <a:xfrm>
-            <a:off x="8895864" y="966045"/>
-            <a:ext cx="2261938" cy="704088"/>
+            <a:off x="8005267" y="910065"/>
+            <a:ext cx="4043128" cy="707886"/>
           </a:xfrm>
           <a:prstGeom prst="rect">
             <a:avLst/>
@@ -34060,7 +33124,7 @@
             <a:pPr algn="ctr"/>
             <a:r>
               <a:rPr lang="en-US" sz="4000" dirty="0"/>
-              <a:t>Remote</a:t>
+              <a:t>Remote (GitHub)</a:t>
             </a:r>
           </a:p>
         </p:txBody>
@@ -34408,7 +33472,7 @@
 </p:sld>
 </file>
 
-<file path=ppt/slides/slide27.xml><?xml version="1.0" encoding="utf-8"?>
+<file path=ppt/slides/slide26.xml><?xml version="1.0" encoding="utf-8"?>
 <p:sld xmlns:a="http://schemas.openxmlformats.org/drawingml/2006/main" xmlns:r="http://schemas.openxmlformats.org/officeDocument/2006/relationships" xmlns:p="http://schemas.openxmlformats.org/presentationml/2006/main">
   <p:cSld>
     <p:bg>
@@ -34765,7 +33829,7 @@
 </p:sld>
 </file>
 
-<file path=ppt/slides/slide28.xml><?xml version="1.0" encoding="utf-8"?>
+<file path=ppt/slides/slide27.xml><?xml version="1.0" encoding="utf-8"?>
 <p:sld xmlns:a="http://schemas.openxmlformats.org/drawingml/2006/main" xmlns:r="http://schemas.openxmlformats.org/officeDocument/2006/relationships" xmlns:p="http://schemas.openxmlformats.org/presentationml/2006/main">
   <p:cSld>
     <p:bg>

</xml_diff>